<commit_message>
more slides through with clauses
</commit_message>
<xml_diff>
--- a/using-using-with-with.pptx
+++ b/using-using-with-with.pptx
@@ -5,10 +5,10 @@
     <p:sldMasterId id="2147483648" r:id="rId1"/>
   </p:sldMasterIdLst>
   <p:notesMasterIdLst>
-    <p:notesMasterId r:id="rId14"/>
+    <p:notesMasterId r:id="rId25"/>
   </p:notesMasterIdLst>
   <p:handoutMasterIdLst>
-    <p:handoutMasterId r:id="rId15"/>
+    <p:handoutMasterId r:id="rId26"/>
   </p:handoutMasterIdLst>
   <p:sldIdLst>
     <p:sldId id="256" r:id="rId2"/>
@@ -22,7 +22,18 @@
     <p:sldId id="268" r:id="rId10"/>
     <p:sldId id="257" r:id="rId11"/>
     <p:sldId id="260" r:id="rId12"/>
-    <p:sldId id="258" r:id="rId13"/>
+    <p:sldId id="269" r:id="rId13"/>
+    <p:sldId id="270" r:id="rId14"/>
+    <p:sldId id="271" r:id="rId15"/>
+    <p:sldId id="272" r:id="rId16"/>
+    <p:sldId id="273" r:id="rId17"/>
+    <p:sldId id="274" r:id="rId18"/>
+    <p:sldId id="275" r:id="rId19"/>
+    <p:sldId id="276" r:id="rId20"/>
+    <p:sldId id="277" r:id="rId21"/>
+    <p:sldId id="278" r:id="rId22"/>
+    <p:sldId id="279" r:id="rId23"/>
+    <p:sldId id="258" r:id="rId24"/>
   </p:sldIdLst>
   <p:sldSz cx="9144000" cy="6858000" type="screen4x3"/>
   <p:notesSz cx="6858000" cy="9144000"/>
@@ -123,7 +134,7 @@
   </p:defaultTextStyle>
   <p:extLst>
     <p:ext uri="{EFAFB233-063F-42B5-8137-9DF3F51BA10A}">
-      <p15:sldGuideLst xmlns:p15="http://schemas.microsoft.com/office/powerpoint/2012/main" xmlns="">
+      <p15:sldGuideLst xmlns="" xmlns:p15="http://schemas.microsoft.com/office/powerpoint/2012/main">
         <p15:guide id="1" orient="horz" pos="2160">
           <p15:clr>
             <a:srgbClr val="A4A3A4"/>
@@ -223,7 +234,7 @@
             <a:fld id="{03643E35-CD80-874A-A3D7-254E954BB753}" type="datetimeFigureOut">
               <a:rPr lang="en-US" smtClean="0"/>
               <a:pPr/>
-              <a:t>8/13/15</a:t>
+              <a:t>8/14/15</a:t>
             </a:fld>
             <a:endParaRPr lang="en-US"/>
           </a:p>
@@ -390,7 +401,7 @@
             <a:fld id="{5C416C15-7665-174C-99B8-5B237ACA6582}" type="datetimeFigureOut">
               <a:rPr lang="en-US" smtClean="0"/>
               <a:pPr/>
-              <a:t>8/13/15</a:t>
+              <a:t>8/14/15</a:t>
             </a:fld>
             <a:endParaRPr lang="en-US"/>
           </a:p>
@@ -825,7 +836,41 @@
             </a:r>
             <a:r>
               <a:rPr lang="en-US" baseline="0" dirty="0" smtClean="0"/>
-              <a:t>???</a:t>
+              <a:t>??</a:t>
+            </a:r>
+            <a:r>
+              <a:rPr lang="en-US" baseline="0" dirty="0" smtClean="0"/>
+              <a:t>?</a:t>
+            </a:r>
+          </a:p>
+          <a:p>
+            <a:endParaRPr lang="en-US" baseline="0" dirty="0" smtClean="0"/>
+          </a:p>
+          <a:p>
+            <a:r>
+              <a:rPr lang="en-US" baseline="0" dirty="0" smtClean="0"/>
+              <a:t>“all’s fair if you </a:t>
+            </a:r>
+            <a:r>
+              <a:rPr lang="en-US" baseline="0" dirty="0" err="1" smtClean="0"/>
+              <a:t>predeclare</a:t>
+            </a:r>
+            <a:r>
+              <a:rPr lang="en-US" baseline="0" dirty="0" smtClean="0"/>
+              <a:t>”</a:t>
+            </a:r>
+          </a:p>
+          <a:p>
+            <a:endParaRPr lang="en-US" baseline="0" dirty="0" smtClean="0"/>
+          </a:p>
+          <a:p>
+            <a:r>
+              <a:rPr lang="en-US" baseline="0" dirty="0" smtClean="0"/>
+              <a:t>I’m going to dive into bits of the new query.  Let’s look at some “with” </a:t>
+            </a:r>
+            <a:r>
+              <a:rPr lang="en-US" baseline="0" dirty="0" err="1" smtClean="0"/>
+              <a:t>thingers</a:t>
             </a:r>
             <a:endParaRPr lang="en-US" dirty="0"/>
           </a:p>
@@ -859,6 +904,1065 @@
     <p:extLst>
       <p:ext uri="{BB962C8B-B14F-4D97-AF65-F5344CB8AC3E}">
         <p14:creationId xmlns:p14="http://schemas.microsoft.com/office/powerpoint/2010/main" val="220979805"/>
+      </p:ext>
+    </p:extLst>
+  </p:cSld>
+  <p:clrMapOvr>
+    <a:masterClrMapping/>
+  </p:clrMapOvr>
+</p:notes>
+</file>
+
+<file path=ppt/notesSlides/notesSlide11.xml><?xml version="1.0" encoding="utf-8"?>
+<p:notes xmlns:a="http://schemas.openxmlformats.org/drawingml/2006/main" xmlns:r="http://schemas.openxmlformats.org/officeDocument/2006/relationships" xmlns:p="http://schemas.openxmlformats.org/presentationml/2006/main">
+  <p:cSld>
+    <p:spTree>
+      <p:nvGrpSpPr>
+        <p:cNvPr id="1" name=""/>
+        <p:cNvGrpSpPr/>
+        <p:nvPr/>
+      </p:nvGrpSpPr>
+      <p:grpSpPr>
+        <a:xfrm>
+          <a:off x="0" y="0"/>
+          <a:ext cx="0" cy="0"/>
+          <a:chOff x="0" y="0"/>
+          <a:chExt cx="0" cy="0"/>
+        </a:xfrm>
+      </p:grpSpPr>
+      <p:sp>
+        <p:nvSpPr>
+          <p:cNvPr id="2" name="Slide Image Placeholder 1"/>
+          <p:cNvSpPr>
+            <a:spLocks noGrp="1" noRot="1" noChangeAspect="1"/>
+          </p:cNvSpPr>
+          <p:nvPr>
+            <p:ph type="sldImg"/>
+          </p:nvPr>
+        </p:nvSpPr>
+        <p:spPr/>
+      </p:sp>
+      <p:sp>
+        <p:nvSpPr>
+          <p:cNvPr id="3" name="Notes Placeholder 2"/>
+          <p:cNvSpPr>
+            <a:spLocks noGrp="1"/>
+          </p:cNvSpPr>
+          <p:nvPr>
+            <p:ph type="body" idx="1"/>
+          </p:nvPr>
+        </p:nvSpPr>
+        <p:spPr/>
+        <p:txBody>
+          <a:bodyPr/>
+          <a:lstStyle/>
+          <a:p>
+            <a:r>
+              <a:rPr lang="en-US" dirty="0" smtClean="0"/>
+              <a:t>The</a:t>
+            </a:r>
+            <a:r>
+              <a:rPr lang="en-US" baseline="0" dirty="0" smtClean="0"/>
+              <a:t> main table we’re querying is </a:t>
+            </a:r>
+            <a:r>
+              <a:rPr lang="en-US" baseline="0" dirty="0" err="1" smtClean="0"/>
+              <a:t>index_illumina</a:t>
+            </a:r>
+            <a:r>
+              <a:rPr lang="en-US" baseline="0" dirty="0" smtClean="0"/>
+              <a:t>.  </a:t>
+            </a:r>
+            <a:r>
+              <a:rPr lang="en-US" baseline="0" dirty="0" err="1" smtClean="0"/>
+              <a:t>Index_illumina</a:t>
+            </a:r>
+            <a:r>
+              <a:rPr lang="en-US" baseline="0" dirty="0" smtClean="0"/>
+              <a:t> typically has 2 </a:t>
+            </a:r>
+            <a:r>
+              <a:rPr lang="en-US" baseline="0" dirty="0" err="1" smtClean="0"/>
+              <a:t>read_illumina</a:t>
+            </a:r>
+            <a:r>
+              <a:rPr lang="en-US" baseline="0" dirty="0" smtClean="0"/>
+              <a:t>, and each of those has a length.</a:t>
+            </a:r>
+          </a:p>
+          <a:p>
+            <a:r>
+              <a:rPr lang="en-US" baseline="0" dirty="0" smtClean="0"/>
+              <a:t>So we’re summing the lengths from the two rows for the </a:t>
+            </a:r>
+            <a:r>
+              <a:rPr lang="en-US" baseline="0" dirty="0" err="1" smtClean="0"/>
+              <a:t>read_length</a:t>
+            </a:r>
+            <a:r>
+              <a:rPr lang="en-US" baseline="0" dirty="0" smtClean="0"/>
+              <a:t> column, and then just renaming the </a:t>
+            </a:r>
+            <a:r>
+              <a:rPr lang="en-US" baseline="0" dirty="0" err="1" smtClean="0"/>
+              <a:t>seq_id</a:t>
+            </a:r>
+            <a:endParaRPr lang="en-US" baseline="0" dirty="0" smtClean="0"/>
+          </a:p>
+          <a:p>
+            <a:r>
+              <a:rPr lang="en-US" baseline="0" dirty="0" smtClean="0"/>
+              <a:t>And I know I want a group by</a:t>
+            </a:r>
+          </a:p>
+          <a:p>
+            <a:endParaRPr lang="en-US" baseline="0" dirty="0" smtClean="0"/>
+          </a:p>
+          <a:p>
+            <a:r>
+              <a:rPr lang="en-US" baseline="0" dirty="0" smtClean="0"/>
+              <a:t>So this query alone yields 1 row per row in </a:t>
+            </a:r>
+            <a:r>
+              <a:rPr lang="en-US" baseline="0" dirty="0" err="1" smtClean="0"/>
+              <a:t>index_illumina</a:t>
+            </a:r>
+            <a:r>
+              <a:rPr lang="en-US" baseline="0" dirty="0" smtClean="0"/>
+              <a:t>, with 2 columns: </a:t>
+            </a:r>
+            <a:r>
+              <a:rPr lang="en-US" baseline="0" dirty="0" err="1" smtClean="0"/>
+              <a:t>read_length</a:t>
+            </a:r>
+            <a:r>
+              <a:rPr lang="en-US" baseline="0" dirty="0" smtClean="0"/>
+              <a:t> and </a:t>
+            </a:r>
+            <a:r>
+              <a:rPr lang="en-US" baseline="0" dirty="0" err="1" smtClean="0"/>
+              <a:t>seq_id</a:t>
+            </a:r>
+            <a:endParaRPr lang="en-US" baseline="0" dirty="0" smtClean="0"/>
+          </a:p>
+          <a:p>
+            <a:r>
+              <a:rPr lang="en-US" baseline="0" dirty="0" smtClean="0"/>
+              <a:t>That will be the theme of all these </a:t>
+            </a:r>
+            <a:r>
+              <a:rPr lang="en-US" baseline="0" dirty="0" err="1" smtClean="0"/>
+              <a:t>subqueries</a:t>
+            </a:r>
+            <a:r>
+              <a:rPr lang="en-US" baseline="0" dirty="0" smtClean="0"/>
+              <a:t>.  All will be joined by </a:t>
+            </a:r>
+            <a:r>
+              <a:rPr lang="en-US" baseline="0" dirty="0" err="1" smtClean="0"/>
+              <a:t>seq_id</a:t>
+            </a:r>
+            <a:r>
+              <a:rPr lang="en-US" baseline="0" dirty="0" smtClean="0"/>
+              <a:t>, because that’s what I’m reporting on</a:t>
+            </a:r>
+          </a:p>
+          <a:p>
+            <a:endParaRPr lang="en-US" baseline="0" dirty="0" smtClean="0"/>
+          </a:p>
+          <a:p>
+            <a:r>
+              <a:rPr lang="en-US" baseline="0" dirty="0" smtClean="0"/>
+              <a:t>IIRL = index </a:t>
+            </a:r>
+            <a:r>
+              <a:rPr lang="en-US" baseline="0" dirty="0" err="1" smtClean="0"/>
+              <a:t>illumina</a:t>
+            </a:r>
+            <a:r>
+              <a:rPr lang="en-US" baseline="0" dirty="0" smtClean="0"/>
+              <a:t> read length – not awesome name, but…</a:t>
+            </a:r>
+          </a:p>
+        </p:txBody>
+      </p:sp>
+      <p:sp>
+        <p:nvSpPr>
+          <p:cNvPr id="4" name="Slide Number Placeholder 3"/>
+          <p:cNvSpPr>
+            <a:spLocks noGrp="1"/>
+          </p:cNvSpPr>
+          <p:nvPr>
+            <p:ph type="sldNum" sz="quarter" idx="10"/>
+          </p:nvPr>
+        </p:nvSpPr>
+        <p:spPr/>
+        <p:txBody>
+          <a:bodyPr/>
+          <a:lstStyle/>
+          <a:p>
+            <a:fld id="{F9BF1BD6-11A6-594E-AFA1-283323A41F72}" type="slidenum">
+              <a:rPr lang="en-US" smtClean="0"/>
+              <a:pPr/>
+              <a:t>12</a:t>
+            </a:fld>
+            <a:endParaRPr lang="en-US"/>
+          </a:p>
+        </p:txBody>
+      </p:sp>
+    </p:spTree>
+    <p:extLst>
+      <p:ext uri="{BB962C8B-B14F-4D97-AF65-F5344CB8AC3E}">
+        <p14:creationId xmlns:p14="http://schemas.microsoft.com/office/powerpoint/2010/main" val="1808173764"/>
+      </p:ext>
+    </p:extLst>
+  </p:cSld>
+  <p:clrMapOvr>
+    <a:masterClrMapping/>
+  </p:clrMapOvr>
+</p:notes>
+</file>
+
+<file path=ppt/notesSlides/notesSlide12.xml><?xml version="1.0" encoding="utf-8"?>
+<p:notes xmlns:a="http://schemas.openxmlformats.org/drawingml/2006/main" xmlns:r="http://schemas.openxmlformats.org/officeDocument/2006/relationships" xmlns:p="http://schemas.openxmlformats.org/presentationml/2006/main">
+  <p:cSld>
+    <p:spTree>
+      <p:nvGrpSpPr>
+        <p:cNvPr id="1" name=""/>
+        <p:cNvGrpSpPr/>
+        <p:nvPr/>
+      </p:nvGrpSpPr>
+      <p:grpSpPr>
+        <a:xfrm>
+          <a:off x="0" y="0"/>
+          <a:ext cx="0" cy="0"/>
+          <a:chOff x="0" y="0"/>
+          <a:chExt cx="0" cy="0"/>
+        </a:xfrm>
+      </p:grpSpPr>
+      <p:sp>
+        <p:nvSpPr>
+          <p:cNvPr id="2" name="Slide Image Placeholder 1"/>
+          <p:cNvSpPr>
+            <a:spLocks noGrp="1" noRot="1" noChangeAspect="1"/>
+          </p:cNvSpPr>
+          <p:nvPr>
+            <p:ph type="sldImg"/>
+          </p:nvPr>
+        </p:nvSpPr>
+        <p:spPr/>
+      </p:sp>
+      <p:sp>
+        <p:nvSpPr>
+          <p:cNvPr id="3" name="Notes Placeholder 2"/>
+          <p:cNvSpPr>
+            <a:spLocks noGrp="1"/>
+          </p:cNvSpPr>
+          <p:nvPr>
+            <p:ph type="body" idx="1"/>
+          </p:nvPr>
+        </p:nvSpPr>
+        <p:spPr/>
+        <p:txBody>
+          <a:bodyPr/>
+          <a:lstStyle/>
+          <a:p>
+            <a:r>
+              <a:rPr lang="en-US" dirty="0" smtClean="0"/>
+              <a:t>IIB</a:t>
+            </a:r>
+            <a:r>
+              <a:rPr lang="en-US" baseline="0" dirty="0" smtClean="0"/>
+              <a:t> stands for index </a:t>
+            </a:r>
+            <a:r>
+              <a:rPr lang="en-US" baseline="0" dirty="0" err="1" smtClean="0"/>
+              <a:t>illumina</a:t>
+            </a:r>
+            <a:r>
+              <a:rPr lang="en-US" baseline="0" dirty="0" smtClean="0"/>
+              <a:t> BASES – as in base pairs</a:t>
+            </a:r>
+          </a:p>
+          <a:p>
+            <a:r>
+              <a:rPr lang="en-US" baseline="0" dirty="0" smtClean="0"/>
+              <a:t>We’re doing an extension. Adding a column to the index </a:t>
+            </a:r>
+            <a:r>
+              <a:rPr lang="en-US" baseline="0" dirty="0" err="1" smtClean="0"/>
+              <a:t>illumina</a:t>
+            </a:r>
+            <a:r>
+              <a:rPr lang="en-US" baseline="0" dirty="0" smtClean="0"/>
+              <a:t> table</a:t>
+            </a:r>
+            <a:endParaRPr lang="en-US" dirty="0"/>
+          </a:p>
+        </p:txBody>
+      </p:sp>
+      <p:sp>
+        <p:nvSpPr>
+          <p:cNvPr id="4" name="Slide Number Placeholder 3"/>
+          <p:cNvSpPr>
+            <a:spLocks noGrp="1"/>
+          </p:cNvSpPr>
+          <p:nvPr>
+            <p:ph type="sldNum" sz="quarter" idx="10"/>
+          </p:nvPr>
+        </p:nvSpPr>
+        <p:spPr/>
+        <p:txBody>
+          <a:bodyPr/>
+          <a:lstStyle/>
+          <a:p>
+            <a:fld id="{F9BF1BD6-11A6-594E-AFA1-283323A41F72}" type="slidenum">
+              <a:rPr lang="en-US" smtClean="0"/>
+              <a:pPr/>
+              <a:t>13</a:t>
+            </a:fld>
+            <a:endParaRPr lang="en-US"/>
+          </a:p>
+        </p:txBody>
+      </p:sp>
+    </p:spTree>
+    <p:extLst>
+      <p:ext uri="{BB962C8B-B14F-4D97-AF65-F5344CB8AC3E}">
+        <p14:creationId xmlns:p14="http://schemas.microsoft.com/office/powerpoint/2010/main" val="3136546742"/>
+      </p:ext>
+    </p:extLst>
+  </p:cSld>
+  <p:clrMapOvr>
+    <a:masterClrMapping/>
+  </p:clrMapOvr>
+</p:notes>
+</file>
+
+<file path=ppt/notesSlides/notesSlide13.xml><?xml version="1.0" encoding="utf-8"?>
+<p:notes xmlns:a="http://schemas.openxmlformats.org/drawingml/2006/main" xmlns:r="http://schemas.openxmlformats.org/officeDocument/2006/relationships" xmlns:p="http://schemas.openxmlformats.org/presentationml/2006/main">
+  <p:cSld>
+    <p:spTree>
+      <p:nvGrpSpPr>
+        <p:cNvPr id="1" name=""/>
+        <p:cNvGrpSpPr/>
+        <p:nvPr/>
+      </p:nvGrpSpPr>
+      <p:grpSpPr>
+        <a:xfrm>
+          <a:off x="0" y="0"/>
+          <a:ext cx="0" cy="0"/>
+          <a:chOff x="0" y="0"/>
+          <a:chExt cx="0" cy="0"/>
+        </a:xfrm>
+      </p:grpSpPr>
+      <p:sp>
+        <p:nvSpPr>
+          <p:cNvPr id="2" name="Slide Image Placeholder 1"/>
+          <p:cNvSpPr>
+            <a:spLocks noGrp="1" noRot="1" noChangeAspect="1"/>
+          </p:cNvSpPr>
+          <p:nvPr>
+            <p:ph type="sldImg"/>
+          </p:nvPr>
+        </p:nvSpPr>
+        <p:spPr/>
+      </p:sp>
+      <p:sp>
+        <p:nvSpPr>
+          <p:cNvPr id="3" name="Notes Placeholder 2"/>
+          <p:cNvSpPr>
+            <a:spLocks noGrp="1"/>
+          </p:cNvSpPr>
+          <p:nvPr>
+            <p:ph type="body" idx="1"/>
+          </p:nvPr>
+        </p:nvSpPr>
+        <p:spPr/>
+        <p:txBody>
+          <a:bodyPr/>
+          <a:lstStyle/>
+          <a:p>
+            <a:r>
+              <a:rPr lang="en-US" dirty="0" smtClean="0"/>
+              <a:t>Note that we’re referring to the previous </a:t>
+            </a:r>
+            <a:r>
+              <a:rPr lang="en-US" dirty="0" err="1" smtClean="0"/>
+              <a:t>subquery</a:t>
+            </a:r>
+            <a:r>
+              <a:rPr lang="en-US" dirty="0" smtClean="0"/>
+              <a:t> we just</a:t>
+            </a:r>
+            <a:r>
+              <a:rPr lang="en-US" baseline="0" dirty="0" smtClean="0"/>
+              <a:t> defined :: IIRL</a:t>
+            </a:r>
+            <a:endParaRPr lang="en-US" dirty="0"/>
+          </a:p>
+        </p:txBody>
+      </p:sp>
+      <p:sp>
+        <p:nvSpPr>
+          <p:cNvPr id="4" name="Slide Number Placeholder 3"/>
+          <p:cNvSpPr>
+            <a:spLocks noGrp="1"/>
+          </p:cNvSpPr>
+          <p:nvPr>
+            <p:ph type="sldNum" sz="quarter" idx="10"/>
+          </p:nvPr>
+        </p:nvSpPr>
+        <p:spPr/>
+        <p:txBody>
+          <a:bodyPr/>
+          <a:lstStyle/>
+          <a:p>
+            <a:fld id="{F9BF1BD6-11A6-594E-AFA1-283323A41F72}" type="slidenum">
+              <a:rPr lang="en-US" smtClean="0"/>
+              <a:pPr/>
+              <a:t>14</a:t>
+            </a:fld>
+            <a:endParaRPr lang="en-US"/>
+          </a:p>
+        </p:txBody>
+      </p:sp>
+    </p:spTree>
+    <p:extLst>
+      <p:ext uri="{BB962C8B-B14F-4D97-AF65-F5344CB8AC3E}">
+        <p14:creationId xmlns:p14="http://schemas.microsoft.com/office/powerpoint/2010/main" val="3136546742"/>
+      </p:ext>
+    </p:extLst>
+  </p:cSld>
+  <p:clrMapOvr>
+    <a:masterClrMapping/>
+  </p:clrMapOvr>
+</p:notes>
+</file>
+
+<file path=ppt/notesSlides/notesSlide14.xml><?xml version="1.0" encoding="utf-8"?>
+<p:notes xmlns:a="http://schemas.openxmlformats.org/drawingml/2006/main" xmlns:r="http://schemas.openxmlformats.org/officeDocument/2006/relationships" xmlns:p="http://schemas.openxmlformats.org/presentationml/2006/main">
+  <p:cSld>
+    <p:spTree>
+      <p:nvGrpSpPr>
+        <p:cNvPr id="1" name=""/>
+        <p:cNvGrpSpPr/>
+        <p:nvPr/>
+      </p:nvGrpSpPr>
+      <p:grpSpPr>
+        <a:xfrm>
+          <a:off x="0" y="0"/>
+          <a:ext cx="0" cy="0"/>
+          <a:chOff x="0" y="0"/>
+          <a:chExt cx="0" cy="0"/>
+        </a:xfrm>
+      </p:grpSpPr>
+      <p:sp>
+        <p:nvSpPr>
+          <p:cNvPr id="2" name="Slide Image Placeholder 1"/>
+          <p:cNvSpPr>
+            <a:spLocks noGrp="1" noRot="1" noChangeAspect="1"/>
+          </p:cNvSpPr>
+          <p:nvPr>
+            <p:ph type="sldImg"/>
+          </p:nvPr>
+        </p:nvSpPr>
+        <p:spPr/>
+      </p:sp>
+      <p:sp>
+        <p:nvSpPr>
+          <p:cNvPr id="3" name="Notes Placeholder 2"/>
+          <p:cNvSpPr>
+            <a:spLocks noGrp="1"/>
+          </p:cNvSpPr>
+          <p:nvPr>
+            <p:ph type="body" idx="1"/>
+          </p:nvPr>
+        </p:nvSpPr>
+        <p:spPr/>
+        <p:txBody>
+          <a:bodyPr/>
+          <a:lstStyle/>
+          <a:p>
+            <a:r>
+              <a:rPr lang="en-US" dirty="0" smtClean="0"/>
+              <a:t>IID is for the DATE to be added to the index </a:t>
+            </a:r>
+            <a:r>
+              <a:rPr lang="en-US" dirty="0" err="1" smtClean="0"/>
+              <a:t>illumina</a:t>
+            </a:r>
+            <a:endParaRPr lang="en-US" dirty="0" smtClean="0"/>
+          </a:p>
+          <a:p>
+            <a:r>
+              <a:rPr lang="en-US" dirty="0" smtClean="0"/>
+              <a:t>We</a:t>
+            </a:r>
+            <a:r>
+              <a:rPr lang="en-US" baseline="0" dirty="0" smtClean="0"/>
+              <a:t> need to join to another table for this.  This one is one to one with index </a:t>
+            </a:r>
+            <a:r>
+              <a:rPr lang="en-US" baseline="0" dirty="0" err="1" smtClean="0"/>
+              <a:t>illumina</a:t>
+            </a:r>
+            <a:endParaRPr lang="en-US" dirty="0"/>
+          </a:p>
+        </p:txBody>
+      </p:sp>
+      <p:sp>
+        <p:nvSpPr>
+          <p:cNvPr id="4" name="Slide Number Placeholder 3"/>
+          <p:cNvSpPr>
+            <a:spLocks noGrp="1"/>
+          </p:cNvSpPr>
+          <p:nvPr>
+            <p:ph type="sldNum" sz="quarter" idx="10"/>
+          </p:nvPr>
+        </p:nvSpPr>
+        <p:spPr/>
+        <p:txBody>
+          <a:bodyPr/>
+          <a:lstStyle/>
+          <a:p>
+            <a:fld id="{F9BF1BD6-11A6-594E-AFA1-283323A41F72}" type="slidenum">
+              <a:rPr lang="en-US" smtClean="0"/>
+              <a:pPr/>
+              <a:t>15</a:t>
+            </a:fld>
+            <a:endParaRPr lang="en-US"/>
+          </a:p>
+        </p:txBody>
+      </p:sp>
+    </p:spTree>
+    <p:extLst>
+      <p:ext uri="{BB962C8B-B14F-4D97-AF65-F5344CB8AC3E}">
+        <p14:creationId xmlns:p14="http://schemas.microsoft.com/office/powerpoint/2010/main" val="3193292244"/>
+      </p:ext>
+    </p:extLst>
+  </p:cSld>
+  <p:clrMapOvr>
+    <a:masterClrMapping/>
+  </p:clrMapOvr>
+</p:notes>
+</file>
+
+<file path=ppt/notesSlides/notesSlide15.xml><?xml version="1.0" encoding="utf-8"?>
+<p:notes xmlns:a="http://schemas.openxmlformats.org/drawingml/2006/main" xmlns:r="http://schemas.openxmlformats.org/officeDocument/2006/relationships" xmlns:p="http://schemas.openxmlformats.org/presentationml/2006/main">
+  <p:cSld>
+    <p:spTree>
+      <p:nvGrpSpPr>
+        <p:cNvPr id="1" name=""/>
+        <p:cNvGrpSpPr/>
+        <p:nvPr/>
+      </p:nvGrpSpPr>
+      <p:grpSpPr>
+        <a:xfrm>
+          <a:off x="0" y="0"/>
+          <a:ext cx="0" cy="0"/>
+          <a:chOff x="0" y="0"/>
+          <a:chExt cx="0" cy="0"/>
+        </a:xfrm>
+      </p:grpSpPr>
+      <p:sp>
+        <p:nvSpPr>
+          <p:cNvPr id="2" name="Slide Image Placeholder 1"/>
+          <p:cNvSpPr>
+            <a:spLocks noGrp="1" noRot="1" noChangeAspect="1"/>
+          </p:cNvSpPr>
+          <p:nvPr>
+            <p:ph type="sldImg"/>
+          </p:nvPr>
+        </p:nvSpPr>
+        <p:spPr/>
+      </p:sp>
+      <p:sp>
+        <p:nvSpPr>
+          <p:cNvPr id="3" name="Notes Placeholder 2"/>
+          <p:cNvSpPr>
+            <a:spLocks noGrp="1"/>
+          </p:cNvSpPr>
+          <p:nvPr>
+            <p:ph type="body" idx="1"/>
+          </p:nvPr>
+        </p:nvSpPr>
+        <p:spPr/>
+        <p:txBody>
+          <a:bodyPr/>
+          <a:lstStyle/>
+          <a:p>
+            <a:r>
+              <a:rPr lang="en-US" dirty="0" smtClean="0"/>
+              <a:t>But it has a 3 column foreign</a:t>
+            </a:r>
+            <a:r>
+              <a:rPr lang="en-US" baseline="0" dirty="0" smtClean="0"/>
+              <a:t> key</a:t>
+            </a:r>
+            <a:endParaRPr lang="en-US" dirty="0"/>
+          </a:p>
+        </p:txBody>
+      </p:sp>
+      <p:sp>
+        <p:nvSpPr>
+          <p:cNvPr id="4" name="Slide Number Placeholder 3"/>
+          <p:cNvSpPr>
+            <a:spLocks noGrp="1"/>
+          </p:cNvSpPr>
+          <p:nvPr>
+            <p:ph type="sldNum" sz="quarter" idx="10"/>
+          </p:nvPr>
+        </p:nvSpPr>
+        <p:spPr/>
+        <p:txBody>
+          <a:bodyPr/>
+          <a:lstStyle/>
+          <a:p>
+            <a:fld id="{F9BF1BD6-11A6-594E-AFA1-283323A41F72}" type="slidenum">
+              <a:rPr lang="en-US" smtClean="0"/>
+              <a:pPr/>
+              <a:t>16</a:t>
+            </a:fld>
+            <a:endParaRPr lang="en-US"/>
+          </a:p>
+        </p:txBody>
+      </p:sp>
+    </p:spTree>
+    <p:extLst>
+      <p:ext uri="{BB962C8B-B14F-4D97-AF65-F5344CB8AC3E}">
+        <p14:creationId xmlns:p14="http://schemas.microsoft.com/office/powerpoint/2010/main" val="3193292244"/>
+      </p:ext>
+    </p:extLst>
+  </p:cSld>
+  <p:clrMapOvr>
+    <a:masterClrMapping/>
+  </p:clrMapOvr>
+</p:notes>
+</file>
+
+<file path=ppt/notesSlides/notesSlide16.xml><?xml version="1.0" encoding="utf-8"?>
+<p:notes xmlns:a="http://schemas.openxmlformats.org/drawingml/2006/main" xmlns:r="http://schemas.openxmlformats.org/officeDocument/2006/relationships" xmlns:p="http://schemas.openxmlformats.org/presentationml/2006/main">
+  <p:cSld>
+    <p:spTree>
+      <p:nvGrpSpPr>
+        <p:cNvPr id="1" name=""/>
+        <p:cNvGrpSpPr/>
+        <p:nvPr/>
+      </p:nvGrpSpPr>
+      <p:grpSpPr>
+        <a:xfrm>
+          <a:off x="0" y="0"/>
+          <a:ext cx="0" cy="0"/>
+          <a:chOff x="0" y="0"/>
+          <a:chExt cx="0" cy="0"/>
+        </a:xfrm>
+      </p:grpSpPr>
+      <p:sp>
+        <p:nvSpPr>
+          <p:cNvPr id="2" name="Slide Image Placeholder 1"/>
+          <p:cNvSpPr>
+            <a:spLocks noGrp="1" noRot="1" noChangeAspect="1"/>
+          </p:cNvSpPr>
+          <p:nvPr>
+            <p:ph type="sldImg"/>
+          </p:nvPr>
+        </p:nvSpPr>
+        <p:spPr/>
+      </p:sp>
+      <p:sp>
+        <p:nvSpPr>
+          <p:cNvPr id="3" name="Notes Placeholder 2"/>
+          <p:cNvSpPr>
+            <a:spLocks noGrp="1"/>
+          </p:cNvSpPr>
+          <p:nvPr>
+            <p:ph type="body" idx="1"/>
+          </p:nvPr>
+        </p:nvSpPr>
+        <p:spPr/>
+        <p:txBody>
+          <a:bodyPr/>
+          <a:lstStyle/>
+          <a:p>
+            <a:r>
+              <a:rPr lang="en-US" dirty="0" smtClean="0"/>
+              <a:t>And we have a filter – a restriction</a:t>
+            </a:r>
+          </a:p>
+          <a:p>
+            <a:r>
+              <a:rPr lang="en-US" dirty="0" smtClean="0"/>
+              <a:t>A null DATE_COMPLETED</a:t>
+            </a:r>
+            <a:r>
+              <a:rPr lang="en-US" baseline="0" dirty="0" smtClean="0"/>
+              <a:t> means it’s not competed yet so we’re not interested in it</a:t>
+            </a:r>
+          </a:p>
+          <a:p>
+            <a:endParaRPr lang="en-US" baseline="0" dirty="0" smtClean="0"/>
+          </a:p>
+          <a:p>
+            <a:r>
+              <a:rPr lang="en-US" baseline="0" dirty="0" smtClean="0"/>
+              <a:t>So when we join to this </a:t>
+            </a:r>
+            <a:r>
+              <a:rPr lang="en-US" baseline="0" dirty="0" err="1" smtClean="0"/>
+              <a:t>subquery</a:t>
+            </a:r>
+            <a:r>
+              <a:rPr lang="en-US" baseline="0" dirty="0" smtClean="0"/>
+              <a:t>, we’ll be filtering those out</a:t>
+            </a:r>
+          </a:p>
+        </p:txBody>
+      </p:sp>
+      <p:sp>
+        <p:nvSpPr>
+          <p:cNvPr id="4" name="Slide Number Placeholder 3"/>
+          <p:cNvSpPr>
+            <a:spLocks noGrp="1"/>
+          </p:cNvSpPr>
+          <p:nvPr>
+            <p:ph type="sldNum" sz="quarter" idx="10"/>
+          </p:nvPr>
+        </p:nvSpPr>
+        <p:spPr/>
+        <p:txBody>
+          <a:bodyPr/>
+          <a:lstStyle/>
+          <a:p>
+            <a:fld id="{F9BF1BD6-11A6-594E-AFA1-283323A41F72}" type="slidenum">
+              <a:rPr lang="en-US" smtClean="0"/>
+              <a:pPr/>
+              <a:t>17</a:t>
+            </a:fld>
+            <a:endParaRPr lang="en-US"/>
+          </a:p>
+        </p:txBody>
+      </p:sp>
+    </p:spTree>
+    <p:extLst>
+      <p:ext uri="{BB962C8B-B14F-4D97-AF65-F5344CB8AC3E}">
+        <p14:creationId xmlns:p14="http://schemas.microsoft.com/office/powerpoint/2010/main" val="3193292244"/>
+      </p:ext>
+    </p:extLst>
+  </p:cSld>
+  <p:clrMapOvr>
+    <a:masterClrMapping/>
+  </p:clrMapOvr>
+</p:notes>
+</file>
+
+<file path=ppt/notesSlides/notesSlide17.xml><?xml version="1.0" encoding="utf-8"?>
+<p:notes xmlns:a="http://schemas.openxmlformats.org/drawingml/2006/main" xmlns:r="http://schemas.openxmlformats.org/officeDocument/2006/relationships" xmlns:p="http://schemas.openxmlformats.org/presentationml/2006/main">
+  <p:cSld>
+    <p:spTree>
+      <p:nvGrpSpPr>
+        <p:cNvPr id="1" name=""/>
+        <p:cNvGrpSpPr/>
+        <p:nvPr/>
+      </p:nvGrpSpPr>
+      <p:grpSpPr>
+        <a:xfrm>
+          <a:off x="0" y="0"/>
+          <a:ext cx="0" cy="0"/>
+          <a:chOff x="0" y="0"/>
+          <a:chExt cx="0" cy="0"/>
+        </a:xfrm>
+      </p:grpSpPr>
+      <p:sp>
+        <p:nvSpPr>
+          <p:cNvPr id="2" name="Slide Image Placeholder 1"/>
+          <p:cNvSpPr>
+            <a:spLocks noGrp="1" noRot="1" noChangeAspect="1"/>
+          </p:cNvSpPr>
+          <p:nvPr>
+            <p:ph type="sldImg"/>
+          </p:nvPr>
+        </p:nvSpPr>
+        <p:spPr/>
+      </p:sp>
+      <p:sp>
+        <p:nvSpPr>
+          <p:cNvPr id="3" name="Notes Placeholder 2"/>
+          <p:cNvSpPr>
+            <a:spLocks noGrp="1"/>
+          </p:cNvSpPr>
+          <p:nvPr>
+            <p:ph type="body" idx="1"/>
+          </p:nvPr>
+        </p:nvSpPr>
+        <p:spPr/>
+        <p:txBody>
+          <a:bodyPr/>
+          <a:lstStyle/>
+          <a:p>
+            <a:r>
+              <a:rPr lang="en-US" dirty="0" smtClean="0"/>
+              <a:t>IIM is for the MONTH</a:t>
+            </a:r>
+            <a:endParaRPr lang="en-US" dirty="0"/>
+          </a:p>
+        </p:txBody>
+      </p:sp>
+      <p:sp>
+        <p:nvSpPr>
+          <p:cNvPr id="4" name="Slide Number Placeholder 3"/>
+          <p:cNvSpPr>
+            <a:spLocks noGrp="1"/>
+          </p:cNvSpPr>
+          <p:nvPr>
+            <p:ph type="sldNum" sz="quarter" idx="10"/>
+          </p:nvPr>
+        </p:nvSpPr>
+        <p:spPr/>
+        <p:txBody>
+          <a:bodyPr/>
+          <a:lstStyle/>
+          <a:p>
+            <a:fld id="{F9BF1BD6-11A6-594E-AFA1-283323A41F72}" type="slidenum">
+              <a:rPr lang="en-US" smtClean="0"/>
+              <a:pPr/>
+              <a:t>18</a:t>
+            </a:fld>
+            <a:endParaRPr lang="en-US"/>
+          </a:p>
+        </p:txBody>
+      </p:sp>
+    </p:spTree>
+    <p:extLst>
+      <p:ext uri="{BB962C8B-B14F-4D97-AF65-F5344CB8AC3E}">
+        <p14:creationId xmlns:p14="http://schemas.microsoft.com/office/powerpoint/2010/main" val="2398926324"/>
+      </p:ext>
+    </p:extLst>
+  </p:cSld>
+  <p:clrMapOvr>
+    <a:masterClrMapping/>
+  </p:clrMapOvr>
+</p:notes>
+</file>
+
+<file path=ppt/notesSlides/notesSlide18.xml><?xml version="1.0" encoding="utf-8"?>
+<p:notes xmlns:a="http://schemas.openxmlformats.org/drawingml/2006/main" xmlns:r="http://schemas.openxmlformats.org/officeDocument/2006/relationships" xmlns:p="http://schemas.openxmlformats.org/presentationml/2006/main">
+  <p:cSld>
+    <p:spTree>
+      <p:nvGrpSpPr>
+        <p:cNvPr id="1" name=""/>
+        <p:cNvGrpSpPr/>
+        <p:nvPr/>
+      </p:nvGrpSpPr>
+      <p:grpSpPr>
+        <a:xfrm>
+          <a:off x="0" y="0"/>
+          <a:ext cx="0" cy="0"/>
+          <a:chOff x="0" y="0"/>
+          <a:chExt cx="0" cy="0"/>
+        </a:xfrm>
+      </p:grpSpPr>
+      <p:sp>
+        <p:nvSpPr>
+          <p:cNvPr id="2" name="Slide Image Placeholder 1"/>
+          <p:cNvSpPr>
+            <a:spLocks noGrp="1" noRot="1" noChangeAspect="1"/>
+          </p:cNvSpPr>
+          <p:nvPr>
+            <p:ph type="sldImg"/>
+          </p:nvPr>
+        </p:nvSpPr>
+        <p:spPr/>
+      </p:sp>
+      <p:sp>
+        <p:nvSpPr>
+          <p:cNvPr id="3" name="Notes Placeholder 2"/>
+          <p:cNvSpPr>
+            <a:spLocks noGrp="1"/>
+          </p:cNvSpPr>
+          <p:nvPr>
+            <p:ph type="body" idx="1"/>
+          </p:nvPr>
+        </p:nvSpPr>
+        <p:spPr/>
+        <p:txBody>
+          <a:bodyPr/>
+          <a:lstStyle/>
+          <a:p>
+            <a:r>
+              <a:rPr lang="en-US" dirty="0" smtClean="0"/>
+              <a:t>It refers</a:t>
+            </a:r>
+            <a:r>
+              <a:rPr lang="en-US" baseline="0" dirty="0" smtClean="0"/>
+              <a:t> to IID that we’ve already seen</a:t>
+            </a:r>
+          </a:p>
+          <a:p>
+            <a:r>
+              <a:rPr lang="en-US" baseline="0" dirty="0" smtClean="0"/>
+              <a:t>It’s so simple we could have just put it in IID</a:t>
+            </a:r>
+          </a:p>
+          <a:p>
+            <a:r>
+              <a:rPr lang="en-US" baseline="0" dirty="0" smtClean="0"/>
+              <a:t>But I was being a purist and doing each step separately with it’s own </a:t>
+            </a:r>
+            <a:r>
+              <a:rPr lang="en-US" baseline="0" dirty="0" err="1" smtClean="0"/>
+              <a:t>subquery</a:t>
+            </a:r>
+            <a:endParaRPr lang="en-US" dirty="0"/>
+          </a:p>
+        </p:txBody>
+      </p:sp>
+      <p:sp>
+        <p:nvSpPr>
+          <p:cNvPr id="4" name="Slide Number Placeholder 3"/>
+          <p:cNvSpPr>
+            <a:spLocks noGrp="1"/>
+          </p:cNvSpPr>
+          <p:nvPr>
+            <p:ph type="sldNum" sz="quarter" idx="10"/>
+          </p:nvPr>
+        </p:nvSpPr>
+        <p:spPr/>
+        <p:txBody>
+          <a:bodyPr/>
+          <a:lstStyle/>
+          <a:p>
+            <a:fld id="{F9BF1BD6-11A6-594E-AFA1-283323A41F72}" type="slidenum">
+              <a:rPr lang="en-US" smtClean="0"/>
+              <a:pPr/>
+              <a:t>19</a:t>
+            </a:fld>
+            <a:endParaRPr lang="en-US"/>
+          </a:p>
+        </p:txBody>
+      </p:sp>
+    </p:spTree>
+    <p:extLst>
+      <p:ext uri="{BB962C8B-B14F-4D97-AF65-F5344CB8AC3E}">
+        <p14:creationId xmlns:p14="http://schemas.microsoft.com/office/powerpoint/2010/main" val="2398926324"/>
+      </p:ext>
+    </p:extLst>
+  </p:cSld>
+  <p:clrMapOvr>
+    <a:masterClrMapping/>
+  </p:clrMapOvr>
+</p:notes>
+</file>
+
+<file path=ppt/notesSlides/notesSlide19.xml><?xml version="1.0" encoding="utf-8"?>
+<p:notes xmlns:a="http://schemas.openxmlformats.org/drawingml/2006/main" xmlns:r="http://schemas.openxmlformats.org/officeDocument/2006/relationships" xmlns:p="http://schemas.openxmlformats.org/presentationml/2006/main">
+  <p:cSld>
+    <p:spTree>
+      <p:nvGrpSpPr>
+        <p:cNvPr id="1" name=""/>
+        <p:cNvGrpSpPr/>
+        <p:nvPr/>
+      </p:nvGrpSpPr>
+      <p:grpSpPr>
+        <a:xfrm>
+          <a:off x="0" y="0"/>
+          <a:ext cx="0" cy="0"/>
+          <a:chOff x="0" y="0"/>
+          <a:chExt cx="0" cy="0"/>
+        </a:xfrm>
+      </p:grpSpPr>
+      <p:sp>
+        <p:nvSpPr>
+          <p:cNvPr id="2" name="Slide Image Placeholder 1"/>
+          <p:cNvSpPr>
+            <a:spLocks noGrp="1" noRot="1" noChangeAspect="1"/>
+          </p:cNvSpPr>
+          <p:nvPr>
+            <p:ph type="sldImg"/>
+          </p:nvPr>
+        </p:nvSpPr>
+        <p:spPr/>
+      </p:sp>
+      <p:sp>
+        <p:nvSpPr>
+          <p:cNvPr id="3" name="Notes Placeholder 2"/>
+          <p:cNvSpPr>
+            <a:spLocks noGrp="1"/>
+          </p:cNvSpPr>
+          <p:nvPr>
+            <p:ph type="body" idx="1"/>
+          </p:nvPr>
+        </p:nvSpPr>
+        <p:spPr/>
+        <p:txBody>
+          <a:bodyPr/>
+          <a:lstStyle/>
+          <a:p>
+            <a:r>
+              <a:rPr lang="en-US" dirty="0" smtClean="0"/>
+              <a:t>IIA – tells me</a:t>
+            </a:r>
+            <a:r>
+              <a:rPr lang="en-US" baseline="0" dirty="0" smtClean="0"/>
+              <a:t> if the index </a:t>
+            </a:r>
+            <a:r>
+              <a:rPr lang="en-US" baseline="0" dirty="0" err="1" smtClean="0"/>
+              <a:t>illumina</a:t>
+            </a:r>
+            <a:r>
+              <a:rPr lang="en-US" baseline="0" dirty="0" smtClean="0"/>
+              <a:t> has been ARCHIVED</a:t>
+            </a:r>
+          </a:p>
+          <a:p>
+            <a:endParaRPr lang="en-US" baseline="0" dirty="0" smtClean="0"/>
+          </a:p>
+          <a:p>
+            <a:r>
+              <a:rPr lang="en-US" baseline="0" dirty="0" smtClean="0"/>
+              <a:t>Archived to tape.  We don’t want to remove data if it hasn’t been put on tape</a:t>
+            </a:r>
+          </a:p>
+          <a:p>
+            <a:endParaRPr lang="en-US" baseline="0" dirty="0" smtClean="0"/>
+          </a:p>
+          <a:p>
+            <a:r>
+              <a:rPr lang="en-US" baseline="0" dirty="0" smtClean="0"/>
+              <a:t>There’s probably a simpler way to do this.  Convert to Boolean?</a:t>
+            </a:r>
+            <a:endParaRPr lang="en-US" dirty="0"/>
+          </a:p>
+        </p:txBody>
+      </p:sp>
+      <p:sp>
+        <p:nvSpPr>
+          <p:cNvPr id="4" name="Slide Number Placeholder 3"/>
+          <p:cNvSpPr>
+            <a:spLocks noGrp="1"/>
+          </p:cNvSpPr>
+          <p:nvPr>
+            <p:ph type="sldNum" sz="quarter" idx="10"/>
+          </p:nvPr>
+        </p:nvSpPr>
+        <p:spPr/>
+        <p:txBody>
+          <a:bodyPr/>
+          <a:lstStyle/>
+          <a:p>
+            <a:fld id="{F9BF1BD6-11A6-594E-AFA1-283323A41F72}" type="slidenum">
+              <a:rPr lang="en-US" smtClean="0"/>
+              <a:pPr/>
+              <a:t>20</a:t>
+            </a:fld>
+            <a:endParaRPr lang="en-US"/>
+          </a:p>
+        </p:txBody>
+      </p:sp>
+    </p:spTree>
+    <p:extLst>
+      <p:ext uri="{BB962C8B-B14F-4D97-AF65-F5344CB8AC3E}">
+        <p14:creationId xmlns:p14="http://schemas.microsoft.com/office/powerpoint/2010/main" val="1516585941"/>
       </p:ext>
     </p:extLst>
   </p:cSld>
@@ -914,7 +2018,19 @@
           <a:p>
             <a:r>
               <a:rPr lang="en-US" dirty="0" err="1" smtClean="0"/>
+              <a:t>Subquery</a:t>
+            </a:r>
+            <a:r>
+              <a:rPr lang="en-US" dirty="0" smtClean="0"/>
+              <a:t> – “correlated </a:t>
+            </a:r>
+            <a:r>
+              <a:rPr lang="en-US" dirty="0" err="1" smtClean="0"/>
               <a:t>subquery</a:t>
+            </a:r>
+            <a:r>
+              <a:rPr lang="en-US" dirty="0" smtClean="0"/>
+              <a:t>”</a:t>
             </a:r>
             <a:endParaRPr lang="en-US" dirty="0"/>
           </a:p>
@@ -948,6 +2064,99 @@
     <p:extLst>
       <p:ext uri="{BB962C8B-B14F-4D97-AF65-F5344CB8AC3E}">
         <p14:creationId xmlns:p14="http://schemas.microsoft.com/office/powerpoint/2010/main" val="4053370547"/>
+      </p:ext>
+    </p:extLst>
+  </p:cSld>
+  <p:clrMapOvr>
+    <a:masterClrMapping/>
+  </p:clrMapOvr>
+</p:notes>
+</file>
+
+<file path=ppt/notesSlides/notesSlide20.xml><?xml version="1.0" encoding="utf-8"?>
+<p:notes xmlns:a="http://schemas.openxmlformats.org/drawingml/2006/main" xmlns:r="http://schemas.openxmlformats.org/officeDocument/2006/relationships" xmlns:p="http://schemas.openxmlformats.org/presentationml/2006/main">
+  <p:cSld>
+    <p:spTree>
+      <p:nvGrpSpPr>
+        <p:cNvPr id="1" name=""/>
+        <p:cNvGrpSpPr/>
+        <p:nvPr/>
+      </p:nvGrpSpPr>
+      <p:grpSpPr>
+        <a:xfrm>
+          <a:off x="0" y="0"/>
+          <a:ext cx="0" cy="0"/>
+          <a:chOff x="0" y="0"/>
+          <a:chExt cx="0" cy="0"/>
+        </a:xfrm>
+      </p:grpSpPr>
+      <p:sp>
+        <p:nvSpPr>
+          <p:cNvPr id="2" name="Slide Image Placeholder 1"/>
+          <p:cNvSpPr>
+            <a:spLocks noGrp="1" noRot="1" noChangeAspect="1"/>
+          </p:cNvSpPr>
+          <p:nvPr>
+            <p:ph type="sldImg"/>
+          </p:nvPr>
+        </p:nvSpPr>
+        <p:spPr/>
+      </p:sp>
+      <p:sp>
+        <p:nvSpPr>
+          <p:cNvPr id="3" name="Notes Placeholder 2"/>
+          <p:cNvSpPr>
+            <a:spLocks noGrp="1"/>
+          </p:cNvSpPr>
+          <p:nvPr>
+            <p:ph type="body" idx="1"/>
+          </p:nvPr>
+        </p:nvSpPr>
+        <p:spPr/>
+        <p:txBody>
+          <a:bodyPr/>
+          <a:lstStyle/>
+          <a:p>
+            <a:r>
+              <a:rPr lang="en-US" dirty="0" smtClean="0"/>
+              <a:t>There are </a:t>
+            </a:r>
+            <a:r>
+              <a:rPr lang="en-US" smtClean="0"/>
+              <a:t>some references</a:t>
+            </a:r>
+            <a:endParaRPr lang="en-US"/>
+          </a:p>
+        </p:txBody>
+      </p:sp>
+      <p:sp>
+        <p:nvSpPr>
+          <p:cNvPr id="4" name="Slide Number Placeholder 3"/>
+          <p:cNvSpPr>
+            <a:spLocks noGrp="1"/>
+          </p:cNvSpPr>
+          <p:nvPr>
+            <p:ph type="sldNum" sz="quarter" idx="10"/>
+          </p:nvPr>
+        </p:nvSpPr>
+        <p:spPr/>
+        <p:txBody>
+          <a:bodyPr/>
+          <a:lstStyle/>
+          <a:p>
+            <a:fld id="{F9BF1BD6-11A6-594E-AFA1-283323A41F72}" type="slidenum">
+              <a:rPr lang="en-US" smtClean="0"/>
+              <a:pPr/>
+              <a:t>22</a:t>
+            </a:fld>
+            <a:endParaRPr lang="en-US"/>
+          </a:p>
+        </p:txBody>
+      </p:sp>
+    </p:spTree>
+    <p:extLst>
+      <p:ext uri="{BB962C8B-B14F-4D97-AF65-F5344CB8AC3E}">
+        <p14:creationId xmlns:p14="http://schemas.microsoft.com/office/powerpoint/2010/main" val="2200941546"/>
       </p:ext>
     </p:extLst>
   </p:cSld>
@@ -1181,7 +2390,18 @@
           <a:p>
             <a:r>
               <a:rPr lang="en-US" dirty="0" err="1" smtClean="0"/>
-              <a:t>subquery</a:t>
+              <a:t>Subquery</a:t>
+            </a:r>
+            <a:endParaRPr lang="en-US" dirty="0" smtClean="0"/>
+          </a:p>
+          <a:p>
+            <a:r>
+              <a:rPr lang="en-US" dirty="0" smtClean="0"/>
+              <a:t>Now we move on to some</a:t>
+            </a:r>
+            <a:r>
+              <a:rPr lang="en-US" baseline="0" dirty="0" smtClean="0"/>
+              <a:t> labels…</a:t>
             </a:r>
             <a:endParaRPr lang="en-US" dirty="0"/>
           </a:p>
@@ -1448,8 +2668,9 @@
           <a:p>
             <a:r>
               <a:rPr lang="en-US" dirty="0" smtClean="0"/>
-              <a:t>Label</a:t>
-            </a:r>
+              <a:t>Label – so when I come back to this to try to modify it I think</a:t>
+            </a:r>
+            <a:endParaRPr lang="en-US" dirty="0" smtClean="0"/>
           </a:p>
           <a:p>
             <a:r>
@@ -3758,7 +4979,11 @@
             </a:br>
             <a:r>
               <a:rPr lang="en-US" sz="1800" dirty="0" smtClean="0"/>
-              <a:t>some SQL explorations</a:t>
+              <a:t>some SQL </a:t>
+            </a:r>
+            <a:r>
+              <a:rPr lang="en-US" sz="1800" dirty="0" smtClean="0"/>
+              <a:t>clauses you may not have tried</a:t>
             </a:r>
             <a:endParaRPr lang="en-US" dirty="0"/>
           </a:p>
@@ -3982,14 +5207,7 @@
                 <a:latin typeface="Menlo Regular"/>
                 <a:cs typeface="Menlo Regular"/>
               </a:rPr>
-              <a:t> </a:t>
-            </a:r>
-            <a:r>
-              <a:rPr lang="en-US" dirty="0" smtClean="0">
-                <a:latin typeface="Menlo Regular"/>
-                <a:cs typeface="Menlo Regular"/>
-              </a:rPr>
-              <a:t>from foo join bar … join </a:t>
+              <a:t> from foo join bar … join </a:t>
             </a:r>
             <a:r>
               <a:rPr lang="en-US" dirty="0" err="1" smtClean="0">
@@ -4005,10 +5223,6 @@
               </a:rPr>
               <a:t> … join other …</a:t>
             </a:r>
-            <a:endParaRPr lang="en-US" dirty="0" smtClean="0">
-              <a:latin typeface="Menlo Regular"/>
-              <a:cs typeface="Menlo Regular"/>
-            </a:endParaRPr>
           </a:p>
           <a:p>
             <a:r>
@@ -4278,14 +5492,7 @@
                 <a:latin typeface="Menlo Regular"/>
                 <a:cs typeface="Menlo Regular"/>
               </a:rPr>
-              <a:t> </a:t>
-            </a:r>
-            <a:r>
-              <a:rPr lang="en-US" dirty="0" smtClean="0">
-                <a:latin typeface="Menlo Regular"/>
-                <a:cs typeface="Menlo Regular"/>
-              </a:rPr>
-              <a:t>from </a:t>
+              <a:t> from </a:t>
             </a:r>
             <a:r>
               <a:rPr lang="en-US" dirty="0" smtClean="0">
@@ -4338,10 +5545,6 @@
               </a:rPr>
               <a:t> … join other …</a:t>
             </a:r>
-            <a:endParaRPr lang="en-US" dirty="0" smtClean="0">
-              <a:latin typeface="Menlo Regular"/>
-              <a:cs typeface="Menlo Regular"/>
-            </a:endParaRPr>
           </a:p>
           <a:p>
             <a:r>
@@ -4446,192 +5649,969 @@
           <a:lstStyle/>
           <a:p>
             <a:r>
+              <a:rPr lang="en-US" dirty="0"/>
+              <a:t>w</a:t>
+            </a:r>
+            <a:r>
               <a:rPr lang="en-US" dirty="0" smtClean="0"/>
-              <a:t>SQL ‘using’ basics</a:t>
+              <a:t>ith </a:t>
+            </a:r>
+            <a:r>
+              <a:rPr lang="en-US" dirty="0" err="1" smtClean="0"/>
+              <a:t>iirl</a:t>
             </a:r>
             <a:endParaRPr lang="en-US" dirty="0"/>
           </a:p>
         </p:txBody>
       </p:sp>
-      <p:sp>
-        <p:nvSpPr>
-          <p:cNvPr id="3" name="Content Placeholder 2"/>
-          <p:cNvSpPr>
-            <a:spLocks noGrp="1"/>
-          </p:cNvSpPr>
+      <p:pic>
+        <p:nvPicPr>
+          <p:cNvPr id="4" name="Content Placeholder 3" descr="sql2-a.pdf"/>
+          <p:cNvPicPr>
+            <a:picLocks noGrp="1" noChangeAspect="1"/>
+          </p:cNvPicPr>
           <p:nvPr>
             <p:ph idx="1"/>
           </p:nvPr>
-        </p:nvSpPr>
+        </p:nvPicPr>
+        <p:blipFill>
+          <a:blip r:embed="rId3">
+            <a:extLst>
+              <a:ext uri="{28A0092B-C50C-407E-A947-70E740481C1C}">
+                <a14:useLocalDpi xmlns:a14="http://schemas.microsoft.com/office/drawing/2010/main" val="0"/>
+              </a:ext>
+            </a:extLst>
+          </a:blip>
+          <a:srcRect t="-75303" b="-75303"/>
+          <a:stretch>
+            <a:fillRect/>
+          </a:stretch>
+        </p:blipFill>
         <p:spPr/>
-        <p:txBody>
-          <a:bodyPr/>
-          <a:lstStyle/>
-          <a:p>
-            <a:pPr marL="0" indent="0">
-              <a:buNone/>
-            </a:pPr>
-            <a:r>
-              <a:rPr lang="en-US" dirty="0">
-                <a:latin typeface="Menlo Regular"/>
-                <a:cs typeface="Menlo Regular"/>
-              </a:rPr>
-              <a:t>s</a:t>
-            </a:r>
-            <a:r>
-              <a:rPr lang="en-US" dirty="0" smtClean="0">
-                <a:latin typeface="Menlo Regular"/>
-                <a:cs typeface="Menlo Regular"/>
-              </a:rPr>
-              <a:t>elect *</a:t>
-            </a:r>
-          </a:p>
-          <a:p>
-            <a:pPr marL="0" indent="0">
-              <a:buNone/>
-            </a:pPr>
-            <a:r>
-              <a:rPr lang="en-US" dirty="0" smtClean="0">
-                <a:latin typeface="Menlo Regular"/>
-                <a:cs typeface="Menlo Regular"/>
-              </a:rPr>
-              <a:t>	from a join b </a:t>
-            </a:r>
-            <a:r>
-              <a:rPr lang="en-US" dirty="0" smtClean="0">
-                <a:solidFill>
-                  <a:schemeClr val="accent6"/>
-                </a:solidFill>
-                <a:latin typeface="Menlo Regular"/>
-                <a:cs typeface="Menlo Regular"/>
-              </a:rPr>
-              <a:t>on </a:t>
-            </a:r>
-            <a:r>
-              <a:rPr lang="en-US" dirty="0" err="1" smtClean="0">
-                <a:solidFill>
-                  <a:schemeClr val="accent6"/>
-                </a:solidFill>
-                <a:latin typeface="Menlo Regular"/>
-                <a:cs typeface="Menlo Regular"/>
-              </a:rPr>
-              <a:t>a.id</a:t>
-            </a:r>
-            <a:r>
-              <a:rPr lang="en-US" dirty="0" smtClean="0">
-                <a:solidFill>
-                  <a:schemeClr val="accent6"/>
-                </a:solidFill>
-                <a:latin typeface="Menlo Regular"/>
-                <a:cs typeface="Menlo Regular"/>
-              </a:rPr>
-              <a:t> = </a:t>
-            </a:r>
-            <a:r>
-              <a:rPr lang="en-US" dirty="0" err="1" smtClean="0">
-                <a:solidFill>
-                  <a:schemeClr val="accent6"/>
-                </a:solidFill>
-                <a:latin typeface="Menlo Regular"/>
-                <a:cs typeface="Menlo Regular"/>
-              </a:rPr>
-              <a:t>b.id</a:t>
-            </a:r>
-            <a:endParaRPr lang="en-US" dirty="0" smtClean="0">
-              <a:solidFill>
-                <a:schemeClr val="accent6"/>
-              </a:solidFill>
-              <a:latin typeface="Menlo Regular"/>
-              <a:cs typeface="Menlo Regular"/>
-            </a:endParaRPr>
-          </a:p>
-          <a:p>
-            <a:pPr marL="0" indent="0">
-              <a:buNone/>
-            </a:pPr>
-            <a:endParaRPr lang="en-US" dirty="0">
-              <a:latin typeface="Menlo Regular"/>
-              <a:cs typeface="Menlo Regular"/>
-            </a:endParaRPr>
-          </a:p>
-          <a:p>
-            <a:pPr marL="0" indent="0">
-              <a:buNone/>
-            </a:pPr>
-            <a:endParaRPr lang="en-US" dirty="0" smtClean="0">
-              <a:latin typeface="Menlo Regular"/>
-              <a:cs typeface="Menlo Regular"/>
-            </a:endParaRPr>
-          </a:p>
-          <a:p>
-            <a:pPr marL="0" indent="0">
-              <a:buNone/>
-            </a:pPr>
-            <a:endParaRPr lang="en-US" dirty="0">
-              <a:latin typeface="Menlo Regular"/>
-              <a:cs typeface="Menlo Regular"/>
-            </a:endParaRPr>
-          </a:p>
-          <a:p>
-            <a:pPr marL="0" indent="0">
-              <a:buNone/>
-            </a:pPr>
-            <a:r>
-              <a:rPr lang="en-US" dirty="0">
-                <a:latin typeface="Menlo Regular"/>
-                <a:cs typeface="Menlo Regular"/>
-              </a:rPr>
-              <a:t>s</a:t>
-            </a:r>
-            <a:r>
-              <a:rPr lang="en-US" dirty="0" smtClean="0">
-                <a:latin typeface="Menlo Regular"/>
-                <a:cs typeface="Menlo Regular"/>
-              </a:rPr>
-              <a:t>elect *</a:t>
-            </a:r>
-          </a:p>
-          <a:p>
-            <a:pPr marL="0" indent="0">
-              <a:buNone/>
-            </a:pPr>
-            <a:r>
-              <a:rPr lang="en-US" dirty="0" smtClean="0">
-                <a:latin typeface="Menlo Regular"/>
-                <a:cs typeface="Menlo Regular"/>
-              </a:rPr>
-              <a:t>	from a join b </a:t>
-            </a:r>
-            <a:r>
-              <a:rPr lang="en-US" dirty="0" smtClean="0">
-                <a:solidFill>
-                  <a:schemeClr val="accent6"/>
-                </a:solidFill>
-                <a:latin typeface="Menlo Regular"/>
-                <a:cs typeface="Menlo Regular"/>
-              </a:rPr>
-              <a:t>using (id)</a:t>
-            </a:r>
-          </a:p>
-        </p:txBody>
-      </p:sp>
+      </p:pic>
     </p:spTree>
     <p:extLst>
       <p:ext uri="{BB962C8B-B14F-4D97-AF65-F5344CB8AC3E}">
-        <p14:creationId xmlns:p14="http://schemas.microsoft.com/office/powerpoint/2010/main" val="2760158243"/>
+        <p14:creationId xmlns:p14="http://schemas.microsoft.com/office/powerpoint/2010/main" val="2153266096"/>
       </p:ext>
     </p:extLst>
   </p:cSld>
   <p:clrMapOvr>
     <a:masterClrMapping/>
   </p:clrMapOvr>
-  <p:timing>
-    <p:tnLst>
-      <p:par>
-        <p:cTn xmlns:p14="http://schemas.microsoft.com/office/powerpoint/2010/main" id="1" dur="indefinite" restart="never" nodeType="tmRoot"/>
-      </p:par>
-    </p:tnLst>
-  </p:timing>
+</p:sld>
+</file>
+
+<file path=ppt/slides/slide13.xml><?xml version="1.0" encoding="utf-8"?>
+<p:sld xmlns:a="http://schemas.openxmlformats.org/drawingml/2006/main" xmlns:r="http://schemas.openxmlformats.org/officeDocument/2006/relationships" xmlns:p="http://schemas.openxmlformats.org/presentationml/2006/main">
+  <p:cSld>
+    <p:spTree>
+      <p:nvGrpSpPr>
+        <p:cNvPr id="1" name=""/>
+        <p:cNvGrpSpPr/>
+        <p:nvPr/>
+      </p:nvGrpSpPr>
+      <p:grpSpPr>
+        <a:xfrm>
+          <a:off x="0" y="0"/>
+          <a:ext cx="0" cy="0"/>
+          <a:chOff x="0" y="0"/>
+          <a:chExt cx="0" cy="0"/>
+        </a:xfrm>
+      </p:grpSpPr>
+      <p:sp>
+        <p:nvSpPr>
+          <p:cNvPr id="2" name="Title 1"/>
+          <p:cNvSpPr>
+            <a:spLocks noGrp="1"/>
+          </p:cNvSpPr>
+          <p:nvPr>
+            <p:ph type="title"/>
+          </p:nvPr>
+        </p:nvSpPr>
+        <p:spPr/>
+        <p:txBody>
+          <a:bodyPr/>
+          <a:lstStyle/>
+          <a:p>
+            <a:r>
+              <a:rPr lang="en-US" dirty="0"/>
+              <a:t>w</a:t>
+            </a:r>
+            <a:r>
+              <a:rPr lang="en-US" dirty="0" smtClean="0"/>
+              <a:t>ith </a:t>
+            </a:r>
+            <a:r>
+              <a:rPr lang="en-US" dirty="0" err="1" smtClean="0"/>
+              <a:t>iib</a:t>
+            </a:r>
+            <a:endParaRPr lang="en-US" dirty="0"/>
+          </a:p>
+        </p:txBody>
+      </p:sp>
+      <p:pic>
+        <p:nvPicPr>
+          <p:cNvPr id="4" name="Content Placeholder 3" descr="sql2-b.pdf"/>
+          <p:cNvPicPr>
+            <a:picLocks noGrp="1" noChangeAspect="1"/>
+          </p:cNvPicPr>
+          <p:nvPr>
+            <p:ph idx="1"/>
+          </p:nvPr>
+        </p:nvPicPr>
+        <p:blipFill>
+          <a:blip r:embed="rId3">
+            <a:extLst>
+              <a:ext uri="{28A0092B-C50C-407E-A947-70E740481C1C}">
+                <a14:useLocalDpi xmlns:a14="http://schemas.microsoft.com/office/drawing/2010/main" val="0"/>
+              </a:ext>
+            </a:extLst>
+          </a:blip>
+          <a:srcRect t="-45637" b="-45637"/>
+          <a:stretch>
+            <a:fillRect/>
+          </a:stretch>
+        </p:blipFill>
+        <p:spPr/>
+      </p:pic>
+    </p:spTree>
+    <p:extLst>
+      <p:ext uri="{BB962C8B-B14F-4D97-AF65-F5344CB8AC3E}">
+        <p14:creationId xmlns:p14="http://schemas.microsoft.com/office/powerpoint/2010/main" val="308796947"/>
+      </p:ext>
+    </p:extLst>
+  </p:cSld>
+  <p:clrMapOvr>
+    <a:masterClrMapping/>
+  </p:clrMapOvr>
+</p:sld>
+</file>
+
+<file path=ppt/slides/slide14.xml><?xml version="1.0" encoding="utf-8"?>
+<p:sld xmlns:a="http://schemas.openxmlformats.org/drawingml/2006/main" xmlns:r="http://schemas.openxmlformats.org/officeDocument/2006/relationships" xmlns:p="http://schemas.openxmlformats.org/presentationml/2006/main">
+  <p:cSld>
+    <p:spTree>
+      <p:nvGrpSpPr>
+        <p:cNvPr id="1" name=""/>
+        <p:cNvGrpSpPr/>
+        <p:nvPr/>
+      </p:nvGrpSpPr>
+      <p:grpSpPr>
+        <a:xfrm>
+          <a:off x="0" y="0"/>
+          <a:ext cx="0" cy="0"/>
+          <a:chOff x="0" y="0"/>
+          <a:chExt cx="0" cy="0"/>
+        </a:xfrm>
+      </p:grpSpPr>
+      <p:sp>
+        <p:nvSpPr>
+          <p:cNvPr id="2" name="Title 1"/>
+          <p:cNvSpPr>
+            <a:spLocks noGrp="1"/>
+          </p:cNvSpPr>
+          <p:nvPr>
+            <p:ph type="title"/>
+          </p:nvPr>
+        </p:nvSpPr>
+        <p:spPr/>
+        <p:txBody>
+          <a:bodyPr/>
+          <a:lstStyle/>
+          <a:p>
+            <a:r>
+              <a:rPr lang="en-US" dirty="0"/>
+              <a:t>w</a:t>
+            </a:r>
+            <a:r>
+              <a:rPr lang="en-US" dirty="0" smtClean="0"/>
+              <a:t>ith </a:t>
+            </a:r>
+            <a:r>
+              <a:rPr lang="en-US" dirty="0" err="1" smtClean="0"/>
+              <a:t>iib</a:t>
+            </a:r>
+            <a:endParaRPr lang="en-US" dirty="0"/>
+          </a:p>
+        </p:txBody>
+      </p:sp>
+      <p:pic>
+        <p:nvPicPr>
+          <p:cNvPr id="4" name="Content Placeholder 3" descr="sql2-b.pdf"/>
+          <p:cNvPicPr>
+            <a:picLocks noGrp="1" noChangeAspect="1"/>
+          </p:cNvPicPr>
+          <p:nvPr>
+            <p:ph idx="1"/>
+          </p:nvPr>
+        </p:nvPicPr>
+        <p:blipFill>
+          <a:blip r:embed="rId3">
+            <a:extLst>
+              <a:ext uri="{28A0092B-C50C-407E-A947-70E740481C1C}">
+                <a14:useLocalDpi xmlns:a14="http://schemas.microsoft.com/office/drawing/2010/main" val="0"/>
+              </a:ext>
+            </a:extLst>
+          </a:blip>
+          <a:srcRect t="-45637" b="-45637"/>
+          <a:stretch>
+            <a:fillRect/>
+          </a:stretch>
+        </p:blipFill>
+        <p:spPr/>
+      </p:pic>
+      <p:sp>
+        <p:nvSpPr>
+          <p:cNvPr id="3" name="Rectangle 2"/>
+          <p:cNvSpPr/>
+          <p:nvPr/>
+        </p:nvSpPr>
+        <p:spPr>
+          <a:xfrm>
+            <a:off x="2241859" y="3369069"/>
+            <a:ext cx="609060" cy="349865"/>
+          </a:xfrm>
+          <a:prstGeom prst="rect">
+            <a:avLst/>
+          </a:prstGeom>
+          <a:solidFill>
+            <a:srgbClr val="FFFF00">
+              <a:alpha val="28000"/>
+            </a:srgbClr>
+          </a:solidFill>
+        </p:spPr>
+        <p:style>
+          <a:lnRef idx="1">
+            <a:schemeClr val="accent1"/>
+          </a:lnRef>
+          <a:fillRef idx="3">
+            <a:schemeClr val="accent1"/>
+          </a:fillRef>
+          <a:effectRef idx="2">
+            <a:schemeClr val="accent1"/>
+          </a:effectRef>
+          <a:fontRef idx="minor">
+            <a:schemeClr val="lt1"/>
+          </a:fontRef>
+        </p:style>
+        <p:txBody>
+          <a:bodyPr rtlCol="0" anchor="ctr"/>
+          <a:lstStyle/>
+          <a:p>
+            <a:pPr algn="ctr"/>
+            <a:endParaRPr lang="en-US"/>
+          </a:p>
+        </p:txBody>
+      </p:sp>
+      <p:sp>
+        <p:nvSpPr>
+          <p:cNvPr id="5" name="Rectangle 4"/>
+          <p:cNvSpPr/>
+          <p:nvPr/>
+        </p:nvSpPr>
+        <p:spPr>
+          <a:xfrm>
+            <a:off x="2850919" y="4198379"/>
+            <a:ext cx="570184" cy="298033"/>
+          </a:xfrm>
+          <a:prstGeom prst="rect">
+            <a:avLst/>
+          </a:prstGeom>
+          <a:solidFill>
+            <a:srgbClr val="FFFF00">
+              <a:alpha val="36000"/>
+            </a:srgbClr>
+          </a:solidFill>
+        </p:spPr>
+        <p:style>
+          <a:lnRef idx="1">
+            <a:schemeClr val="accent1"/>
+          </a:lnRef>
+          <a:fillRef idx="3">
+            <a:schemeClr val="accent1"/>
+          </a:fillRef>
+          <a:effectRef idx="2">
+            <a:schemeClr val="accent1"/>
+          </a:effectRef>
+          <a:fontRef idx="minor">
+            <a:schemeClr val="lt1"/>
+          </a:fontRef>
+        </p:style>
+        <p:txBody>
+          <a:bodyPr rtlCol="0" anchor="ctr"/>
+          <a:lstStyle/>
+          <a:p>
+            <a:pPr algn="ctr"/>
+            <a:endParaRPr lang="en-US"/>
+          </a:p>
+        </p:txBody>
+      </p:sp>
+      <p:sp>
+        <p:nvSpPr>
+          <p:cNvPr id="6" name="Rectangle 5"/>
+          <p:cNvSpPr/>
+          <p:nvPr/>
+        </p:nvSpPr>
+        <p:spPr>
+          <a:xfrm>
+            <a:off x="3965370" y="4198379"/>
+            <a:ext cx="596101" cy="298033"/>
+          </a:xfrm>
+          <a:prstGeom prst="rect">
+            <a:avLst/>
+          </a:prstGeom>
+          <a:solidFill>
+            <a:srgbClr val="FFFF00">
+              <a:alpha val="41000"/>
+            </a:srgbClr>
+          </a:solidFill>
+        </p:spPr>
+        <p:style>
+          <a:lnRef idx="1">
+            <a:schemeClr val="accent1"/>
+          </a:lnRef>
+          <a:fillRef idx="3">
+            <a:schemeClr val="accent1"/>
+          </a:fillRef>
+          <a:effectRef idx="2">
+            <a:schemeClr val="accent1"/>
+          </a:effectRef>
+          <a:fontRef idx="minor">
+            <a:schemeClr val="lt1"/>
+          </a:fontRef>
+        </p:style>
+        <p:txBody>
+          <a:bodyPr rtlCol="0" anchor="ctr"/>
+          <a:lstStyle/>
+          <a:p>
+            <a:pPr algn="ctr"/>
+            <a:endParaRPr lang="en-US"/>
+          </a:p>
+        </p:txBody>
+      </p:sp>
+    </p:spTree>
+    <p:extLst>
+      <p:ext uri="{BB962C8B-B14F-4D97-AF65-F5344CB8AC3E}">
+        <p14:creationId xmlns:p14="http://schemas.microsoft.com/office/powerpoint/2010/main" val="425270099"/>
+      </p:ext>
+    </p:extLst>
+  </p:cSld>
+  <p:clrMapOvr>
+    <a:masterClrMapping/>
+  </p:clrMapOvr>
+</p:sld>
+</file>
+
+<file path=ppt/slides/slide15.xml><?xml version="1.0" encoding="utf-8"?>
+<p:sld xmlns:a="http://schemas.openxmlformats.org/drawingml/2006/main" xmlns:r="http://schemas.openxmlformats.org/officeDocument/2006/relationships" xmlns:p="http://schemas.openxmlformats.org/presentationml/2006/main">
+  <p:cSld>
+    <p:spTree>
+      <p:nvGrpSpPr>
+        <p:cNvPr id="1" name=""/>
+        <p:cNvGrpSpPr/>
+        <p:nvPr/>
+      </p:nvGrpSpPr>
+      <p:grpSpPr>
+        <a:xfrm>
+          <a:off x="0" y="0"/>
+          <a:ext cx="0" cy="0"/>
+          <a:chOff x="0" y="0"/>
+          <a:chExt cx="0" cy="0"/>
+        </a:xfrm>
+      </p:grpSpPr>
+      <p:sp>
+        <p:nvSpPr>
+          <p:cNvPr id="2" name="Title 1"/>
+          <p:cNvSpPr>
+            <a:spLocks noGrp="1"/>
+          </p:cNvSpPr>
+          <p:nvPr>
+            <p:ph type="title"/>
+          </p:nvPr>
+        </p:nvSpPr>
+        <p:spPr/>
+        <p:txBody>
+          <a:bodyPr/>
+          <a:lstStyle/>
+          <a:p>
+            <a:r>
+              <a:rPr lang="en-US" dirty="0"/>
+              <a:t>w</a:t>
+            </a:r>
+            <a:r>
+              <a:rPr lang="en-US" dirty="0" smtClean="0"/>
+              <a:t>ith </a:t>
+            </a:r>
+            <a:r>
+              <a:rPr lang="en-US" dirty="0" err="1" smtClean="0"/>
+              <a:t>iid</a:t>
+            </a:r>
+            <a:endParaRPr lang="en-US" dirty="0"/>
+          </a:p>
+        </p:txBody>
+      </p:sp>
+      <p:pic>
+        <p:nvPicPr>
+          <p:cNvPr id="4" name="Content Placeholder 3" descr="sql2-c.pdf"/>
+          <p:cNvPicPr>
+            <a:picLocks noGrp="1" noChangeAspect="1"/>
+          </p:cNvPicPr>
+          <p:nvPr>
+            <p:ph idx="1"/>
+          </p:nvPr>
+        </p:nvPicPr>
+        <p:blipFill>
+          <a:blip r:embed="rId3">
+            <a:extLst>
+              <a:ext uri="{28A0092B-C50C-407E-A947-70E740481C1C}">
+                <a14:useLocalDpi xmlns:a14="http://schemas.microsoft.com/office/drawing/2010/main" val="0"/>
+              </a:ext>
+            </a:extLst>
+          </a:blip>
+          <a:srcRect t="-34945" b="-34945"/>
+          <a:stretch>
+            <a:fillRect/>
+          </a:stretch>
+        </p:blipFill>
+        <p:spPr/>
+      </p:pic>
+    </p:spTree>
+    <p:extLst>
+      <p:ext uri="{BB962C8B-B14F-4D97-AF65-F5344CB8AC3E}">
+        <p14:creationId xmlns:p14="http://schemas.microsoft.com/office/powerpoint/2010/main" val="717611663"/>
+      </p:ext>
+    </p:extLst>
+  </p:cSld>
+  <p:clrMapOvr>
+    <a:masterClrMapping/>
+  </p:clrMapOvr>
+</p:sld>
+</file>
+
+<file path=ppt/slides/slide16.xml><?xml version="1.0" encoding="utf-8"?>
+<p:sld xmlns:a="http://schemas.openxmlformats.org/drawingml/2006/main" xmlns:r="http://schemas.openxmlformats.org/officeDocument/2006/relationships" xmlns:p="http://schemas.openxmlformats.org/presentationml/2006/main">
+  <p:cSld>
+    <p:spTree>
+      <p:nvGrpSpPr>
+        <p:cNvPr id="1" name=""/>
+        <p:cNvGrpSpPr/>
+        <p:nvPr/>
+      </p:nvGrpSpPr>
+      <p:grpSpPr>
+        <a:xfrm>
+          <a:off x="0" y="0"/>
+          <a:ext cx="0" cy="0"/>
+          <a:chOff x="0" y="0"/>
+          <a:chExt cx="0" cy="0"/>
+        </a:xfrm>
+      </p:grpSpPr>
+      <p:sp>
+        <p:nvSpPr>
+          <p:cNvPr id="2" name="Title 1"/>
+          <p:cNvSpPr>
+            <a:spLocks noGrp="1"/>
+          </p:cNvSpPr>
+          <p:nvPr>
+            <p:ph type="title"/>
+          </p:nvPr>
+        </p:nvSpPr>
+        <p:spPr/>
+        <p:txBody>
+          <a:bodyPr/>
+          <a:lstStyle/>
+          <a:p>
+            <a:r>
+              <a:rPr lang="en-US" dirty="0"/>
+              <a:t>w</a:t>
+            </a:r>
+            <a:r>
+              <a:rPr lang="en-US" dirty="0" smtClean="0"/>
+              <a:t>ith </a:t>
+            </a:r>
+            <a:r>
+              <a:rPr lang="en-US" dirty="0" err="1" smtClean="0"/>
+              <a:t>iid</a:t>
+            </a:r>
+            <a:endParaRPr lang="en-US" dirty="0"/>
+          </a:p>
+        </p:txBody>
+      </p:sp>
+      <p:pic>
+        <p:nvPicPr>
+          <p:cNvPr id="4" name="Content Placeholder 3" descr="sql2-c.pdf"/>
+          <p:cNvPicPr>
+            <a:picLocks noGrp="1" noChangeAspect="1"/>
+          </p:cNvPicPr>
+          <p:nvPr>
+            <p:ph idx="1"/>
+          </p:nvPr>
+        </p:nvPicPr>
+        <p:blipFill>
+          <a:blip r:embed="rId3">
+            <a:extLst>
+              <a:ext uri="{28A0092B-C50C-407E-A947-70E740481C1C}">
+                <a14:useLocalDpi xmlns:a14="http://schemas.microsoft.com/office/drawing/2010/main" val="0"/>
+              </a:ext>
+            </a:extLst>
+          </a:blip>
+          <a:srcRect t="-34945" b="-34945"/>
+          <a:stretch>
+            <a:fillRect/>
+          </a:stretch>
+        </p:blipFill>
+        <p:spPr/>
+      </p:pic>
+      <p:sp>
+        <p:nvSpPr>
+          <p:cNvPr id="3" name="Rectangle 2"/>
+          <p:cNvSpPr/>
+          <p:nvPr/>
+        </p:nvSpPr>
+        <p:spPr>
+          <a:xfrm>
+            <a:off x="1788304" y="3317238"/>
+            <a:ext cx="7074482" cy="1179174"/>
+          </a:xfrm>
+          <a:prstGeom prst="rect">
+            <a:avLst/>
+          </a:prstGeom>
+          <a:solidFill>
+            <a:srgbClr val="FFFF00">
+              <a:alpha val="41000"/>
+            </a:srgbClr>
+          </a:solidFill>
+        </p:spPr>
+        <p:style>
+          <a:lnRef idx="1">
+            <a:schemeClr val="accent1"/>
+          </a:lnRef>
+          <a:fillRef idx="3">
+            <a:schemeClr val="accent1"/>
+          </a:fillRef>
+          <a:effectRef idx="2">
+            <a:schemeClr val="accent1"/>
+          </a:effectRef>
+          <a:fontRef idx="minor">
+            <a:schemeClr val="lt1"/>
+          </a:fontRef>
+        </p:style>
+        <p:txBody>
+          <a:bodyPr rtlCol="0" anchor="ctr"/>
+          <a:lstStyle/>
+          <a:p>
+            <a:pPr algn="ctr"/>
+            <a:endParaRPr lang="en-US"/>
+          </a:p>
+        </p:txBody>
+      </p:sp>
+    </p:spTree>
+    <p:extLst>
+      <p:ext uri="{BB962C8B-B14F-4D97-AF65-F5344CB8AC3E}">
+        <p14:creationId xmlns:p14="http://schemas.microsoft.com/office/powerpoint/2010/main" val="435095056"/>
+      </p:ext>
+    </p:extLst>
+  </p:cSld>
+  <p:clrMapOvr>
+    <a:masterClrMapping/>
+  </p:clrMapOvr>
+</p:sld>
+</file>
+
+<file path=ppt/slides/slide17.xml><?xml version="1.0" encoding="utf-8"?>
+<p:sld xmlns:a="http://schemas.openxmlformats.org/drawingml/2006/main" xmlns:r="http://schemas.openxmlformats.org/officeDocument/2006/relationships" xmlns:p="http://schemas.openxmlformats.org/presentationml/2006/main">
+  <p:cSld>
+    <p:spTree>
+      <p:nvGrpSpPr>
+        <p:cNvPr id="1" name=""/>
+        <p:cNvGrpSpPr/>
+        <p:nvPr/>
+      </p:nvGrpSpPr>
+      <p:grpSpPr>
+        <a:xfrm>
+          <a:off x="0" y="0"/>
+          <a:ext cx="0" cy="0"/>
+          <a:chOff x="0" y="0"/>
+          <a:chExt cx="0" cy="0"/>
+        </a:xfrm>
+      </p:grpSpPr>
+      <p:sp>
+        <p:nvSpPr>
+          <p:cNvPr id="2" name="Title 1"/>
+          <p:cNvSpPr>
+            <a:spLocks noGrp="1"/>
+          </p:cNvSpPr>
+          <p:nvPr>
+            <p:ph type="title"/>
+          </p:nvPr>
+        </p:nvSpPr>
+        <p:spPr/>
+        <p:txBody>
+          <a:bodyPr/>
+          <a:lstStyle/>
+          <a:p>
+            <a:r>
+              <a:rPr lang="en-US" dirty="0"/>
+              <a:t>w</a:t>
+            </a:r>
+            <a:r>
+              <a:rPr lang="en-US" dirty="0" smtClean="0"/>
+              <a:t>ith </a:t>
+            </a:r>
+            <a:r>
+              <a:rPr lang="en-US" dirty="0" err="1" smtClean="0"/>
+              <a:t>iid</a:t>
+            </a:r>
+            <a:endParaRPr lang="en-US" dirty="0"/>
+          </a:p>
+        </p:txBody>
+      </p:sp>
+      <p:pic>
+        <p:nvPicPr>
+          <p:cNvPr id="4" name="Content Placeholder 3" descr="sql2-c.pdf"/>
+          <p:cNvPicPr>
+            <a:picLocks noGrp="1" noChangeAspect="1"/>
+          </p:cNvPicPr>
+          <p:nvPr>
+            <p:ph idx="1"/>
+          </p:nvPr>
+        </p:nvPicPr>
+        <p:blipFill>
+          <a:blip r:embed="rId3">
+            <a:extLst>
+              <a:ext uri="{28A0092B-C50C-407E-A947-70E740481C1C}">
+                <a14:useLocalDpi xmlns:a14="http://schemas.microsoft.com/office/drawing/2010/main" val="0"/>
+              </a:ext>
+            </a:extLst>
+          </a:blip>
+          <a:srcRect t="-34945" b="-34945"/>
+          <a:stretch>
+            <a:fillRect/>
+          </a:stretch>
+        </p:blipFill>
+        <p:spPr/>
+      </p:pic>
+      <p:sp>
+        <p:nvSpPr>
+          <p:cNvPr id="3" name="Rectangle 2"/>
+          <p:cNvSpPr/>
+          <p:nvPr/>
+        </p:nvSpPr>
+        <p:spPr>
+          <a:xfrm>
+            <a:off x="1788304" y="3317238"/>
+            <a:ext cx="7074482" cy="1179174"/>
+          </a:xfrm>
+          <a:prstGeom prst="rect">
+            <a:avLst/>
+          </a:prstGeom>
+          <a:solidFill>
+            <a:srgbClr val="FFFF00">
+              <a:alpha val="41000"/>
+            </a:srgbClr>
+          </a:solidFill>
+        </p:spPr>
+        <p:style>
+          <a:lnRef idx="1">
+            <a:schemeClr val="accent1"/>
+          </a:lnRef>
+          <a:fillRef idx="3">
+            <a:schemeClr val="accent1"/>
+          </a:fillRef>
+          <a:effectRef idx="2">
+            <a:schemeClr val="accent1"/>
+          </a:effectRef>
+          <a:fontRef idx="minor">
+            <a:schemeClr val="lt1"/>
+          </a:fontRef>
+        </p:style>
+        <p:txBody>
+          <a:bodyPr rtlCol="0" anchor="ctr"/>
+          <a:lstStyle/>
+          <a:p>
+            <a:pPr algn="ctr"/>
+            <a:endParaRPr lang="en-US"/>
+          </a:p>
+        </p:txBody>
+      </p:sp>
+      <p:sp>
+        <p:nvSpPr>
+          <p:cNvPr id="5" name="Rectangle 4"/>
+          <p:cNvSpPr/>
+          <p:nvPr/>
+        </p:nvSpPr>
+        <p:spPr>
+          <a:xfrm>
+            <a:off x="1788304" y="4496412"/>
+            <a:ext cx="3822824" cy="310991"/>
+          </a:xfrm>
+          <a:prstGeom prst="rect">
+            <a:avLst/>
+          </a:prstGeom>
+          <a:solidFill>
+            <a:srgbClr val="FF6600">
+              <a:alpha val="36000"/>
+            </a:srgbClr>
+          </a:solidFill>
+        </p:spPr>
+        <p:style>
+          <a:lnRef idx="1">
+            <a:schemeClr val="accent1"/>
+          </a:lnRef>
+          <a:fillRef idx="3">
+            <a:schemeClr val="accent1"/>
+          </a:fillRef>
+          <a:effectRef idx="2">
+            <a:schemeClr val="accent1"/>
+          </a:effectRef>
+          <a:fontRef idx="minor">
+            <a:schemeClr val="lt1"/>
+          </a:fontRef>
+        </p:style>
+        <p:txBody>
+          <a:bodyPr rtlCol="0" anchor="ctr"/>
+          <a:lstStyle/>
+          <a:p>
+            <a:pPr algn="ctr"/>
+            <a:endParaRPr lang="en-US"/>
+          </a:p>
+        </p:txBody>
+      </p:sp>
+    </p:spTree>
+    <p:extLst>
+      <p:ext uri="{BB962C8B-B14F-4D97-AF65-F5344CB8AC3E}">
+        <p14:creationId xmlns:p14="http://schemas.microsoft.com/office/powerpoint/2010/main" val="1456706971"/>
+      </p:ext>
+    </p:extLst>
+  </p:cSld>
+  <p:clrMapOvr>
+    <a:masterClrMapping/>
+  </p:clrMapOvr>
+</p:sld>
+</file>
+
+<file path=ppt/slides/slide18.xml><?xml version="1.0" encoding="utf-8"?>
+<p:sld xmlns:a="http://schemas.openxmlformats.org/drawingml/2006/main" xmlns:r="http://schemas.openxmlformats.org/officeDocument/2006/relationships" xmlns:p="http://schemas.openxmlformats.org/presentationml/2006/main">
+  <p:cSld>
+    <p:spTree>
+      <p:nvGrpSpPr>
+        <p:cNvPr id="1" name=""/>
+        <p:cNvGrpSpPr/>
+        <p:nvPr/>
+      </p:nvGrpSpPr>
+      <p:grpSpPr>
+        <a:xfrm>
+          <a:off x="0" y="0"/>
+          <a:ext cx="0" cy="0"/>
+          <a:chOff x="0" y="0"/>
+          <a:chExt cx="0" cy="0"/>
+        </a:xfrm>
+      </p:grpSpPr>
+      <p:sp>
+        <p:nvSpPr>
+          <p:cNvPr id="2" name="Title 1"/>
+          <p:cNvSpPr>
+            <a:spLocks noGrp="1"/>
+          </p:cNvSpPr>
+          <p:nvPr>
+            <p:ph type="title"/>
+          </p:nvPr>
+        </p:nvSpPr>
+        <p:spPr/>
+        <p:txBody>
+          <a:bodyPr/>
+          <a:lstStyle/>
+          <a:p>
+            <a:r>
+              <a:rPr lang="en-US" dirty="0"/>
+              <a:t>w</a:t>
+            </a:r>
+            <a:r>
+              <a:rPr lang="en-US" dirty="0" smtClean="0"/>
+              <a:t>ith </a:t>
+            </a:r>
+            <a:r>
+              <a:rPr lang="en-US" dirty="0" err="1" smtClean="0"/>
+              <a:t>iim</a:t>
+            </a:r>
+            <a:endParaRPr lang="en-US" dirty="0"/>
+          </a:p>
+        </p:txBody>
+      </p:sp>
+      <p:pic>
+        <p:nvPicPr>
+          <p:cNvPr id="4" name="Content Placeholder 3" descr="sql2-d.pdf"/>
+          <p:cNvPicPr>
+            <a:picLocks noGrp="1" noChangeAspect="1"/>
+          </p:cNvPicPr>
+          <p:nvPr>
+            <p:ph idx="1"/>
+          </p:nvPr>
+        </p:nvPicPr>
+        <p:blipFill>
+          <a:blip r:embed="rId3">
+            <a:extLst>
+              <a:ext uri="{28A0092B-C50C-407E-A947-70E740481C1C}">
+                <a14:useLocalDpi xmlns:a14="http://schemas.microsoft.com/office/drawing/2010/main" val="0"/>
+              </a:ext>
+            </a:extLst>
+          </a:blip>
+          <a:srcRect t="-270667" b="-270667"/>
+          <a:stretch>
+            <a:fillRect/>
+          </a:stretch>
+        </p:blipFill>
+        <p:spPr>
+          <a:xfrm>
+            <a:off x="227013" y="1016000"/>
+            <a:ext cx="8636000" cy="5121275"/>
+          </a:xfrm>
+        </p:spPr>
+      </p:pic>
+    </p:spTree>
+    <p:extLst>
+      <p:ext uri="{BB962C8B-B14F-4D97-AF65-F5344CB8AC3E}">
+        <p14:creationId xmlns:p14="http://schemas.microsoft.com/office/powerpoint/2010/main" val="3961388085"/>
+      </p:ext>
+    </p:extLst>
+  </p:cSld>
+  <p:clrMapOvr>
+    <a:masterClrMapping/>
+  </p:clrMapOvr>
+</p:sld>
+</file>
+
+<file path=ppt/slides/slide19.xml><?xml version="1.0" encoding="utf-8"?>
+<p:sld xmlns:a="http://schemas.openxmlformats.org/drawingml/2006/main" xmlns:r="http://schemas.openxmlformats.org/officeDocument/2006/relationships" xmlns:p="http://schemas.openxmlformats.org/presentationml/2006/main">
+  <p:cSld>
+    <p:spTree>
+      <p:nvGrpSpPr>
+        <p:cNvPr id="1" name=""/>
+        <p:cNvGrpSpPr/>
+        <p:nvPr/>
+      </p:nvGrpSpPr>
+      <p:grpSpPr>
+        <a:xfrm>
+          <a:off x="0" y="0"/>
+          <a:ext cx="0" cy="0"/>
+          <a:chOff x="0" y="0"/>
+          <a:chExt cx="0" cy="0"/>
+        </a:xfrm>
+      </p:grpSpPr>
+      <p:sp>
+        <p:nvSpPr>
+          <p:cNvPr id="2" name="Title 1"/>
+          <p:cNvSpPr>
+            <a:spLocks noGrp="1"/>
+          </p:cNvSpPr>
+          <p:nvPr>
+            <p:ph type="title"/>
+          </p:nvPr>
+        </p:nvSpPr>
+        <p:spPr/>
+        <p:txBody>
+          <a:bodyPr/>
+          <a:lstStyle/>
+          <a:p>
+            <a:r>
+              <a:rPr lang="en-US" dirty="0"/>
+              <a:t>w</a:t>
+            </a:r>
+            <a:r>
+              <a:rPr lang="en-US" dirty="0" smtClean="0"/>
+              <a:t>ith </a:t>
+            </a:r>
+            <a:r>
+              <a:rPr lang="en-US" dirty="0" err="1" smtClean="0"/>
+              <a:t>iim</a:t>
+            </a:r>
+            <a:endParaRPr lang="en-US" dirty="0"/>
+          </a:p>
+        </p:txBody>
+      </p:sp>
+      <p:pic>
+        <p:nvPicPr>
+          <p:cNvPr id="4" name="Content Placeholder 3" descr="sql2-d.pdf"/>
+          <p:cNvPicPr>
+            <a:picLocks noGrp="1" noChangeAspect="1"/>
+          </p:cNvPicPr>
+          <p:nvPr>
+            <p:ph idx="1"/>
+          </p:nvPr>
+        </p:nvPicPr>
+        <p:blipFill>
+          <a:blip r:embed="rId3">
+            <a:extLst>
+              <a:ext uri="{28A0092B-C50C-407E-A947-70E740481C1C}">
+                <a14:useLocalDpi xmlns:a14="http://schemas.microsoft.com/office/drawing/2010/main" val="0"/>
+              </a:ext>
+            </a:extLst>
+          </a:blip>
+          <a:srcRect t="-270667" b="-270667"/>
+          <a:stretch>
+            <a:fillRect/>
+          </a:stretch>
+        </p:blipFill>
+        <p:spPr>
+          <a:xfrm>
+            <a:off x="227013" y="1016000"/>
+            <a:ext cx="8636000" cy="5121275"/>
+          </a:xfrm>
+        </p:spPr>
+      </p:pic>
+      <p:sp>
+        <p:nvSpPr>
+          <p:cNvPr id="3" name="Rectangle 2"/>
+          <p:cNvSpPr/>
+          <p:nvPr/>
+        </p:nvSpPr>
+        <p:spPr>
+          <a:xfrm>
+            <a:off x="8358377" y="3407943"/>
+            <a:ext cx="311010" cy="246202"/>
+          </a:xfrm>
+          <a:prstGeom prst="rect">
+            <a:avLst/>
+          </a:prstGeom>
+          <a:solidFill>
+            <a:srgbClr val="FFFF00">
+              <a:alpha val="39000"/>
+            </a:srgbClr>
+          </a:solidFill>
+        </p:spPr>
+        <p:style>
+          <a:lnRef idx="1">
+            <a:schemeClr val="accent1"/>
+          </a:lnRef>
+          <a:fillRef idx="3">
+            <a:schemeClr val="accent1"/>
+          </a:fillRef>
+          <a:effectRef idx="2">
+            <a:schemeClr val="accent1"/>
+          </a:effectRef>
+          <a:fontRef idx="minor">
+            <a:schemeClr val="lt1"/>
+          </a:fontRef>
+        </p:style>
+        <p:txBody>
+          <a:bodyPr rtlCol="0" anchor="ctr"/>
+          <a:lstStyle/>
+          <a:p>
+            <a:pPr algn="ctr"/>
+            <a:endParaRPr lang="en-US"/>
+          </a:p>
+        </p:txBody>
+      </p:sp>
+    </p:spTree>
+    <p:extLst>
+      <p:ext uri="{BB962C8B-B14F-4D97-AF65-F5344CB8AC3E}">
+        <p14:creationId xmlns:p14="http://schemas.microsoft.com/office/powerpoint/2010/main" val="132860817"/>
+      </p:ext>
+    </p:extLst>
+  </p:cSld>
+  <p:clrMapOvr>
+    <a:masterClrMapping/>
+  </p:clrMapOvr>
 </p:sld>
 </file>
 
@@ -4707,6 +6687,681 @@
     <p:extLst>
       <p:ext uri="{BB962C8B-B14F-4D97-AF65-F5344CB8AC3E}">
         <p14:creationId xmlns:p14="http://schemas.microsoft.com/office/powerpoint/2010/main" val="483877640"/>
+      </p:ext>
+    </p:extLst>
+  </p:cSld>
+  <p:clrMapOvr>
+    <a:masterClrMapping/>
+  </p:clrMapOvr>
+  <p:timing>
+    <p:tnLst>
+      <p:par>
+        <p:cTn xmlns:p14="http://schemas.microsoft.com/office/powerpoint/2010/main" id="1" dur="indefinite" restart="never" nodeType="tmRoot"/>
+      </p:par>
+    </p:tnLst>
+  </p:timing>
+</p:sld>
+</file>
+
+<file path=ppt/slides/slide20.xml><?xml version="1.0" encoding="utf-8"?>
+<p:sld xmlns:a="http://schemas.openxmlformats.org/drawingml/2006/main" xmlns:r="http://schemas.openxmlformats.org/officeDocument/2006/relationships" xmlns:p="http://schemas.openxmlformats.org/presentationml/2006/main">
+  <p:cSld>
+    <p:spTree>
+      <p:nvGrpSpPr>
+        <p:cNvPr id="1" name=""/>
+        <p:cNvGrpSpPr/>
+        <p:nvPr/>
+      </p:nvGrpSpPr>
+      <p:grpSpPr>
+        <a:xfrm>
+          <a:off x="0" y="0"/>
+          <a:ext cx="0" cy="0"/>
+          <a:chOff x="0" y="0"/>
+          <a:chExt cx="0" cy="0"/>
+        </a:xfrm>
+      </p:grpSpPr>
+      <p:sp>
+        <p:nvSpPr>
+          <p:cNvPr id="2" name="Title 1"/>
+          <p:cNvSpPr>
+            <a:spLocks noGrp="1"/>
+          </p:cNvSpPr>
+          <p:nvPr>
+            <p:ph type="title"/>
+          </p:nvPr>
+        </p:nvSpPr>
+        <p:spPr/>
+        <p:txBody>
+          <a:bodyPr/>
+          <a:lstStyle/>
+          <a:p>
+            <a:r>
+              <a:rPr lang="en-US" dirty="0" smtClean="0"/>
+              <a:t>with </a:t>
+            </a:r>
+            <a:r>
+              <a:rPr lang="en-US" dirty="0" err="1" smtClean="0"/>
+              <a:t>iia</a:t>
+            </a:r>
+            <a:endParaRPr lang="en-US" dirty="0"/>
+          </a:p>
+        </p:txBody>
+      </p:sp>
+      <p:pic>
+        <p:nvPicPr>
+          <p:cNvPr id="4" name="Content Placeholder 3" descr="sql2-e.pdf"/>
+          <p:cNvPicPr>
+            <a:picLocks noGrp="1" noChangeAspect="1"/>
+          </p:cNvPicPr>
+          <p:nvPr>
+            <p:ph idx="1"/>
+          </p:nvPr>
+        </p:nvPicPr>
+        <p:blipFill>
+          <a:blip r:embed="rId3">
+            <a:extLst>
+              <a:ext uri="{28A0092B-C50C-407E-A947-70E740481C1C}">
+                <a14:useLocalDpi xmlns:a14="http://schemas.microsoft.com/office/drawing/2010/main" val="0"/>
+              </a:ext>
+            </a:extLst>
+          </a:blip>
+          <a:srcRect t="-31901" b="-31901"/>
+          <a:stretch>
+            <a:fillRect/>
+          </a:stretch>
+        </p:blipFill>
+        <p:spPr/>
+      </p:pic>
+    </p:spTree>
+    <p:extLst>
+      <p:ext uri="{BB962C8B-B14F-4D97-AF65-F5344CB8AC3E}">
+        <p14:creationId xmlns:p14="http://schemas.microsoft.com/office/powerpoint/2010/main" val="4005414225"/>
+      </p:ext>
+    </p:extLst>
+  </p:cSld>
+  <p:clrMapOvr>
+    <a:masterClrMapping/>
+  </p:clrMapOvr>
+</p:sld>
+</file>
+
+<file path=ppt/slides/slide21.xml><?xml version="1.0" encoding="utf-8"?>
+<p:sld xmlns:a="http://schemas.openxmlformats.org/drawingml/2006/main" xmlns:r="http://schemas.openxmlformats.org/officeDocument/2006/relationships" xmlns:p="http://schemas.openxmlformats.org/presentationml/2006/main">
+  <p:cSld>
+    <p:spTree>
+      <p:nvGrpSpPr>
+        <p:cNvPr id="1" name=""/>
+        <p:cNvGrpSpPr/>
+        <p:nvPr/>
+      </p:nvGrpSpPr>
+      <p:grpSpPr>
+        <a:xfrm>
+          <a:off x="0" y="0"/>
+          <a:ext cx="0" cy="0"/>
+          <a:chOff x="0" y="0"/>
+          <a:chExt cx="0" cy="0"/>
+        </a:xfrm>
+      </p:grpSpPr>
+      <p:sp>
+        <p:nvSpPr>
+          <p:cNvPr id="2" name="Title 1"/>
+          <p:cNvSpPr>
+            <a:spLocks noGrp="1"/>
+          </p:cNvSpPr>
+          <p:nvPr>
+            <p:ph type="title"/>
+          </p:nvPr>
+        </p:nvSpPr>
+        <p:spPr/>
+        <p:txBody>
+          <a:bodyPr/>
+          <a:lstStyle/>
+          <a:p>
+            <a:r>
+              <a:rPr lang="en-US" dirty="0" smtClean="0"/>
+              <a:t>Whole with clause</a:t>
+            </a:r>
+            <a:endParaRPr lang="en-US" dirty="0"/>
+          </a:p>
+        </p:txBody>
+      </p:sp>
+      <p:pic>
+        <p:nvPicPr>
+          <p:cNvPr id="4" name="Content Placeholder 3" descr="sql2-f.pdf"/>
+          <p:cNvPicPr>
+            <a:picLocks noGrp="1" noChangeAspect="1"/>
+          </p:cNvPicPr>
+          <p:nvPr>
+            <p:ph idx="1"/>
+          </p:nvPr>
+        </p:nvPicPr>
+        <p:blipFill>
+          <a:blip r:embed="rId2">
+            <a:extLst>
+              <a:ext uri="{28A0092B-C50C-407E-A947-70E740481C1C}">
+                <a14:useLocalDpi xmlns:a14="http://schemas.microsoft.com/office/drawing/2010/main" val="0"/>
+              </a:ext>
+            </a:extLst>
+          </a:blip>
+          <a:srcRect l="-38120" r="-38120"/>
+          <a:stretch>
+            <a:fillRect/>
+          </a:stretch>
+        </p:blipFill>
+        <p:spPr/>
+      </p:pic>
+    </p:spTree>
+    <p:extLst>
+      <p:ext uri="{BB962C8B-B14F-4D97-AF65-F5344CB8AC3E}">
+        <p14:creationId xmlns:p14="http://schemas.microsoft.com/office/powerpoint/2010/main" val="774680484"/>
+      </p:ext>
+    </p:extLst>
+  </p:cSld>
+  <p:clrMapOvr>
+    <a:masterClrMapping/>
+  </p:clrMapOvr>
+</p:sld>
+</file>
+
+<file path=ppt/slides/slide22.xml><?xml version="1.0" encoding="utf-8"?>
+<p:sld xmlns:a="http://schemas.openxmlformats.org/drawingml/2006/main" xmlns:r="http://schemas.openxmlformats.org/officeDocument/2006/relationships" xmlns:p="http://schemas.openxmlformats.org/presentationml/2006/main">
+  <p:cSld>
+    <p:spTree>
+      <p:nvGrpSpPr>
+        <p:cNvPr id="1" name=""/>
+        <p:cNvGrpSpPr/>
+        <p:nvPr/>
+      </p:nvGrpSpPr>
+      <p:grpSpPr>
+        <a:xfrm>
+          <a:off x="0" y="0"/>
+          <a:ext cx="0" cy="0"/>
+          <a:chOff x="0" y="0"/>
+          <a:chExt cx="0" cy="0"/>
+        </a:xfrm>
+      </p:grpSpPr>
+      <p:sp>
+        <p:nvSpPr>
+          <p:cNvPr id="2" name="Title 1"/>
+          <p:cNvSpPr>
+            <a:spLocks noGrp="1"/>
+          </p:cNvSpPr>
+          <p:nvPr>
+            <p:ph type="title"/>
+          </p:nvPr>
+        </p:nvSpPr>
+        <p:spPr/>
+        <p:txBody>
+          <a:bodyPr/>
+          <a:lstStyle/>
+          <a:p>
+            <a:r>
+              <a:rPr lang="en-US" dirty="0" smtClean="0"/>
+              <a:t>Whole with clause</a:t>
+            </a:r>
+            <a:endParaRPr lang="en-US" dirty="0"/>
+          </a:p>
+        </p:txBody>
+      </p:sp>
+      <p:pic>
+        <p:nvPicPr>
+          <p:cNvPr id="4" name="Content Placeholder 3" descr="sql2-f.pdf"/>
+          <p:cNvPicPr>
+            <a:picLocks noGrp="1" noChangeAspect="1"/>
+          </p:cNvPicPr>
+          <p:nvPr>
+            <p:ph idx="1"/>
+          </p:nvPr>
+        </p:nvPicPr>
+        <p:blipFill>
+          <a:blip r:embed="rId3">
+            <a:extLst>
+              <a:ext uri="{28A0092B-C50C-407E-A947-70E740481C1C}">
+                <a14:useLocalDpi xmlns:a14="http://schemas.microsoft.com/office/drawing/2010/main" val="0"/>
+              </a:ext>
+            </a:extLst>
+          </a:blip>
+          <a:srcRect l="-38120" r="-38120"/>
+          <a:stretch>
+            <a:fillRect/>
+          </a:stretch>
+        </p:blipFill>
+        <p:spPr/>
+      </p:pic>
+      <p:sp>
+        <p:nvSpPr>
+          <p:cNvPr id="5" name="Rectangle 4"/>
+          <p:cNvSpPr/>
+          <p:nvPr/>
+        </p:nvSpPr>
+        <p:spPr>
+          <a:xfrm>
+            <a:off x="2591745" y="1153258"/>
+            <a:ext cx="259174" cy="142538"/>
+          </a:xfrm>
+          <a:prstGeom prst="rect">
+            <a:avLst/>
+          </a:prstGeom>
+          <a:solidFill>
+            <a:srgbClr val="FFFF00">
+              <a:alpha val="34000"/>
+            </a:srgbClr>
+          </a:solidFill>
+        </p:spPr>
+        <p:style>
+          <a:lnRef idx="1">
+            <a:schemeClr val="accent1"/>
+          </a:lnRef>
+          <a:fillRef idx="3">
+            <a:schemeClr val="accent1"/>
+          </a:fillRef>
+          <a:effectRef idx="2">
+            <a:schemeClr val="accent1"/>
+          </a:effectRef>
+          <a:fontRef idx="minor">
+            <a:schemeClr val="lt1"/>
+          </a:fontRef>
+        </p:style>
+        <p:txBody>
+          <a:bodyPr rtlCol="0" anchor="ctr"/>
+          <a:lstStyle/>
+          <a:p>
+            <a:pPr algn="ctr"/>
+            <a:endParaRPr lang="en-US"/>
+          </a:p>
+        </p:txBody>
+      </p:sp>
+      <p:sp>
+        <p:nvSpPr>
+          <p:cNvPr id="6" name="Rectangle 5"/>
+          <p:cNvSpPr/>
+          <p:nvPr/>
+        </p:nvSpPr>
+        <p:spPr>
+          <a:xfrm>
+            <a:off x="3058259" y="2578634"/>
+            <a:ext cx="272133" cy="116622"/>
+          </a:xfrm>
+          <a:prstGeom prst="rect">
+            <a:avLst/>
+          </a:prstGeom>
+          <a:solidFill>
+            <a:srgbClr val="FFFF00">
+              <a:alpha val="42000"/>
+            </a:srgbClr>
+          </a:solidFill>
+        </p:spPr>
+        <p:style>
+          <a:lnRef idx="1">
+            <a:schemeClr val="accent1"/>
+          </a:lnRef>
+          <a:fillRef idx="3">
+            <a:schemeClr val="accent1"/>
+          </a:fillRef>
+          <a:effectRef idx="2">
+            <a:schemeClr val="accent1"/>
+          </a:effectRef>
+          <a:fontRef idx="minor">
+            <a:schemeClr val="lt1"/>
+          </a:fontRef>
+        </p:style>
+        <p:txBody>
+          <a:bodyPr rtlCol="0" anchor="ctr"/>
+          <a:lstStyle/>
+          <a:p>
+            <a:pPr algn="ctr"/>
+            <a:endParaRPr lang="en-US"/>
+          </a:p>
+        </p:txBody>
+      </p:sp>
+      <p:sp>
+        <p:nvSpPr>
+          <p:cNvPr id="7" name="Rectangle 6"/>
+          <p:cNvSpPr/>
+          <p:nvPr/>
+        </p:nvSpPr>
+        <p:spPr>
+          <a:xfrm>
+            <a:off x="3485897" y="2578634"/>
+            <a:ext cx="246216" cy="116622"/>
+          </a:xfrm>
+          <a:prstGeom prst="rect">
+            <a:avLst/>
+          </a:prstGeom>
+          <a:solidFill>
+            <a:srgbClr val="FFFF00">
+              <a:alpha val="28000"/>
+            </a:srgbClr>
+          </a:solidFill>
+        </p:spPr>
+        <p:style>
+          <a:lnRef idx="1">
+            <a:schemeClr val="accent1"/>
+          </a:lnRef>
+          <a:fillRef idx="3">
+            <a:schemeClr val="accent1"/>
+          </a:fillRef>
+          <a:effectRef idx="2">
+            <a:schemeClr val="accent1"/>
+          </a:effectRef>
+          <a:fontRef idx="minor">
+            <a:schemeClr val="lt1"/>
+          </a:fontRef>
+        </p:style>
+        <p:txBody>
+          <a:bodyPr rtlCol="0" anchor="ctr"/>
+          <a:lstStyle/>
+          <a:p>
+            <a:pPr algn="ctr"/>
+            <a:endParaRPr lang="en-US"/>
+          </a:p>
+        </p:txBody>
+      </p:sp>
+      <p:sp>
+        <p:nvSpPr>
+          <p:cNvPr id="3" name="Rectangle 2"/>
+          <p:cNvSpPr/>
+          <p:nvPr/>
+        </p:nvSpPr>
+        <p:spPr>
+          <a:xfrm>
+            <a:off x="2591745" y="2850751"/>
+            <a:ext cx="259174" cy="142538"/>
+          </a:xfrm>
+          <a:prstGeom prst="rect">
+            <a:avLst/>
+          </a:prstGeom>
+          <a:solidFill>
+            <a:srgbClr val="FF6600">
+              <a:alpha val="36000"/>
+            </a:srgbClr>
+          </a:solidFill>
+        </p:spPr>
+        <p:style>
+          <a:lnRef idx="1">
+            <a:schemeClr val="accent1"/>
+          </a:lnRef>
+          <a:fillRef idx="3">
+            <a:schemeClr val="accent1"/>
+          </a:fillRef>
+          <a:effectRef idx="2">
+            <a:schemeClr val="accent1"/>
+          </a:effectRef>
+          <a:fontRef idx="minor">
+            <a:schemeClr val="lt1"/>
+          </a:fontRef>
+        </p:style>
+        <p:txBody>
+          <a:bodyPr rtlCol="0" anchor="ctr"/>
+          <a:lstStyle/>
+          <a:p>
+            <a:pPr algn="ctr"/>
+            <a:endParaRPr lang="en-US"/>
+          </a:p>
+        </p:txBody>
+      </p:sp>
+      <p:sp>
+        <p:nvSpPr>
+          <p:cNvPr id="8" name="Rectangle 7"/>
+          <p:cNvSpPr/>
+          <p:nvPr/>
+        </p:nvSpPr>
+        <p:spPr>
+          <a:xfrm>
+            <a:off x="6388651" y="4392748"/>
+            <a:ext cx="220299" cy="181412"/>
+          </a:xfrm>
+          <a:prstGeom prst="rect">
+            <a:avLst/>
+          </a:prstGeom>
+          <a:solidFill>
+            <a:srgbClr val="FF6600">
+              <a:alpha val="34000"/>
+            </a:srgbClr>
+          </a:solidFill>
+        </p:spPr>
+        <p:style>
+          <a:lnRef idx="1">
+            <a:schemeClr val="accent1"/>
+          </a:lnRef>
+          <a:fillRef idx="3">
+            <a:schemeClr val="accent1"/>
+          </a:fillRef>
+          <a:effectRef idx="2">
+            <a:schemeClr val="accent1"/>
+          </a:effectRef>
+          <a:fontRef idx="minor">
+            <a:schemeClr val="lt1"/>
+          </a:fontRef>
+        </p:style>
+        <p:txBody>
+          <a:bodyPr rtlCol="0" anchor="ctr"/>
+          <a:lstStyle/>
+          <a:p>
+            <a:pPr algn="ctr"/>
+            <a:endParaRPr lang="en-US"/>
+          </a:p>
+        </p:txBody>
+      </p:sp>
+    </p:spTree>
+    <p:extLst>
+      <p:ext uri="{BB962C8B-B14F-4D97-AF65-F5344CB8AC3E}">
+        <p14:creationId xmlns:p14="http://schemas.microsoft.com/office/powerpoint/2010/main" val="3418197899"/>
+      </p:ext>
+    </p:extLst>
+  </p:cSld>
+  <p:clrMapOvr>
+    <a:masterClrMapping/>
+  </p:clrMapOvr>
+</p:sld>
+</file>
+
+<file path=ppt/slides/slide23.xml><?xml version="1.0" encoding="utf-8"?>
+<p:sld xmlns:a="http://schemas.openxmlformats.org/drawingml/2006/main" xmlns:r="http://schemas.openxmlformats.org/officeDocument/2006/relationships" xmlns:p="http://schemas.openxmlformats.org/presentationml/2006/main">
+  <p:cSld>
+    <p:spTree>
+      <p:nvGrpSpPr>
+        <p:cNvPr id="1" name=""/>
+        <p:cNvGrpSpPr/>
+        <p:nvPr/>
+      </p:nvGrpSpPr>
+      <p:grpSpPr>
+        <a:xfrm>
+          <a:off x="0" y="0"/>
+          <a:ext cx="0" cy="0"/>
+          <a:chOff x="0" y="0"/>
+          <a:chExt cx="0" cy="0"/>
+        </a:xfrm>
+      </p:grpSpPr>
+      <p:sp>
+        <p:nvSpPr>
+          <p:cNvPr id="2" name="Title 1"/>
+          <p:cNvSpPr>
+            <a:spLocks noGrp="1"/>
+          </p:cNvSpPr>
+          <p:nvPr>
+            <p:ph type="title"/>
+          </p:nvPr>
+        </p:nvSpPr>
+        <p:spPr/>
+        <p:txBody>
+          <a:bodyPr/>
+          <a:lstStyle/>
+          <a:p>
+            <a:r>
+              <a:rPr lang="en-US" dirty="0" smtClean="0"/>
+              <a:t>SQL ‘using’ basics</a:t>
+            </a:r>
+            <a:endParaRPr lang="en-US" dirty="0"/>
+          </a:p>
+        </p:txBody>
+      </p:sp>
+      <p:sp>
+        <p:nvSpPr>
+          <p:cNvPr id="3" name="Content Placeholder 2"/>
+          <p:cNvSpPr>
+            <a:spLocks noGrp="1"/>
+          </p:cNvSpPr>
+          <p:nvPr>
+            <p:ph idx="1"/>
+          </p:nvPr>
+        </p:nvSpPr>
+        <p:spPr/>
+        <p:txBody>
+          <a:bodyPr/>
+          <a:lstStyle/>
+          <a:p>
+            <a:pPr marL="0" indent="0">
+              <a:buNone/>
+            </a:pPr>
+            <a:r>
+              <a:rPr lang="en-US" dirty="0">
+                <a:latin typeface="Menlo Regular"/>
+                <a:cs typeface="Menlo Regular"/>
+              </a:rPr>
+              <a:t>s</a:t>
+            </a:r>
+            <a:r>
+              <a:rPr lang="en-US" dirty="0" smtClean="0">
+                <a:latin typeface="Menlo Regular"/>
+                <a:cs typeface="Menlo Regular"/>
+              </a:rPr>
+              <a:t>elect *</a:t>
+            </a:r>
+          </a:p>
+          <a:p>
+            <a:pPr marL="0" indent="0">
+              <a:buNone/>
+            </a:pPr>
+            <a:r>
+              <a:rPr lang="en-US" dirty="0" smtClean="0">
+                <a:latin typeface="Menlo Regular"/>
+                <a:cs typeface="Menlo Regular"/>
+              </a:rPr>
+              <a:t>	from a join b </a:t>
+            </a:r>
+            <a:r>
+              <a:rPr lang="en-US" dirty="0" smtClean="0">
+                <a:solidFill>
+                  <a:schemeClr val="accent6"/>
+                </a:solidFill>
+                <a:latin typeface="Menlo Regular"/>
+                <a:cs typeface="Menlo Regular"/>
+              </a:rPr>
+              <a:t>on </a:t>
+            </a:r>
+            <a:r>
+              <a:rPr lang="en-US" dirty="0" err="1" smtClean="0">
+                <a:solidFill>
+                  <a:schemeClr val="accent6"/>
+                </a:solidFill>
+                <a:latin typeface="Menlo Regular"/>
+                <a:cs typeface="Menlo Regular"/>
+              </a:rPr>
+              <a:t>a.id</a:t>
+            </a:r>
+            <a:r>
+              <a:rPr lang="en-US" dirty="0" smtClean="0">
+                <a:solidFill>
+                  <a:schemeClr val="accent6"/>
+                </a:solidFill>
+                <a:latin typeface="Menlo Regular"/>
+                <a:cs typeface="Menlo Regular"/>
+              </a:rPr>
+              <a:t> = </a:t>
+            </a:r>
+            <a:r>
+              <a:rPr lang="en-US" dirty="0" err="1" smtClean="0">
+                <a:solidFill>
+                  <a:schemeClr val="accent6"/>
+                </a:solidFill>
+                <a:latin typeface="Menlo Regular"/>
+                <a:cs typeface="Menlo Regular"/>
+              </a:rPr>
+              <a:t>b.id</a:t>
+            </a:r>
+            <a:endParaRPr lang="en-US" dirty="0" smtClean="0">
+              <a:solidFill>
+                <a:schemeClr val="accent6"/>
+              </a:solidFill>
+              <a:latin typeface="Menlo Regular"/>
+              <a:cs typeface="Menlo Regular"/>
+            </a:endParaRPr>
+          </a:p>
+          <a:p>
+            <a:pPr marL="0" indent="0">
+              <a:buNone/>
+            </a:pPr>
+            <a:endParaRPr lang="en-US" dirty="0">
+              <a:latin typeface="Menlo Regular"/>
+              <a:cs typeface="Menlo Regular"/>
+            </a:endParaRPr>
+          </a:p>
+          <a:p>
+            <a:pPr marL="0" indent="0">
+              <a:buNone/>
+            </a:pPr>
+            <a:endParaRPr lang="en-US" dirty="0" smtClean="0">
+              <a:latin typeface="Menlo Regular"/>
+              <a:cs typeface="Menlo Regular"/>
+            </a:endParaRPr>
+          </a:p>
+          <a:p>
+            <a:pPr marL="0" indent="0">
+              <a:buNone/>
+            </a:pPr>
+            <a:endParaRPr lang="en-US" dirty="0">
+              <a:latin typeface="Menlo Regular"/>
+              <a:cs typeface="Menlo Regular"/>
+            </a:endParaRPr>
+          </a:p>
+          <a:p>
+            <a:pPr marL="0" indent="0">
+              <a:buNone/>
+            </a:pPr>
+            <a:r>
+              <a:rPr lang="en-US" dirty="0">
+                <a:latin typeface="Menlo Regular"/>
+                <a:cs typeface="Menlo Regular"/>
+              </a:rPr>
+              <a:t>s</a:t>
+            </a:r>
+            <a:r>
+              <a:rPr lang="en-US" dirty="0" smtClean="0">
+                <a:latin typeface="Menlo Regular"/>
+                <a:cs typeface="Menlo Regular"/>
+              </a:rPr>
+              <a:t>elect *</a:t>
+            </a:r>
+          </a:p>
+          <a:p>
+            <a:pPr marL="0" indent="0">
+              <a:buNone/>
+            </a:pPr>
+            <a:r>
+              <a:rPr lang="en-US" dirty="0" smtClean="0">
+                <a:latin typeface="Menlo Regular"/>
+                <a:cs typeface="Menlo Regular"/>
+              </a:rPr>
+              <a:t>	from a join b </a:t>
+            </a:r>
+            <a:r>
+              <a:rPr lang="en-US" dirty="0" smtClean="0">
+                <a:solidFill>
+                  <a:schemeClr val="accent6"/>
+                </a:solidFill>
+                <a:latin typeface="Menlo Regular"/>
+                <a:cs typeface="Menlo Regular"/>
+              </a:rPr>
+              <a:t>using (id)</a:t>
+            </a:r>
+          </a:p>
+        </p:txBody>
+      </p:sp>
+    </p:spTree>
+    <p:extLst>
+      <p:ext uri="{BB962C8B-B14F-4D97-AF65-F5344CB8AC3E}">
+        <p14:creationId xmlns:p14="http://schemas.microsoft.com/office/powerpoint/2010/main" val="2760158243"/>
       </p:ext>
     </p:extLst>
   </p:cSld>
@@ -7376,7 +10031,7 @@
   <a:extraClrSchemeLst/>
   <a:extLst>
     <a:ext uri="{05A4C25C-085E-4340-85A3-A5531E510DB2}">
-      <thm15:themeFamily xmlns:thm15="http://schemas.microsoft.com/office/thememl/2012/main" xmlns="" name="MGI_4-3_ratio_v1a" id="{9A0171FA-20F4-F840-B1C8-29D686AB0540}" vid="{60506783-C923-7847-B1CA-7C860CC95497}"/>
+      <thm15:themeFamily xmlns="" xmlns:thm15="http://schemas.microsoft.com/office/thememl/2012/main" name="MGI_4-3_ratio_v1a" id="{9A0171FA-20F4-F840-B1C8-29D686AB0540}" vid="{60506783-C923-7847-B1CA-7C860CC95497}"/>
     </a:ext>
   </a:extLst>
 </a:theme>

</xml_diff>

<commit_message>
more slides - and notes
</commit_message>
<xml_diff>
--- a/using-using-with-with.pptx
+++ b/using-using-with-with.pptx
@@ -5,10 +5,10 @@
     <p:sldMasterId id="2147483648" r:id="rId1"/>
   </p:sldMasterIdLst>
   <p:notesMasterIdLst>
-    <p:notesMasterId r:id="rId25"/>
+    <p:notesMasterId r:id="rId30"/>
   </p:notesMasterIdLst>
   <p:handoutMasterIdLst>
-    <p:handoutMasterId r:id="rId26"/>
+    <p:handoutMasterId r:id="rId31"/>
   </p:handoutMasterIdLst>
   <p:sldIdLst>
     <p:sldId id="256" r:id="rId2"/>
@@ -34,6 +34,11 @@
     <p:sldId id="278" r:id="rId22"/>
     <p:sldId id="279" r:id="rId23"/>
     <p:sldId id="258" r:id="rId24"/>
+    <p:sldId id="281" r:id="rId25"/>
+    <p:sldId id="280" r:id="rId26"/>
+    <p:sldId id="282" r:id="rId27"/>
+    <p:sldId id="283" r:id="rId28"/>
+    <p:sldId id="284" r:id="rId29"/>
   </p:sldIdLst>
   <p:sldSz cx="9144000" cy="6858000" type="screen4x3"/>
   <p:notesSz cx="6858000" cy="9144000"/>
@@ -134,7 +139,7 @@
   </p:defaultTextStyle>
   <p:extLst>
     <p:ext uri="{EFAFB233-063F-42B5-8137-9DF3F51BA10A}">
-      <p15:sldGuideLst xmlns="" xmlns:p15="http://schemas.microsoft.com/office/powerpoint/2012/main">
+      <p15:sldGuideLst xmlns:p15="http://schemas.microsoft.com/office/powerpoint/2012/main" xmlns="">
         <p15:guide id="1" orient="horz" pos="2160">
           <p15:clr>
             <a:srgbClr val="A4A3A4"/>
@@ -234,7 +239,7 @@
             <a:fld id="{03643E35-CD80-874A-A3D7-254E954BB753}" type="datetimeFigureOut">
               <a:rPr lang="en-US" smtClean="0"/>
               <a:pPr/>
-              <a:t>8/14/15</a:t>
+              <a:t>8/28/15</a:t>
             </a:fld>
             <a:endParaRPr lang="en-US"/>
           </a:p>
@@ -401,7 +406,7 @@
             <a:fld id="{5C416C15-7665-174C-99B8-5B237ACA6582}" type="datetimeFigureOut">
               <a:rPr lang="en-US" smtClean="0"/>
               <a:pPr/>
-              <a:t>8/14/15</a:t>
+              <a:t>8/28/15</a:t>
             </a:fld>
             <a:endParaRPr lang="en-US"/>
           </a:p>
@@ -722,8 +727,33 @@
             </a:r>
             <a:r>
               <a:rPr lang="en-US" baseline="0" dirty="0" smtClean="0"/>
-              <a:t> you to read all this</a:t>
-            </a:r>
+              <a:t> you to read all </a:t>
+            </a:r>
+            <a:r>
+              <a:rPr lang="en-US" baseline="0" dirty="0" smtClean="0"/>
+              <a:t>this</a:t>
+            </a:r>
+          </a:p>
+          <a:p>
+            <a:r>
+              <a:rPr lang="en-US" baseline="0" dirty="0" smtClean="0"/>
+              <a:t>This is an actual query I wrote</a:t>
+            </a:r>
+          </a:p>
+          <a:p>
+            <a:r>
+              <a:rPr lang="en-US" baseline="0" dirty="0" smtClean="0"/>
+              <a:t>So what did it return??  &lt;joke&gt; just kidding</a:t>
+            </a:r>
+          </a:p>
+          <a:p>
+            <a:r>
+              <a:rPr lang="en-US" baseline="0" dirty="0" smtClean="0"/>
+              <a:t>It produced some data that was useful in some way</a:t>
+            </a:r>
+          </a:p>
+          <a:p>
+            <a:endParaRPr lang="en-US" baseline="0" dirty="0" smtClean="0"/>
           </a:p>
           <a:p>
             <a:r>
@@ -819,12 +849,13 @@
           <a:bodyPr/>
           <a:lstStyle/>
           <a:p>
-            <a:endParaRPr lang="en-US" dirty="0" smtClean="0"/>
-          </a:p>
-          <a:p>
             <a:r>
               <a:rPr lang="en-US" dirty="0" smtClean="0"/>
-              <a:t>So… how nice is this compared to</a:t>
+              <a:t>So</a:t>
+            </a:r>
+            <a:r>
+              <a:rPr lang="en-US" dirty="0" smtClean="0"/>
+              <a:t>… how nice is this compared to</a:t>
             </a:r>
             <a:r>
               <a:rPr lang="en-US" baseline="0" dirty="0" smtClean="0"/>
@@ -836,11 +867,7 @@
             </a:r>
             <a:r>
               <a:rPr lang="en-US" baseline="0" dirty="0" smtClean="0"/>
-              <a:t>??</a:t>
-            </a:r>
-            <a:r>
-              <a:rPr lang="en-US" baseline="0" dirty="0" smtClean="0"/>
-              <a:t>?</a:t>
+              <a:t>???</a:t>
             </a:r>
           </a:p>
           <a:p>
@@ -857,10 +884,32 @@
             </a:r>
             <a:r>
               <a:rPr lang="en-US" baseline="0" dirty="0" smtClean="0"/>
-              <a:t>”</a:t>
-            </a:r>
-          </a:p>
-          <a:p>
+              <a:t>” – </a:t>
+            </a:r>
+            <a:r>
+              <a:rPr lang="en-US" baseline="0" dirty="0" err="1" smtClean="0"/>
+              <a:t>sorta</a:t>
+            </a:r>
+            <a:r>
+              <a:rPr lang="en-US" baseline="0" dirty="0" smtClean="0"/>
+              <a:t> good, you declare them all up front before the select</a:t>
+            </a:r>
+            <a:endParaRPr lang="en-US" baseline="0" dirty="0" smtClean="0"/>
+          </a:p>
+          <a:p>
+            <a:endParaRPr lang="en-US" baseline="0" dirty="0" smtClean="0"/>
+          </a:p>
+          <a:p>
+            <a:r>
+              <a:rPr lang="en-US" baseline="0" dirty="0" smtClean="0"/>
+              <a:t>I’m going to break down the “before” query that we started with into some ‘with’ clauses</a:t>
+            </a:r>
+          </a:p>
+          <a:p>
+            <a:r>
+              <a:rPr lang="en-US" baseline="0" dirty="0" smtClean="0"/>
+              <a:t>Each ‘with’ clause will be trying to do one thing</a:t>
+            </a:r>
             <a:endParaRPr lang="en-US" baseline="0" dirty="0" smtClean="0"/>
           </a:p>
           <a:p>
@@ -1296,7 +1345,20 @@
             </a:r>
             <a:r>
               <a:rPr lang="en-US" baseline="0" dirty="0" smtClean="0"/>
-              <a:t> defined :: IIRL</a:t>
+              <a:t> defined :: </a:t>
+            </a:r>
+            <a:r>
+              <a:rPr lang="en-US" baseline="0" dirty="0" smtClean="0"/>
+              <a:t>IIRL</a:t>
+            </a:r>
+          </a:p>
+          <a:p>
+            <a:endParaRPr lang="en-US" baseline="0" dirty="0" smtClean="0"/>
+          </a:p>
+          <a:p>
+            <a:r>
+              <a:rPr lang="en-US" baseline="0" dirty="0" smtClean="0"/>
+              <a:t>So you may have to order your with clauses, by dependencies</a:t>
             </a:r>
             <a:endParaRPr lang="en-US" dirty="0"/>
           </a:p>
@@ -1406,6 +1468,19 @@
               <a:rPr lang="en-US" baseline="0" dirty="0" err="1" smtClean="0"/>
               <a:t>illumina</a:t>
             </a:r>
+            <a:r>
+              <a:rPr lang="en-US" baseline="0" dirty="0" smtClean="0"/>
+              <a:t> (more or less)</a:t>
+            </a:r>
+          </a:p>
+          <a:p>
+            <a:endParaRPr lang="en-US" baseline="0" dirty="0" smtClean="0"/>
+          </a:p>
+          <a:p>
+            <a:r>
+              <a:rPr lang="en-US" baseline="0" dirty="0" smtClean="0"/>
+              <a:t>But…</a:t>
+            </a:r>
             <a:endParaRPr lang="en-US" dirty="0"/>
           </a:p>
         </p:txBody>
@@ -1497,7 +1572,17 @@
             </a:r>
             <a:r>
               <a:rPr lang="en-US" baseline="0" dirty="0" smtClean="0"/>
-              <a:t> key</a:t>
+              <a:t> </a:t>
+            </a:r>
+            <a:r>
+              <a:rPr lang="en-US" baseline="0" dirty="0" smtClean="0"/>
+              <a:t>key</a:t>
+            </a:r>
+          </a:p>
+          <a:p>
+            <a:r>
+              <a:rPr lang="en-US" baseline="0" dirty="0" smtClean="0"/>
+              <a:t>And one of the columns is a little more complicated</a:t>
             </a:r>
             <a:endParaRPr lang="en-US" dirty="0"/>
           </a:p>
@@ -1613,8 +1698,22 @@
             </a:r>
             <a:r>
               <a:rPr lang="en-US" baseline="0" dirty="0" smtClean="0"/>
-              <a:t>, we’ll be filtering those out</a:t>
-            </a:r>
+              <a:t>, we’ll be filtering those </a:t>
+            </a:r>
+            <a:r>
+              <a:rPr lang="en-US" baseline="0" dirty="0" smtClean="0"/>
+              <a:t>out</a:t>
+            </a:r>
+          </a:p>
+          <a:p>
+            <a:endParaRPr lang="en-US" baseline="0" dirty="0" smtClean="0"/>
+          </a:p>
+          <a:p>
+            <a:r>
+              <a:rPr lang="en-US" baseline="0" dirty="0" smtClean="0"/>
+              <a:t>This is the first filter I think we’ve seen here today</a:t>
+            </a:r>
+            <a:endParaRPr lang="en-US" baseline="0" dirty="0" smtClean="0"/>
           </a:p>
         </p:txBody>
       </p:sp>
@@ -2030,7 +2129,19 @@
             </a:r>
             <a:r>
               <a:rPr lang="en-US" dirty="0" smtClean="0"/>
-              <a:t>”</a:t>
+              <a:t>” – a </a:t>
+            </a:r>
+            <a:r>
+              <a:rPr lang="en-US" dirty="0" err="1" smtClean="0"/>
+              <a:t>subquery</a:t>
+            </a:r>
+            <a:r>
+              <a:rPr lang="en-US" dirty="0" smtClean="0"/>
+              <a:t> in the</a:t>
+            </a:r>
+            <a:r>
+              <a:rPr lang="en-US" baseline="0" dirty="0" smtClean="0"/>
+              <a:t> select clause where a column name might be</a:t>
             </a:r>
             <a:endParaRPr lang="en-US" dirty="0"/>
           </a:p>
@@ -2119,13 +2230,111 @@
           <a:p>
             <a:r>
               <a:rPr lang="en-US" dirty="0" smtClean="0"/>
-              <a:t>There are </a:t>
-            </a:r>
-            <a:r>
+              <a:t>Ok, so here’s all 5 with clauses</a:t>
+            </a:r>
+            <a:endParaRPr lang="en-US" dirty="0"/>
+          </a:p>
+        </p:txBody>
+      </p:sp>
+      <p:sp>
+        <p:nvSpPr>
+          <p:cNvPr id="4" name="Slide Number Placeholder 3"/>
+          <p:cNvSpPr>
+            <a:spLocks noGrp="1"/>
+          </p:cNvSpPr>
+          <p:nvPr>
+            <p:ph type="sldNum" sz="quarter" idx="10"/>
+          </p:nvPr>
+        </p:nvSpPr>
+        <p:spPr/>
+        <p:txBody>
+          <a:bodyPr/>
+          <a:lstStyle/>
+          <a:p>
+            <a:fld id="{F9BF1BD6-11A6-594E-AFA1-283323A41F72}" type="slidenum">
               <a:rPr lang="en-US" smtClean="0"/>
-              <a:t>some references</a:t>
-            </a:r>
+              <a:pPr/>
+              <a:t>21</a:t>
+            </a:fld>
             <a:endParaRPr lang="en-US"/>
+          </a:p>
+        </p:txBody>
+      </p:sp>
+    </p:spTree>
+    <p:extLst>
+      <p:ext uri="{BB962C8B-B14F-4D97-AF65-F5344CB8AC3E}">
+        <p14:creationId xmlns:p14="http://schemas.microsoft.com/office/powerpoint/2010/main" val="2772597109"/>
+      </p:ext>
+    </p:extLst>
+  </p:cSld>
+  <p:clrMapOvr>
+    <a:masterClrMapping/>
+  </p:clrMapOvr>
+</p:notes>
+</file>
+
+<file path=ppt/notesSlides/notesSlide21.xml><?xml version="1.0" encoding="utf-8"?>
+<p:notes xmlns:a="http://schemas.openxmlformats.org/drawingml/2006/main" xmlns:r="http://schemas.openxmlformats.org/officeDocument/2006/relationships" xmlns:p="http://schemas.openxmlformats.org/presentationml/2006/main">
+  <p:cSld>
+    <p:spTree>
+      <p:nvGrpSpPr>
+        <p:cNvPr id="1" name=""/>
+        <p:cNvGrpSpPr/>
+        <p:nvPr/>
+      </p:nvGrpSpPr>
+      <p:grpSpPr>
+        <a:xfrm>
+          <a:off x="0" y="0"/>
+          <a:ext cx="0" cy="0"/>
+          <a:chOff x="0" y="0"/>
+          <a:chExt cx="0" cy="0"/>
+        </a:xfrm>
+      </p:grpSpPr>
+      <p:sp>
+        <p:nvSpPr>
+          <p:cNvPr id="2" name="Slide Image Placeholder 1"/>
+          <p:cNvSpPr>
+            <a:spLocks noGrp="1" noRot="1" noChangeAspect="1"/>
+          </p:cNvSpPr>
+          <p:nvPr>
+            <p:ph type="sldImg"/>
+          </p:nvPr>
+        </p:nvSpPr>
+        <p:spPr/>
+      </p:sp>
+      <p:sp>
+        <p:nvSpPr>
+          <p:cNvPr id="3" name="Notes Placeholder 2"/>
+          <p:cNvSpPr>
+            <a:spLocks noGrp="1"/>
+          </p:cNvSpPr>
+          <p:nvPr>
+            <p:ph type="body" idx="1"/>
+          </p:nvPr>
+        </p:nvSpPr>
+        <p:spPr/>
+        <p:txBody>
+          <a:bodyPr/>
+          <a:lstStyle/>
+          <a:p>
+            <a:r>
+              <a:rPr lang="en-US" dirty="0" smtClean="0"/>
+              <a:t>There are some </a:t>
+            </a:r>
+            <a:r>
+              <a:rPr lang="en-US" dirty="0" smtClean="0"/>
+              <a:t>references</a:t>
+            </a:r>
+          </a:p>
+          <a:p>
+            <a:endParaRPr lang="en-US" dirty="0" smtClean="0"/>
+          </a:p>
+          <a:p>
+            <a:r>
+              <a:rPr lang="en-US" dirty="0" smtClean="0"/>
+              <a:t>Now we’re done with ‘with’ – let’s move on to ‘using’ – because the title is using using with with</a:t>
+            </a:r>
+            <a:endParaRPr lang="en-US" dirty="0"/>
           </a:p>
         </p:txBody>
       </p:sp>
@@ -2157,6 +2366,430 @@
     <p:extLst>
       <p:ext uri="{BB962C8B-B14F-4D97-AF65-F5344CB8AC3E}">
         <p14:creationId xmlns:p14="http://schemas.microsoft.com/office/powerpoint/2010/main" val="2200941546"/>
+      </p:ext>
+    </p:extLst>
+  </p:cSld>
+  <p:clrMapOvr>
+    <a:masterClrMapping/>
+  </p:clrMapOvr>
+</p:notes>
+</file>
+
+<file path=ppt/notesSlides/notesSlide22.xml><?xml version="1.0" encoding="utf-8"?>
+<p:notes xmlns:a="http://schemas.openxmlformats.org/drawingml/2006/main" xmlns:r="http://schemas.openxmlformats.org/officeDocument/2006/relationships" xmlns:p="http://schemas.openxmlformats.org/presentationml/2006/main">
+  <p:cSld>
+    <p:spTree>
+      <p:nvGrpSpPr>
+        <p:cNvPr id="1" name=""/>
+        <p:cNvGrpSpPr/>
+        <p:nvPr/>
+      </p:nvGrpSpPr>
+      <p:grpSpPr>
+        <a:xfrm>
+          <a:off x="0" y="0"/>
+          <a:ext cx="0" cy="0"/>
+          <a:chOff x="0" y="0"/>
+          <a:chExt cx="0" cy="0"/>
+        </a:xfrm>
+      </p:grpSpPr>
+      <p:sp>
+        <p:nvSpPr>
+          <p:cNvPr id="2" name="Slide Image Placeholder 1"/>
+          <p:cNvSpPr>
+            <a:spLocks noGrp="1" noRot="1" noChangeAspect="1"/>
+          </p:cNvSpPr>
+          <p:nvPr>
+            <p:ph type="sldImg"/>
+          </p:nvPr>
+        </p:nvSpPr>
+        <p:spPr/>
+      </p:sp>
+      <p:sp>
+        <p:nvSpPr>
+          <p:cNvPr id="3" name="Notes Placeholder 2"/>
+          <p:cNvSpPr>
+            <a:spLocks noGrp="1"/>
+          </p:cNvSpPr>
+          <p:nvPr>
+            <p:ph type="body" idx="1"/>
+          </p:nvPr>
+        </p:nvSpPr>
+        <p:spPr/>
+        <p:txBody>
+          <a:bodyPr/>
+          <a:lstStyle/>
+          <a:p>
+            <a:r>
+              <a:rPr lang="en-US" dirty="0" smtClean="0"/>
+              <a:t>Here is my</a:t>
+            </a:r>
+            <a:r>
+              <a:rPr lang="en-US" baseline="0" dirty="0" smtClean="0"/>
+              <a:t> understanding of ‘using’</a:t>
+            </a:r>
+          </a:p>
+          <a:p>
+            <a:endParaRPr lang="en-US" baseline="0" dirty="0" smtClean="0"/>
+          </a:p>
+          <a:p>
+            <a:r>
+              <a:rPr lang="en-US" baseline="0" dirty="0" smtClean="0"/>
+              <a:t>Its seems a bit like a “natural join” to me – which is when you join on all columns that have the same name</a:t>
+            </a:r>
+          </a:p>
+          <a:p>
+            <a:r>
+              <a:rPr lang="en-US" baseline="0" dirty="0" smtClean="0"/>
+              <a:t>But here you specify the columns – so a bit safer maybe than “natural join” in the face of a schema change</a:t>
+            </a:r>
+          </a:p>
+        </p:txBody>
+      </p:sp>
+      <p:sp>
+        <p:nvSpPr>
+          <p:cNvPr id="4" name="Slide Number Placeholder 3"/>
+          <p:cNvSpPr>
+            <a:spLocks noGrp="1"/>
+          </p:cNvSpPr>
+          <p:nvPr>
+            <p:ph type="sldNum" sz="quarter" idx="10"/>
+          </p:nvPr>
+        </p:nvSpPr>
+        <p:spPr/>
+        <p:txBody>
+          <a:bodyPr/>
+          <a:lstStyle/>
+          <a:p>
+            <a:fld id="{F9BF1BD6-11A6-594E-AFA1-283323A41F72}" type="slidenum">
+              <a:rPr lang="en-US" smtClean="0"/>
+              <a:pPr/>
+              <a:t>23</a:t>
+            </a:fld>
+            <a:endParaRPr lang="en-US"/>
+          </a:p>
+        </p:txBody>
+      </p:sp>
+    </p:spTree>
+    <p:extLst>
+      <p:ext uri="{BB962C8B-B14F-4D97-AF65-F5344CB8AC3E}">
+        <p14:creationId xmlns:p14="http://schemas.microsoft.com/office/powerpoint/2010/main" val="1194302710"/>
+      </p:ext>
+    </p:extLst>
+  </p:cSld>
+  <p:clrMapOvr>
+    <a:masterClrMapping/>
+  </p:clrMapOvr>
+</p:notes>
+</file>
+
+<file path=ppt/notesSlides/notesSlide23.xml><?xml version="1.0" encoding="utf-8"?>
+<p:notes xmlns:a="http://schemas.openxmlformats.org/drawingml/2006/main" xmlns:r="http://schemas.openxmlformats.org/officeDocument/2006/relationships" xmlns:p="http://schemas.openxmlformats.org/presentationml/2006/main">
+  <p:cSld>
+    <p:spTree>
+      <p:nvGrpSpPr>
+        <p:cNvPr id="1" name=""/>
+        <p:cNvGrpSpPr/>
+        <p:nvPr/>
+      </p:nvGrpSpPr>
+      <p:grpSpPr>
+        <a:xfrm>
+          <a:off x="0" y="0"/>
+          <a:ext cx="0" cy="0"/>
+          <a:chOff x="0" y="0"/>
+          <a:chExt cx="0" cy="0"/>
+        </a:xfrm>
+      </p:grpSpPr>
+      <p:sp>
+        <p:nvSpPr>
+          <p:cNvPr id="2" name="Slide Image Placeholder 1"/>
+          <p:cNvSpPr>
+            <a:spLocks noGrp="1" noRot="1" noChangeAspect="1"/>
+          </p:cNvSpPr>
+          <p:nvPr>
+            <p:ph type="sldImg"/>
+          </p:nvPr>
+        </p:nvSpPr>
+        <p:spPr/>
+      </p:sp>
+      <p:sp>
+        <p:nvSpPr>
+          <p:cNvPr id="3" name="Notes Placeholder 2"/>
+          <p:cNvSpPr>
+            <a:spLocks noGrp="1"/>
+          </p:cNvSpPr>
+          <p:nvPr>
+            <p:ph type="body" idx="1"/>
+          </p:nvPr>
+        </p:nvSpPr>
+        <p:spPr/>
+        <p:txBody>
+          <a:bodyPr/>
+          <a:lstStyle/>
+          <a:p>
+            <a:r>
+              <a:rPr lang="en-US" dirty="0" smtClean="0"/>
+              <a:t>I’m skipping the ‘select’ clause</a:t>
+            </a:r>
+            <a:r>
+              <a:rPr lang="en-US" baseline="0" dirty="0" smtClean="0"/>
+              <a:t> for now because it’s less interesting</a:t>
+            </a:r>
+          </a:p>
+          <a:p>
+            <a:r>
+              <a:rPr lang="en-US" baseline="0" dirty="0" smtClean="0"/>
+              <a:t>So on to the ‘from’ clause, where we can use ‘using’ </a:t>
+            </a:r>
+            <a:r>
+              <a:rPr lang="en-US" baseline="0" dirty="0" smtClean="0">
+                <a:sym typeface="Wingdings"/>
+              </a:rPr>
+              <a:t></a:t>
+            </a:r>
+            <a:endParaRPr lang="en-US" dirty="0" smtClean="0"/>
+          </a:p>
+          <a:p>
+            <a:endParaRPr lang="en-US" dirty="0"/>
+          </a:p>
+        </p:txBody>
+      </p:sp>
+      <p:sp>
+        <p:nvSpPr>
+          <p:cNvPr id="4" name="Slide Number Placeholder 3"/>
+          <p:cNvSpPr>
+            <a:spLocks noGrp="1"/>
+          </p:cNvSpPr>
+          <p:nvPr>
+            <p:ph type="sldNum" sz="quarter" idx="10"/>
+          </p:nvPr>
+        </p:nvSpPr>
+        <p:spPr/>
+        <p:txBody>
+          <a:bodyPr/>
+          <a:lstStyle/>
+          <a:p>
+            <a:fld id="{F9BF1BD6-11A6-594E-AFA1-283323A41F72}" type="slidenum">
+              <a:rPr lang="en-US" smtClean="0"/>
+              <a:pPr/>
+              <a:t>24</a:t>
+            </a:fld>
+            <a:endParaRPr lang="en-US"/>
+          </a:p>
+        </p:txBody>
+      </p:sp>
+    </p:spTree>
+    <p:extLst>
+      <p:ext uri="{BB962C8B-B14F-4D97-AF65-F5344CB8AC3E}">
+        <p14:creationId xmlns:p14="http://schemas.microsoft.com/office/powerpoint/2010/main" val="2664495351"/>
+      </p:ext>
+    </p:extLst>
+  </p:cSld>
+  <p:clrMapOvr>
+    <a:masterClrMapping/>
+  </p:clrMapOvr>
+</p:notes>
+</file>
+
+<file path=ppt/notesSlides/notesSlide24.xml><?xml version="1.0" encoding="utf-8"?>
+<p:notes xmlns:a="http://schemas.openxmlformats.org/drawingml/2006/main" xmlns:r="http://schemas.openxmlformats.org/officeDocument/2006/relationships" xmlns:p="http://schemas.openxmlformats.org/presentationml/2006/main">
+  <p:cSld>
+    <p:spTree>
+      <p:nvGrpSpPr>
+        <p:cNvPr id="1" name=""/>
+        <p:cNvGrpSpPr/>
+        <p:nvPr/>
+      </p:nvGrpSpPr>
+      <p:grpSpPr>
+        <a:xfrm>
+          <a:off x="0" y="0"/>
+          <a:ext cx="0" cy="0"/>
+          <a:chOff x="0" y="0"/>
+          <a:chExt cx="0" cy="0"/>
+        </a:xfrm>
+      </p:grpSpPr>
+      <p:sp>
+        <p:nvSpPr>
+          <p:cNvPr id="2" name="Slide Image Placeholder 1"/>
+          <p:cNvSpPr>
+            <a:spLocks noGrp="1" noRot="1" noChangeAspect="1"/>
+          </p:cNvSpPr>
+          <p:nvPr>
+            <p:ph type="sldImg"/>
+          </p:nvPr>
+        </p:nvSpPr>
+        <p:spPr/>
+      </p:sp>
+      <p:sp>
+        <p:nvSpPr>
+          <p:cNvPr id="3" name="Notes Placeholder 2"/>
+          <p:cNvSpPr>
+            <a:spLocks noGrp="1"/>
+          </p:cNvSpPr>
+          <p:nvPr>
+            <p:ph type="body" idx="1"/>
+          </p:nvPr>
+        </p:nvSpPr>
+        <p:spPr/>
+        <p:txBody>
+          <a:bodyPr/>
+          <a:lstStyle/>
+          <a:p>
+            <a:r>
+              <a:rPr lang="en-US" dirty="0" smtClean="0"/>
+              <a:t>Here are the ‘using’ key words</a:t>
+            </a:r>
+          </a:p>
+          <a:p>
+            <a:endParaRPr lang="en-US" dirty="0" smtClean="0"/>
+          </a:p>
+          <a:p>
+            <a:r>
+              <a:rPr lang="en-US" dirty="0" smtClean="0"/>
+              <a:t>It just so happened that for all my joins, all the column</a:t>
+            </a:r>
+            <a:r>
+              <a:rPr lang="en-US" baseline="0" dirty="0" smtClean="0"/>
+              <a:t> names to join on were the same – maybe just lucky?</a:t>
+            </a:r>
+            <a:endParaRPr lang="en-US" dirty="0"/>
+          </a:p>
+        </p:txBody>
+      </p:sp>
+      <p:sp>
+        <p:nvSpPr>
+          <p:cNvPr id="4" name="Slide Number Placeholder 3"/>
+          <p:cNvSpPr>
+            <a:spLocks noGrp="1"/>
+          </p:cNvSpPr>
+          <p:nvPr>
+            <p:ph type="sldNum" sz="quarter" idx="10"/>
+          </p:nvPr>
+        </p:nvSpPr>
+        <p:spPr/>
+        <p:txBody>
+          <a:bodyPr/>
+          <a:lstStyle/>
+          <a:p>
+            <a:fld id="{F9BF1BD6-11A6-594E-AFA1-283323A41F72}" type="slidenum">
+              <a:rPr lang="en-US" smtClean="0"/>
+              <a:pPr/>
+              <a:t>25</a:t>
+            </a:fld>
+            <a:endParaRPr lang="en-US"/>
+          </a:p>
+        </p:txBody>
+      </p:sp>
+    </p:spTree>
+    <p:extLst>
+      <p:ext uri="{BB962C8B-B14F-4D97-AF65-F5344CB8AC3E}">
+        <p14:creationId xmlns:p14="http://schemas.microsoft.com/office/powerpoint/2010/main" val="1485957701"/>
+      </p:ext>
+    </p:extLst>
+  </p:cSld>
+  <p:clrMapOvr>
+    <a:masterClrMapping/>
+  </p:clrMapOvr>
+</p:notes>
+</file>
+
+<file path=ppt/notesSlides/notesSlide25.xml><?xml version="1.0" encoding="utf-8"?>
+<p:notes xmlns:a="http://schemas.openxmlformats.org/drawingml/2006/main" xmlns:r="http://schemas.openxmlformats.org/officeDocument/2006/relationships" xmlns:p="http://schemas.openxmlformats.org/presentationml/2006/main">
+  <p:cSld>
+    <p:spTree>
+      <p:nvGrpSpPr>
+        <p:cNvPr id="1" name=""/>
+        <p:cNvGrpSpPr/>
+        <p:nvPr/>
+      </p:nvGrpSpPr>
+      <p:grpSpPr>
+        <a:xfrm>
+          <a:off x="0" y="0"/>
+          <a:ext cx="0" cy="0"/>
+          <a:chOff x="0" y="0"/>
+          <a:chExt cx="0" cy="0"/>
+        </a:xfrm>
+      </p:grpSpPr>
+      <p:sp>
+        <p:nvSpPr>
+          <p:cNvPr id="2" name="Slide Image Placeholder 1"/>
+          <p:cNvSpPr>
+            <a:spLocks noGrp="1" noRot="1" noChangeAspect="1"/>
+          </p:cNvSpPr>
+          <p:nvPr>
+            <p:ph type="sldImg"/>
+          </p:nvPr>
+        </p:nvSpPr>
+        <p:spPr/>
+      </p:sp>
+      <p:sp>
+        <p:nvSpPr>
+          <p:cNvPr id="3" name="Notes Placeholder 2"/>
+          <p:cNvSpPr>
+            <a:spLocks noGrp="1"/>
+          </p:cNvSpPr>
+          <p:nvPr>
+            <p:ph type="body" idx="1"/>
+          </p:nvPr>
+        </p:nvSpPr>
+        <p:spPr/>
+        <p:txBody>
+          <a:bodyPr/>
+          <a:lstStyle/>
+          <a:p>
+            <a:r>
+              <a:rPr lang="en-US" dirty="0" smtClean="0"/>
+              <a:t>Here</a:t>
+            </a:r>
+            <a:r>
+              <a:rPr lang="en-US" baseline="0" dirty="0" smtClean="0"/>
+              <a:t> are the identifiers that I defined in the ‘with’ clause – we join those using the </a:t>
+            </a:r>
+            <a:r>
+              <a:rPr lang="en-US" baseline="0" dirty="0" err="1" smtClean="0"/>
+              <a:t>seq_id</a:t>
+            </a:r>
+            <a:endParaRPr lang="en-US" baseline="0" dirty="0" smtClean="0"/>
+          </a:p>
+          <a:p>
+            <a:endParaRPr lang="en-US" baseline="0" dirty="0" smtClean="0"/>
+          </a:p>
+          <a:p>
+            <a:r>
+              <a:rPr lang="en-US" baseline="0" dirty="0" smtClean="0"/>
+              <a:t>And then we join to 3 other tables that didn’t need to be involved in ‘with’ clauses</a:t>
+            </a:r>
+            <a:endParaRPr lang="en-US" dirty="0"/>
+          </a:p>
+        </p:txBody>
+      </p:sp>
+      <p:sp>
+        <p:nvSpPr>
+          <p:cNvPr id="4" name="Slide Number Placeholder 3"/>
+          <p:cNvSpPr>
+            <a:spLocks noGrp="1"/>
+          </p:cNvSpPr>
+          <p:nvPr>
+            <p:ph type="sldNum" sz="quarter" idx="10"/>
+          </p:nvPr>
+        </p:nvSpPr>
+        <p:spPr/>
+        <p:txBody>
+          <a:bodyPr/>
+          <a:lstStyle/>
+          <a:p>
+            <a:fld id="{F9BF1BD6-11A6-594E-AFA1-283323A41F72}" type="slidenum">
+              <a:rPr lang="en-US" smtClean="0"/>
+              <a:pPr/>
+              <a:t>26</a:t>
+            </a:fld>
+            <a:endParaRPr lang="en-US"/>
+          </a:p>
+        </p:txBody>
+      </p:sp>
+    </p:spTree>
+    <p:extLst>
+      <p:ext uri="{BB962C8B-B14F-4D97-AF65-F5344CB8AC3E}">
+        <p14:creationId xmlns:p14="http://schemas.microsoft.com/office/powerpoint/2010/main" val="1485957701"/>
       </p:ext>
     </p:extLst>
   </p:cSld>
@@ -2211,8 +2844,16 @@
           <a:lstStyle/>
           <a:p>
             <a:r>
+              <a:rPr lang="en-US" dirty="0" smtClean="0"/>
+              <a:t>Embedded in another </a:t>
+            </a:r>
+            <a:r>
               <a:rPr lang="en-US" dirty="0" err="1" smtClean="0"/>
               <a:t>subquery</a:t>
+            </a:r>
+            <a:r>
+              <a:rPr lang="en-US" dirty="0" smtClean="0"/>
+              <a:t>, this one in a ‘from’ clause</a:t>
             </a:r>
             <a:endParaRPr lang="en-US" dirty="0"/>
           </a:p>
@@ -2300,8 +2941,16 @@
           <a:lstStyle/>
           <a:p>
             <a:r>
+              <a:rPr lang="en-US" dirty="0" smtClean="0"/>
+              <a:t>Embedded in another </a:t>
+            </a:r>
+            <a:r>
               <a:rPr lang="en-US" dirty="0" err="1" smtClean="0"/>
               <a:t>subquery</a:t>
+            </a:r>
+            <a:r>
+              <a:rPr lang="en-US" dirty="0" smtClean="0"/>
+              <a:t>, in another from clause</a:t>
             </a:r>
             <a:endParaRPr lang="en-US" dirty="0"/>
           </a:p>
@@ -2389,15 +3038,51 @@
           <a:lstStyle/>
           <a:p>
             <a:r>
+              <a:rPr lang="en-US" dirty="0" smtClean="0"/>
+              <a:t>Embedded in another </a:t>
+            </a:r>
+            <a:r>
               <a:rPr lang="en-US" dirty="0" err="1" smtClean="0"/>
-              <a:t>Subquery</a:t>
+              <a:t>subquery</a:t>
+            </a:r>
+            <a:r>
+              <a:rPr lang="en-US" dirty="0" smtClean="0"/>
+              <a:t> so that we make sure that the ‘order</a:t>
+            </a:r>
+            <a:r>
+              <a:rPr lang="en-US" baseline="0" dirty="0" smtClean="0"/>
+              <a:t> by’ happens after the ‘group by’</a:t>
             </a:r>
             <a:endParaRPr lang="en-US" dirty="0" smtClean="0"/>
           </a:p>
           <a:p>
             <a:r>
               <a:rPr lang="en-US" dirty="0" smtClean="0"/>
-              <a:t>Now we move on to some</a:t>
+              <a:t>And</a:t>
+            </a:r>
+            <a:r>
+              <a:rPr lang="en-US" baseline="0" dirty="0" smtClean="0"/>
+              <a:t> so that we can order by some columns derived in the select clause</a:t>
+            </a:r>
+          </a:p>
+          <a:p>
+            <a:r>
+              <a:rPr lang="en-US" baseline="0" dirty="0" smtClean="0"/>
+              <a:t>Maybe I could have used a ‘having’ clause after the ‘group by’, but I didn’t so…</a:t>
+            </a:r>
+            <a:endParaRPr lang="en-US" dirty="0" smtClean="0"/>
+          </a:p>
+          <a:p>
+            <a:endParaRPr lang="en-US" dirty="0" smtClean="0"/>
+          </a:p>
+          <a:p>
+            <a:r>
+              <a:rPr lang="en-US" dirty="0" smtClean="0"/>
+              <a:t>Now </a:t>
+            </a:r>
+            <a:r>
+              <a:rPr lang="en-US" dirty="0" smtClean="0"/>
+              <a:t>we move on to some</a:t>
             </a:r>
             <a:r>
               <a:rPr lang="en-US" baseline="0" dirty="0" smtClean="0"/>
@@ -2490,7 +3175,7 @@
           <a:p>
             <a:r>
               <a:rPr lang="en-US" dirty="0" smtClean="0"/>
-              <a:t>label</a:t>
+              <a:t>Label called ‘x’ – that’s a good name</a:t>
             </a:r>
             <a:endParaRPr lang="en-US" dirty="0"/>
           </a:p>
@@ -2579,7 +3264,39 @@
           <a:p>
             <a:r>
               <a:rPr lang="en-US" dirty="0" smtClean="0"/>
-              <a:t>label</a:t>
+              <a:t>A</a:t>
+            </a:r>
+            <a:r>
+              <a:rPr lang="en-US" baseline="0" dirty="0" smtClean="0"/>
+              <a:t> label called </a:t>
+            </a:r>
+            <a:r>
+              <a:rPr lang="en-US" baseline="0" dirty="0" err="1" smtClean="0"/>
+              <a:t>iiri</a:t>
+            </a:r>
+            <a:r>
+              <a:rPr lang="en-US" baseline="0" dirty="0" smtClean="0"/>
+              <a:t> – maybe a bit better name</a:t>
+            </a:r>
+          </a:p>
+          <a:p>
+            <a:r>
+              <a:rPr lang="en-US" baseline="0" dirty="0" smtClean="0"/>
+              <a:t>II = </a:t>
+            </a:r>
+            <a:r>
+              <a:rPr lang="en-US" baseline="0" dirty="0" err="1" smtClean="0"/>
+              <a:t>index_illumina</a:t>
+            </a:r>
+            <a:r>
+              <a:rPr lang="en-US" baseline="0" dirty="0" smtClean="0"/>
+              <a:t> – to get into the domain a bit</a:t>
+            </a:r>
+          </a:p>
+          <a:p>
+            <a:r>
+              <a:rPr lang="en-US" baseline="0" dirty="0" smtClean="0"/>
+              <a:t>That’s the main table that we’re querying here</a:t>
             </a:r>
             <a:endParaRPr lang="en-US" dirty="0"/>
           </a:p>
@@ -2668,9 +3385,21 @@
           <a:p>
             <a:r>
               <a:rPr lang="en-US" dirty="0" smtClean="0"/>
-              <a:t>Label – so when I come back to this to try to modify it I think</a:t>
-            </a:r>
+              <a:t>And a label called ‘y’ – to go along with ‘x’ – great name</a:t>
+            </a:r>
+          </a:p>
+          <a:p>
             <a:endParaRPr lang="en-US" dirty="0" smtClean="0"/>
+          </a:p>
+          <a:p>
+            <a:r>
+              <a:rPr lang="en-US" dirty="0" smtClean="0"/>
+              <a:t>Label </a:t>
+            </a:r>
+            <a:r>
+              <a:rPr lang="en-US" dirty="0" smtClean="0"/>
+              <a:t>– so when I come back to this to try to modify it I think</a:t>
+            </a:r>
           </a:p>
           <a:p>
             <a:r>
@@ -2709,7 +3438,11 @@
           <a:p>
             <a:r>
               <a:rPr lang="en-US" baseline="0" dirty="0" smtClean="0"/>
-              <a:t>So I was wanting to try using “with” clauses, and I decided to try them here</a:t>
+              <a:t>So I was wanting to try using “with” clauses, and I decided to try them </a:t>
+            </a:r>
+            <a:r>
+              <a:rPr lang="en-US" baseline="0" dirty="0" smtClean="0"/>
+              <a:t>here – let’s look at the basic structure of ‘with’</a:t>
             </a:r>
             <a:endParaRPr lang="en-US" dirty="0"/>
           </a:p>
@@ -2804,6 +3537,30 @@
           <a:p>
             <a:r>
               <a:rPr lang="en-US" dirty="0" smtClean="0"/>
+              <a:t>With </a:t>
+            </a:r>
+            <a:r>
+              <a:rPr lang="en-US" dirty="0" smtClean="0"/>
+              <a:t>clause comes before</a:t>
+            </a:r>
+            <a:r>
+              <a:rPr lang="en-US" baseline="0" dirty="0" smtClean="0"/>
+              <a:t> the select – and then you can use the aliases in the from/join clauses like they were </a:t>
+            </a:r>
+            <a:r>
+              <a:rPr lang="en-US" baseline="0" dirty="0" smtClean="0"/>
+              <a:t>tables</a:t>
+            </a:r>
+          </a:p>
+          <a:p>
+            <a:r>
+              <a:rPr lang="en-US" baseline="0" dirty="0" smtClean="0"/>
+              <a:t>We might think of it as</a:t>
+            </a:r>
+          </a:p>
+          <a:p>
+            <a:r>
+              <a:rPr lang="en-US" dirty="0" smtClean="0"/>
               <a:t>‘</a:t>
             </a:r>
             <a:r>
@@ -2817,19 +3574,20 @@
           </a:p>
           <a:p>
             <a:r>
-              <a:rPr lang="en-US" smtClean="0"/>
+              <a:rPr lang="en-US" dirty="0" smtClean="0"/>
               <a:t>“inline view”</a:t>
             </a:r>
           </a:p>
           <a:p>
+            <a:endParaRPr lang="en-US" dirty="0" smtClean="0"/>
+          </a:p>
+          <a:p>
             <a:r>
               <a:rPr lang="en-US" dirty="0" smtClean="0"/>
-              <a:t>With clause comes before</a:t>
-            </a:r>
-            <a:r>
-              <a:rPr lang="en-US" baseline="0" dirty="0" smtClean="0"/>
-              <a:t> the select – and then you can use the aliases in the from/join clauses like they were tables</a:t>
-            </a:r>
+              <a:t>Here are the references…</a:t>
+            </a:r>
+          </a:p>
+          <a:p>
             <a:endParaRPr lang="en-US" dirty="0"/>
           </a:p>
         </p:txBody>
@@ -4979,11 +5737,7 @@
             </a:br>
             <a:r>
               <a:rPr lang="en-US" sz="1800" dirty="0" smtClean="0"/>
-              <a:t>some SQL </a:t>
-            </a:r>
-            <a:r>
-              <a:rPr lang="en-US" sz="1800" dirty="0" smtClean="0"/>
-              <a:t>clauses you may not have tried</a:t>
+              <a:t>some SQL clauses you may not have tried</a:t>
             </a:r>
             <a:endParaRPr lang="en-US" dirty="0"/>
           </a:p>
@@ -5699,6 +6453,13 @@
   <p:clrMapOvr>
     <a:masterClrMapping/>
   </p:clrMapOvr>
+  <p:timing>
+    <p:tnLst>
+      <p:par>
+        <p:cTn xmlns:p14="http://schemas.microsoft.com/office/powerpoint/2010/main" id="1" dur="indefinite" restart="never" nodeType="tmRoot"/>
+      </p:par>
+    </p:tnLst>
+  </p:timing>
 </p:sld>
 </file>
 
@@ -5785,6 +6546,13 @@
   <p:clrMapOvr>
     <a:masterClrMapping/>
   </p:clrMapOvr>
+  <p:timing>
+    <p:tnLst>
+      <p:par>
+        <p:cTn xmlns:p14="http://schemas.microsoft.com/office/powerpoint/2010/main" id="1" dur="indefinite" restart="never" nodeType="tmRoot"/>
+      </p:par>
+    </p:tnLst>
+  </p:timing>
 </p:sld>
 </file>
 
@@ -6000,6 +6768,13 @@
   <p:clrMapOvr>
     <a:masterClrMapping/>
   </p:clrMapOvr>
+  <p:timing>
+    <p:tnLst>
+      <p:par>
+        <p:cTn xmlns:p14="http://schemas.microsoft.com/office/powerpoint/2010/main" id="1" dur="indefinite" restart="never" nodeType="tmRoot"/>
+      </p:par>
+    </p:tnLst>
+  </p:timing>
 </p:sld>
 </file>
 
@@ -6086,6 +6861,13 @@
   <p:clrMapOvr>
     <a:masterClrMapping/>
   </p:clrMapOvr>
+  <p:timing>
+    <p:tnLst>
+      <p:par>
+        <p:cTn xmlns:p14="http://schemas.microsoft.com/office/powerpoint/2010/main" id="1" dur="indefinite" restart="never" nodeType="tmRoot"/>
+      </p:par>
+    </p:tnLst>
+  </p:timing>
 </p:sld>
 </file>
 
@@ -6215,6 +6997,13 @@
   <p:clrMapOvr>
     <a:masterClrMapping/>
   </p:clrMapOvr>
+  <p:timing>
+    <p:tnLst>
+      <p:par>
+        <p:cTn xmlns:p14="http://schemas.microsoft.com/office/powerpoint/2010/main" id="1" dur="indefinite" restart="never" nodeType="tmRoot"/>
+      </p:par>
+    </p:tnLst>
+  </p:timing>
 </p:sld>
 </file>
 
@@ -6387,6 +7176,13 @@
   <p:clrMapOvr>
     <a:masterClrMapping/>
   </p:clrMapOvr>
+  <p:timing>
+    <p:tnLst>
+      <p:par>
+        <p:cTn xmlns:p14="http://schemas.microsoft.com/office/powerpoint/2010/main" id="1" dur="indefinite" restart="never" nodeType="tmRoot"/>
+      </p:par>
+    </p:tnLst>
+  </p:timing>
 </p:sld>
 </file>
 
@@ -6478,6 +7274,13 @@
   <p:clrMapOvr>
     <a:masterClrMapping/>
   </p:clrMapOvr>
+  <p:timing>
+    <p:tnLst>
+      <p:par>
+        <p:cTn xmlns:p14="http://schemas.microsoft.com/office/powerpoint/2010/main" id="1" dur="indefinite" restart="never" nodeType="tmRoot"/>
+      </p:par>
+    </p:tnLst>
+  </p:timing>
 </p:sld>
 </file>
 
@@ -6612,6 +7415,13 @@
   <p:clrMapOvr>
     <a:masterClrMapping/>
   </p:clrMapOvr>
+  <p:timing>
+    <p:tnLst>
+      <p:par>
+        <p:cTn xmlns:p14="http://schemas.microsoft.com/office/powerpoint/2010/main" id="1" dur="indefinite" restart="never" nodeType="tmRoot"/>
+      </p:par>
+    </p:tnLst>
+  </p:timing>
 </p:sld>
 </file>
 
@@ -6782,6 +7592,13 @@
   <p:clrMapOvr>
     <a:masterClrMapping/>
   </p:clrMapOvr>
+  <p:timing>
+    <p:tnLst>
+      <p:par>
+        <p:cTn xmlns:p14="http://schemas.microsoft.com/office/powerpoint/2010/main" id="1" dur="indefinite" restart="never" nodeType="tmRoot"/>
+      </p:par>
+    </p:tnLst>
+  </p:timing>
 </p:sld>
 </file>
 
@@ -6836,7 +7653,7 @@
           </p:nvPr>
         </p:nvPicPr>
         <p:blipFill>
-          <a:blip r:embed="rId2">
+          <a:blip r:embed="rId3">
             <a:extLst>
               <a:ext uri="{28A0092B-C50C-407E-A947-70E740481C1C}">
                 <a14:useLocalDpi xmlns:a14="http://schemas.microsoft.com/office/drawing/2010/main" val="0"/>
@@ -6860,6 +7677,13 @@
   <p:clrMapOvr>
     <a:masterClrMapping/>
   </p:clrMapOvr>
+  <p:timing>
+    <p:tnLst>
+      <p:par>
+        <p:cTn xmlns:p14="http://schemas.microsoft.com/office/powerpoint/2010/main" id="1" dur="indefinite" restart="never" nodeType="tmRoot"/>
+      </p:par>
+    </p:tnLst>
+  </p:timing>
 </p:sld>
 </file>
 
@@ -7153,6 +7977,13 @@
   <p:clrMapOvr>
     <a:masterClrMapping/>
   </p:clrMapOvr>
+  <p:timing>
+    <p:tnLst>
+      <p:par>
+        <p:cTn xmlns:p14="http://schemas.microsoft.com/office/powerpoint/2010/main" id="1" dur="indefinite" restart="never" nodeType="tmRoot"/>
+      </p:par>
+    </p:tnLst>
+  </p:timing>
 </p:sld>
 </file>
 
@@ -7375,6 +8206,1209 @@
       </p:par>
     </p:tnLst>
   </p:timing>
+</p:sld>
+</file>
+
+<file path=ppt/slides/slide24.xml><?xml version="1.0" encoding="utf-8"?>
+<p:sld xmlns:a="http://schemas.openxmlformats.org/drawingml/2006/main" xmlns:r="http://schemas.openxmlformats.org/officeDocument/2006/relationships" xmlns:p="http://schemas.openxmlformats.org/presentationml/2006/main">
+  <p:cSld>
+    <p:spTree>
+      <p:nvGrpSpPr>
+        <p:cNvPr id="1" name=""/>
+        <p:cNvGrpSpPr/>
+        <p:nvPr/>
+      </p:nvGrpSpPr>
+      <p:grpSpPr>
+        <a:xfrm>
+          <a:off x="0" y="0"/>
+          <a:ext cx="0" cy="0"/>
+          <a:chOff x="0" y="0"/>
+          <a:chExt cx="0" cy="0"/>
+        </a:xfrm>
+      </p:grpSpPr>
+      <p:sp>
+        <p:nvSpPr>
+          <p:cNvPr id="2" name="Title 1"/>
+          <p:cNvSpPr>
+            <a:spLocks noGrp="1"/>
+          </p:cNvSpPr>
+          <p:nvPr>
+            <p:ph type="title"/>
+          </p:nvPr>
+        </p:nvSpPr>
+        <p:spPr/>
+        <p:txBody>
+          <a:bodyPr/>
+          <a:lstStyle/>
+          <a:p>
+            <a:r>
+              <a:rPr lang="en-US" dirty="0" smtClean="0"/>
+              <a:t>From clause</a:t>
+            </a:r>
+            <a:endParaRPr lang="en-US" dirty="0"/>
+          </a:p>
+        </p:txBody>
+      </p:sp>
+      <p:pic>
+        <p:nvPicPr>
+          <p:cNvPr id="4" name="Content Placeholder 3" descr="sql2-g-from.pdf"/>
+          <p:cNvPicPr>
+            <a:picLocks noGrp="1" noChangeAspect="1"/>
+          </p:cNvPicPr>
+          <p:nvPr>
+            <p:ph idx="1"/>
+          </p:nvPr>
+        </p:nvPicPr>
+        <p:blipFill>
+          <a:blip r:embed="rId3">
+            <a:extLst>
+              <a:ext uri="{28A0092B-C50C-407E-A947-70E740481C1C}">
+                <a14:useLocalDpi xmlns:a14="http://schemas.microsoft.com/office/drawing/2010/main" val="0"/>
+              </a:ext>
+            </a:extLst>
+          </a:blip>
+          <a:srcRect t="-62105" b="-62105"/>
+          <a:stretch>
+            <a:fillRect/>
+          </a:stretch>
+        </p:blipFill>
+        <p:spPr/>
+      </p:pic>
+    </p:spTree>
+    <p:extLst>
+      <p:ext uri="{BB962C8B-B14F-4D97-AF65-F5344CB8AC3E}">
+        <p14:creationId xmlns:p14="http://schemas.microsoft.com/office/powerpoint/2010/main" val="1110674133"/>
+      </p:ext>
+    </p:extLst>
+  </p:cSld>
+  <p:clrMapOvr>
+    <a:masterClrMapping/>
+  </p:clrMapOvr>
+</p:sld>
+</file>
+
+<file path=ppt/slides/slide25.xml><?xml version="1.0" encoding="utf-8"?>
+<p:sld xmlns:a="http://schemas.openxmlformats.org/drawingml/2006/main" xmlns:r="http://schemas.openxmlformats.org/officeDocument/2006/relationships" xmlns:p="http://schemas.openxmlformats.org/presentationml/2006/main">
+  <p:cSld>
+    <p:spTree>
+      <p:nvGrpSpPr>
+        <p:cNvPr id="1" name=""/>
+        <p:cNvGrpSpPr/>
+        <p:nvPr/>
+      </p:nvGrpSpPr>
+      <p:grpSpPr>
+        <a:xfrm>
+          <a:off x="0" y="0"/>
+          <a:ext cx="0" cy="0"/>
+          <a:chOff x="0" y="0"/>
+          <a:chExt cx="0" cy="0"/>
+        </a:xfrm>
+      </p:grpSpPr>
+      <p:sp>
+        <p:nvSpPr>
+          <p:cNvPr id="2" name="Title 1"/>
+          <p:cNvSpPr>
+            <a:spLocks noGrp="1"/>
+          </p:cNvSpPr>
+          <p:nvPr>
+            <p:ph type="title"/>
+          </p:nvPr>
+        </p:nvSpPr>
+        <p:spPr/>
+        <p:txBody>
+          <a:bodyPr/>
+          <a:lstStyle/>
+          <a:p>
+            <a:r>
+              <a:rPr lang="en-US" dirty="0" smtClean="0"/>
+              <a:t>From clause</a:t>
+            </a:r>
+            <a:endParaRPr lang="en-US" dirty="0"/>
+          </a:p>
+        </p:txBody>
+      </p:sp>
+      <p:pic>
+        <p:nvPicPr>
+          <p:cNvPr id="4" name="Content Placeholder 3" descr="sql2-g-from.pdf"/>
+          <p:cNvPicPr>
+            <a:picLocks noGrp="1" noChangeAspect="1"/>
+          </p:cNvPicPr>
+          <p:nvPr>
+            <p:ph idx="1"/>
+          </p:nvPr>
+        </p:nvPicPr>
+        <p:blipFill>
+          <a:blip r:embed="rId3">
+            <a:extLst>
+              <a:ext uri="{28A0092B-C50C-407E-A947-70E740481C1C}">
+                <a14:useLocalDpi xmlns:a14="http://schemas.microsoft.com/office/drawing/2010/main" val="0"/>
+              </a:ext>
+            </a:extLst>
+          </a:blip>
+          <a:srcRect t="-62105" b="-62105"/>
+          <a:stretch>
+            <a:fillRect/>
+          </a:stretch>
+        </p:blipFill>
+        <p:spPr/>
+      </p:pic>
+      <p:sp>
+        <p:nvSpPr>
+          <p:cNvPr id="5" name="Rectangle 4"/>
+          <p:cNvSpPr/>
+          <p:nvPr/>
+        </p:nvSpPr>
+        <p:spPr>
+          <a:xfrm>
+            <a:off x="2513263" y="3088105"/>
+            <a:ext cx="681790" cy="280737"/>
+          </a:xfrm>
+          <a:prstGeom prst="rect">
+            <a:avLst/>
+          </a:prstGeom>
+          <a:gradFill flip="none" rotWithShape="1">
+            <a:gsLst>
+              <a:gs pos="0">
+                <a:schemeClr val="accent1">
+                  <a:tint val="100000"/>
+                  <a:shade val="100000"/>
+                  <a:satMod val="130000"/>
+                  <a:alpha val="29000"/>
+                </a:schemeClr>
+              </a:gs>
+              <a:gs pos="100000">
+                <a:schemeClr val="accent1">
+                  <a:tint val="50000"/>
+                  <a:shade val="100000"/>
+                  <a:satMod val="350000"/>
+                  <a:alpha val="29000"/>
+                </a:schemeClr>
+              </a:gs>
+            </a:gsLst>
+            <a:lin ang="16200000" scaled="0"/>
+            <a:tileRect/>
+          </a:gradFill>
+        </p:spPr>
+        <p:style>
+          <a:lnRef idx="1">
+            <a:schemeClr val="accent1"/>
+          </a:lnRef>
+          <a:fillRef idx="3">
+            <a:schemeClr val="accent1"/>
+          </a:fillRef>
+          <a:effectRef idx="2">
+            <a:schemeClr val="accent1"/>
+          </a:effectRef>
+          <a:fontRef idx="minor">
+            <a:schemeClr val="lt1"/>
+          </a:fontRef>
+        </p:style>
+        <p:txBody>
+          <a:bodyPr rtlCol="0" anchor="ctr"/>
+          <a:lstStyle/>
+          <a:p>
+            <a:pPr algn="ctr"/>
+            <a:endParaRPr lang="en-US"/>
+          </a:p>
+        </p:txBody>
+      </p:sp>
+      <p:sp>
+        <p:nvSpPr>
+          <p:cNvPr id="6" name="Rectangle 5"/>
+          <p:cNvSpPr/>
+          <p:nvPr/>
+        </p:nvSpPr>
+        <p:spPr>
+          <a:xfrm>
+            <a:off x="2513263" y="3481137"/>
+            <a:ext cx="681790" cy="280737"/>
+          </a:xfrm>
+          <a:prstGeom prst="rect">
+            <a:avLst/>
+          </a:prstGeom>
+          <a:gradFill flip="none" rotWithShape="1">
+            <a:gsLst>
+              <a:gs pos="0">
+                <a:schemeClr val="accent1">
+                  <a:tint val="100000"/>
+                  <a:shade val="100000"/>
+                  <a:satMod val="130000"/>
+                  <a:alpha val="29000"/>
+                </a:schemeClr>
+              </a:gs>
+              <a:gs pos="100000">
+                <a:schemeClr val="accent1">
+                  <a:tint val="50000"/>
+                  <a:shade val="100000"/>
+                  <a:satMod val="350000"/>
+                  <a:alpha val="29000"/>
+                </a:schemeClr>
+              </a:gs>
+            </a:gsLst>
+            <a:lin ang="16200000" scaled="0"/>
+            <a:tileRect/>
+          </a:gradFill>
+        </p:spPr>
+        <p:style>
+          <a:lnRef idx="1">
+            <a:schemeClr val="accent1"/>
+          </a:lnRef>
+          <a:fillRef idx="3">
+            <a:schemeClr val="accent1"/>
+          </a:fillRef>
+          <a:effectRef idx="2">
+            <a:schemeClr val="accent1"/>
+          </a:effectRef>
+          <a:fontRef idx="minor">
+            <a:schemeClr val="lt1"/>
+          </a:fontRef>
+        </p:style>
+        <p:txBody>
+          <a:bodyPr rtlCol="0" anchor="ctr"/>
+          <a:lstStyle/>
+          <a:p>
+            <a:pPr algn="ctr"/>
+            <a:endParaRPr lang="en-US"/>
+          </a:p>
+        </p:txBody>
+      </p:sp>
+      <p:sp>
+        <p:nvSpPr>
+          <p:cNvPr id="7" name="Rectangle 6"/>
+          <p:cNvSpPr/>
+          <p:nvPr/>
+        </p:nvSpPr>
+        <p:spPr>
+          <a:xfrm>
+            <a:off x="6876716" y="3761874"/>
+            <a:ext cx="681790" cy="280737"/>
+          </a:xfrm>
+          <a:prstGeom prst="rect">
+            <a:avLst/>
+          </a:prstGeom>
+          <a:gradFill flip="none" rotWithShape="1">
+            <a:gsLst>
+              <a:gs pos="0">
+                <a:schemeClr val="accent1">
+                  <a:tint val="100000"/>
+                  <a:shade val="100000"/>
+                  <a:satMod val="130000"/>
+                  <a:alpha val="29000"/>
+                </a:schemeClr>
+              </a:gs>
+              <a:gs pos="100000">
+                <a:schemeClr val="accent1">
+                  <a:tint val="50000"/>
+                  <a:shade val="100000"/>
+                  <a:satMod val="350000"/>
+                  <a:alpha val="29000"/>
+                </a:schemeClr>
+              </a:gs>
+            </a:gsLst>
+            <a:lin ang="16200000" scaled="0"/>
+            <a:tileRect/>
+          </a:gradFill>
+        </p:spPr>
+        <p:style>
+          <a:lnRef idx="1">
+            <a:schemeClr val="accent1"/>
+          </a:lnRef>
+          <a:fillRef idx="3">
+            <a:schemeClr val="accent1"/>
+          </a:fillRef>
+          <a:effectRef idx="2">
+            <a:schemeClr val="accent1"/>
+          </a:effectRef>
+          <a:fontRef idx="minor">
+            <a:schemeClr val="lt1"/>
+          </a:fontRef>
+        </p:style>
+        <p:txBody>
+          <a:bodyPr rtlCol="0" anchor="ctr"/>
+          <a:lstStyle/>
+          <a:p>
+            <a:pPr algn="ctr"/>
+            <a:endParaRPr lang="en-US"/>
+          </a:p>
+        </p:txBody>
+      </p:sp>
+      <p:sp>
+        <p:nvSpPr>
+          <p:cNvPr id="8" name="Rectangle 7"/>
+          <p:cNvSpPr/>
+          <p:nvPr/>
+        </p:nvSpPr>
+        <p:spPr>
+          <a:xfrm>
+            <a:off x="4649537" y="4080043"/>
+            <a:ext cx="681790" cy="280737"/>
+          </a:xfrm>
+          <a:prstGeom prst="rect">
+            <a:avLst/>
+          </a:prstGeom>
+          <a:gradFill flip="none" rotWithShape="1">
+            <a:gsLst>
+              <a:gs pos="0">
+                <a:schemeClr val="accent1">
+                  <a:tint val="100000"/>
+                  <a:shade val="100000"/>
+                  <a:satMod val="130000"/>
+                  <a:alpha val="29000"/>
+                </a:schemeClr>
+              </a:gs>
+              <a:gs pos="100000">
+                <a:schemeClr val="accent1">
+                  <a:tint val="50000"/>
+                  <a:shade val="100000"/>
+                  <a:satMod val="350000"/>
+                  <a:alpha val="29000"/>
+                </a:schemeClr>
+              </a:gs>
+            </a:gsLst>
+            <a:lin ang="16200000" scaled="0"/>
+            <a:tileRect/>
+          </a:gradFill>
+        </p:spPr>
+        <p:style>
+          <a:lnRef idx="1">
+            <a:schemeClr val="accent1"/>
+          </a:lnRef>
+          <a:fillRef idx="3">
+            <a:schemeClr val="accent1"/>
+          </a:fillRef>
+          <a:effectRef idx="2">
+            <a:schemeClr val="accent1"/>
+          </a:effectRef>
+          <a:fontRef idx="minor">
+            <a:schemeClr val="lt1"/>
+          </a:fontRef>
+        </p:style>
+        <p:txBody>
+          <a:bodyPr rtlCol="0" anchor="ctr"/>
+          <a:lstStyle/>
+          <a:p>
+            <a:pPr algn="ctr"/>
+            <a:endParaRPr lang="en-US"/>
+          </a:p>
+        </p:txBody>
+      </p:sp>
+      <p:sp>
+        <p:nvSpPr>
+          <p:cNvPr id="9" name="Rectangle 8"/>
+          <p:cNvSpPr/>
+          <p:nvPr/>
+        </p:nvSpPr>
+        <p:spPr>
+          <a:xfrm>
+            <a:off x="5331327" y="4372811"/>
+            <a:ext cx="681790" cy="280737"/>
+          </a:xfrm>
+          <a:prstGeom prst="rect">
+            <a:avLst/>
+          </a:prstGeom>
+          <a:gradFill flip="none" rotWithShape="1">
+            <a:gsLst>
+              <a:gs pos="0">
+                <a:schemeClr val="accent1">
+                  <a:tint val="100000"/>
+                  <a:shade val="100000"/>
+                  <a:satMod val="130000"/>
+                  <a:alpha val="29000"/>
+                </a:schemeClr>
+              </a:gs>
+              <a:gs pos="100000">
+                <a:schemeClr val="accent1">
+                  <a:tint val="50000"/>
+                  <a:shade val="100000"/>
+                  <a:satMod val="350000"/>
+                  <a:alpha val="29000"/>
+                </a:schemeClr>
+              </a:gs>
+            </a:gsLst>
+            <a:lin ang="16200000" scaled="0"/>
+            <a:tileRect/>
+          </a:gradFill>
+        </p:spPr>
+        <p:style>
+          <a:lnRef idx="1">
+            <a:schemeClr val="accent1"/>
+          </a:lnRef>
+          <a:fillRef idx="3">
+            <a:schemeClr val="accent1"/>
+          </a:fillRef>
+          <a:effectRef idx="2">
+            <a:schemeClr val="accent1"/>
+          </a:effectRef>
+          <a:fontRef idx="minor">
+            <a:schemeClr val="lt1"/>
+          </a:fontRef>
+        </p:style>
+        <p:txBody>
+          <a:bodyPr rtlCol="0" anchor="ctr"/>
+          <a:lstStyle/>
+          <a:p>
+            <a:pPr algn="ctr"/>
+            <a:endParaRPr lang="en-US"/>
+          </a:p>
+        </p:txBody>
+      </p:sp>
+    </p:spTree>
+    <p:extLst>
+      <p:ext uri="{BB962C8B-B14F-4D97-AF65-F5344CB8AC3E}">
+        <p14:creationId xmlns:p14="http://schemas.microsoft.com/office/powerpoint/2010/main" val="3711034993"/>
+      </p:ext>
+    </p:extLst>
+  </p:cSld>
+  <p:clrMapOvr>
+    <a:masterClrMapping/>
+  </p:clrMapOvr>
+  <p:timing>
+    <p:tnLst>
+      <p:par>
+        <p:cTn xmlns:p14="http://schemas.microsoft.com/office/powerpoint/2010/main" id="1" dur="indefinite" restart="never" nodeType="tmRoot"/>
+      </p:par>
+    </p:tnLst>
+  </p:timing>
+</p:sld>
+</file>
+
+<file path=ppt/slides/slide26.xml><?xml version="1.0" encoding="utf-8"?>
+<p:sld xmlns:a="http://schemas.openxmlformats.org/drawingml/2006/main" xmlns:r="http://schemas.openxmlformats.org/officeDocument/2006/relationships" xmlns:p="http://schemas.openxmlformats.org/presentationml/2006/main">
+  <p:cSld>
+    <p:spTree>
+      <p:nvGrpSpPr>
+        <p:cNvPr id="1" name=""/>
+        <p:cNvGrpSpPr/>
+        <p:nvPr/>
+      </p:nvGrpSpPr>
+      <p:grpSpPr>
+        <a:xfrm>
+          <a:off x="0" y="0"/>
+          <a:ext cx="0" cy="0"/>
+          <a:chOff x="0" y="0"/>
+          <a:chExt cx="0" cy="0"/>
+        </a:xfrm>
+      </p:grpSpPr>
+      <p:sp>
+        <p:nvSpPr>
+          <p:cNvPr id="2" name="Title 1"/>
+          <p:cNvSpPr>
+            <a:spLocks noGrp="1"/>
+          </p:cNvSpPr>
+          <p:nvPr>
+            <p:ph type="title"/>
+          </p:nvPr>
+        </p:nvSpPr>
+        <p:spPr/>
+        <p:txBody>
+          <a:bodyPr/>
+          <a:lstStyle/>
+          <a:p>
+            <a:r>
+              <a:rPr lang="en-US" dirty="0" smtClean="0"/>
+              <a:t>From clause</a:t>
+            </a:r>
+            <a:endParaRPr lang="en-US" dirty="0"/>
+          </a:p>
+        </p:txBody>
+      </p:sp>
+      <p:pic>
+        <p:nvPicPr>
+          <p:cNvPr id="4" name="Content Placeholder 3" descr="sql2-g-from.pdf"/>
+          <p:cNvPicPr>
+            <a:picLocks noGrp="1" noChangeAspect="1"/>
+          </p:cNvPicPr>
+          <p:nvPr>
+            <p:ph idx="1"/>
+          </p:nvPr>
+        </p:nvPicPr>
+        <p:blipFill>
+          <a:blip r:embed="rId3">
+            <a:extLst>
+              <a:ext uri="{28A0092B-C50C-407E-A947-70E740481C1C}">
+                <a14:useLocalDpi xmlns:a14="http://schemas.microsoft.com/office/drawing/2010/main" val="0"/>
+              </a:ext>
+            </a:extLst>
+          </a:blip>
+          <a:srcRect t="-62105" b="-62105"/>
+          <a:stretch>
+            <a:fillRect/>
+          </a:stretch>
+        </p:blipFill>
+        <p:spPr/>
+      </p:pic>
+      <p:sp>
+        <p:nvSpPr>
+          <p:cNvPr id="5" name="Rectangle 4"/>
+          <p:cNvSpPr/>
+          <p:nvPr/>
+        </p:nvSpPr>
+        <p:spPr>
+          <a:xfrm>
+            <a:off x="2513263" y="3088105"/>
+            <a:ext cx="681790" cy="280737"/>
+          </a:xfrm>
+          <a:prstGeom prst="rect">
+            <a:avLst/>
+          </a:prstGeom>
+          <a:gradFill flip="none" rotWithShape="1">
+            <a:gsLst>
+              <a:gs pos="0">
+                <a:schemeClr val="accent1">
+                  <a:tint val="100000"/>
+                  <a:shade val="100000"/>
+                  <a:satMod val="130000"/>
+                  <a:alpha val="29000"/>
+                </a:schemeClr>
+              </a:gs>
+              <a:gs pos="100000">
+                <a:schemeClr val="accent1">
+                  <a:tint val="50000"/>
+                  <a:shade val="100000"/>
+                  <a:satMod val="350000"/>
+                  <a:alpha val="29000"/>
+                </a:schemeClr>
+              </a:gs>
+            </a:gsLst>
+            <a:lin ang="16200000" scaled="0"/>
+            <a:tileRect/>
+          </a:gradFill>
+        </p:spPr>
+        <p:style>
+          <a:lnRef idx="1">
+            <a:schemeClr val="accent1"/>
+          </a:lnRef>
+          <a:fillRef idx="3">
+            <a:schemeClr val="accent1"/>
+          </a:fillRef>
+          <a:effectRef idx="2">
+            <a:schemeClr val="accent1"/>
+          </a:effectRef>
+          <a:fontRef idx="minor">
+            <a:schemeClr val="lt1"/>
+          </a:fontRef>
+        </p:style>
+        <p:txBody>
+          <a:bodyPr rtlCol="0" anchor="ctr"/>
+          <a:lstStyle/>
+          <a:p>
+            <a:pPr algn="ctr"/>
+            <a:endParaRPr lang="en-US"/>
+          </a:p>
+        </p:txBody>
+      </p:sp>
+      <p:sp>
+        <p:nvSpPr>
+          <p:cNvPr id="6" name="Rectangle 5"/>
+          <p:cNvSpPr/>
+          <p:nvPr/>
+        </p:nvSpPr>
+        <p:spPr>
+          <a:xfrm>
+            <a:off x="2513263" y="3481137"/>
+            <a:ext cx="681790" cy="280737"/>
+          </a:xfrm>
+          <a:prstGeom prst="rect">
+            <a:avLst/>
+          </a:prstGeom>
+          <a:gradFill flip="none" rotWithShape="1">
+            <a:gsLst>
+              <a:gs pos="0">
+                <a:schemeClr val="accent1">
+                  <a:tint val="100000"/>
+                  <a:shade val="100000"/>
+                  <a:satMod val="130000"/>
+                  <a:alpha val="29000"/>
+                </a:schemeClr>
+              </a:gs>
+              <a:gs pos="100000">
+                <a:schemeClr val="accent1">
+                  <a:tint val="50000"/>
+                  <a:shade val="100000"/>
+                  <a:satMod val="350000"/>
+                  <a:alpha val="29000"/>
+                </a:schemeClr>
+              </a:gs>
+            </a:gsLst>
+            <a:lin ang="16200000" scaled="0"/>
+            <a:tileRect/>
+          </a:gradFill>
+        </p:spPr>
+        <p:style>
+          <a:lnRef idx="1">
+            <a:schemeClr val="accent1"/>
+          </a:lnRef>
+          <a:fillRef idx="3">
+            <a:schemeClr val="accent1"/>
+          </a:fillRef>
+          <a:effectRef idx="2">
+            <a:schemeClr val="accent1"/>
+          </a:effectRef>
+          <a:fontRef idx="minor">
+            <a:schemeClr val="lt1"/>
+          </a:fontRef>
+        </p:style>
+        <p:txBody>
+          <a:bodyPr rtlCol="0" anchor="ctr"/>
+          <a:lstStyle/>
+          <a:p>
+            <a:pPr algn="ctr"/>
+            <a:endParaRPr lang="en-US"/>
+          </a:p>
+        </p:txBody>
+      </p:sp>
+      <p:sp>
+        <p:nvSpPr>
+          <p:cNvPr id="7" name="Rectangle 6"/>
+          <p:cNvSpPr/>
+          <p:nvPr/>
+        </p:nvSpPr>
+        <p:spPr>
+          <a:xfrm>
+            <a:off x="6876716" y="3761874"/>
+            <a:ext cx="681790" cy="280737"/>
+          </a:xfrm>
+          <a:prstGeom prst="rect">
+            <a:avLst/>
+          </a:prstGeom>
+          <a:gradFill flip="none" rotWithShape="1">
+            <a:gsLst>
+              <a:gs pos="0">
+                <a:schemeClr val="accent1">
+                  <a:tint val="100000"/>
+                  <a:shade val="100000"/>
+                  <a:satMod val="130000"/>
+                  <a:alpha val="29000"/>
+                </a:schemeClr>
+              </a:gs>
+              <a:gs pos="100000">
+                <a:schemeClr val="accent1">
+                  <a:tint val="50000"/>
+                  <a:shade val="100000"/>
+                  <a:satMod val="350000"/>
+                  <a:alpha val="29000"/>
+                </a:schemeClr>
+              </a:gs>
+            </a:gsLst>
+            <a:lin ang="16200000" scaled="0"/>
+            <a:tileRect/>
+          </a:gradFill>
+        </p:spPr>
+        <p:style>
+          <a:lnRef idx="1">
+            <a:schemeClr val="accent1"/>
+          </a:lnRef>
+          <a:fillRef idx="3">
+            <a:schemeClr val="accent1"/>
+          </a:fillRef>
+          <a:effectRef idx="2">
+            <a:schemeClr val="accent1"/>
+          </a:effectRef>
+          <a:fontRef idx="minor">
+            <a:schemeClr val="lt1"/>
+          </a:fontRef>
+        </p:style>
+        <p:txBody>
+          <a:bodyPr rtlCol="0" anchor="ctr"/>
+          <a:lstStyle/>
+          <a:p>
+            <a:pPr algn="ctr"/>
+            <a:endParaRPr lang="en-US"/>
+          </a:p>
+        </p:txBody>
+      </p:sp>
+      <p:sp>
+        <p:nvSpPr>
+          <p:cNvPr id="8" name="Rectangle 7"/>
+          <p:cNvSpPr/>
+          <p:nvPr/>
+        </p:nvSpPr>
+        <p:spPr>
+          <a:xfrm>
+            <a:off x="4649537" y="4080043"/>
+            <a:ext cx="681790" cy="280737"/>
+          </a:xfrm>
+          <a:prstGeom prst="rect">
+            <a:avLst/>
+          </a:prstGeom>
+          <a:gradFill flip="none" rotWithShape="1">
+            <a:gsLst>
+              <a:gs pos="0">
+                <a:schemeClr val="accent1">
+                  <a:tint val="100000"/>
+                  <a:shade val="100000"/>
+                  <a:satMod val="130000"/>
+                  <a:alpha val="29000"/>
+                </a:schemeClr>
+              </a:gs>
+              <a:gs pos="100000">
+                <a:schemeClr val="accent1">
+                  <a:tint val="50000"/>
+                  <a:shade val="100000"/>
+                  <a:satMod val="350000"/>
+                  <a:alpha val="29000"/>
+                </a:schemeClr>
+              </a:gs>
+            </a:gsLst>
+            <a:lin ang="16200000" scaled="0"/>
+            <a:tileRect/>
+          </a:gradFill>
+        </p:spPr>
+        <p:style>
+          <a:lnRef idx="1">
+            <a:schemeClr val="accent1"/>
+          </a:lnRef>
+          <a:fillRef idx="3">
+            <a:schemeClr val="accent1"/>
+          </a:fillRef>
+          <a:effectRef idx="2">
+            <a:schemeClr val="accent1"/>
+          </a:effectRef>
+          <a:fontRef idx="minor">
+            <a:schemeClr val="lt1"/>
+          </a:fontRef>
+        </p:style>
+        <p:txBody>
+          <a:bodyPr rtlCol="0" anchor="ctr"/>
+          <a:lstStyle/>
+          <a:p>
+            <a:pPr algn="ctr"/>
+            <a:endParaRPr lang="en-US"/>
+          </a:p>
+        </p:txBody>
+      </p:sp>
+      <p:sp>
+        <p:nvSpPr>
+          <p:cNvPr id="9" name="Rectangle 8"/>
+          <p:cNvSpPr/>
+          <p:nvPr/>
+        </p:nvSpPr>
+        <p:spPr>
+          <a:xfrm>
+            <a:off x="5331327" y="4372811"/>
+            <a:ext cx="681790" cy="280737"/>
+          </a:xfrm>
+          <a:prstGeom prst="rect">
+            <a:avLst/>
+          </a:prstGeom>
+          <a:gradFill flip="none" rotWithShape="1">
+            <a:gsLst>
+              <a:gs pos="0">
+                <a:schemeClr val="accent1">
+                  <a:tint val="100000"/>
+                  <a:shade val="100000"/>
+                  <a:satMod val="130000"/>
+                  <a:alpha val="29000"/>
+                </a:schemeClr>
+              </a:gs>
+              <a:gs pos="100000">
+                <a:schemeClr val="accent1">
+                  <a:tint val="50000"/>
+                  <a:shade val="100000"/>
+                  <a:satMod val="350000"/>
+                  <a:alpha val="29000"/>
+                </a:schemeClr>
+              </a:gs>
+            </a:gsLst>
+            <a:lin ang="16200000" scaled="0"/>
+            <a:tileRect/>
+          </a:gradFill>
+        </p:spPr>
+        <p:style>
+          <a:lnRef idx="1">
+            <a:schemeClr val="accent1"/>
+          </a:lnRef>
+          <a:fillRef idx="3">
+            <a:schemeClr val="accent1"/>
+          </a:fillRef>
+          <a:effectRef idx="2">
+            <a:schemeClr val="accent1"/>
+          </a:effectRef>
+          <a:fontRef idx="minor">
+            <a:schemeClr val="lt1"/>
+          </a:fontRef>
+        </p:style>
+        <p:txBody>
+          <a:bodyPr rtlCol="0" anchor="ctr"/>
+          <a:lstStyle/>
+          <a:p>
+            <a:pPr algn="ctr"/>
+            <a:endParaRPr lang="en-US"/>
+          </a:p>
+        </p:txBody>
+      </p:sp>
+      <p:sp>
+        <p:nvSpPr>
+          <p:cNvPr id="3" name="Rectangle 2"/>
+          <p:cNvSpPr/>
+          <p:nvPr/>
+        </p:nvSpPr>
+        <p:spPr>
+          <a:xfrm>
+            <a:off x="1443789" y="2820737"/>
+            <a:ext cx="441158" cy="267368"/>
+          </a:xfrm>
+          <a:prstGeom prst="rect">
+            <a:avLst/>
+          </a:prstGeom>
+          <a:solidFill>
+            <a:srgbClr val="FF6600">
+              <a:alpha val="28000"/>
+            </a:srgbClr>
+          </a:solidFill>
+        </p:spPr>
+        <p:style>
+          <a:lnRef idx="1">
+            <a:schemeClr val="accent1"/>
+          </a:lnRef>
+          <a:fillRef idx="3">
+            <a:schemeClr val="accent1"/>
+          </a:fillRef>
+          <a:effectRef idx="2">
+            <a:schemeClr val="accent1"/>
+          </a:effectRef>
+          <a:fontRef idx="minor">
+            <a:schemeClr val="lt1"/>
+          </a:fontRef>
+        </p:style>
+        <p:txBody>
+          <a:bodyPr rtlCol="0" anchor="ctr"/>
+          <a:lstStyle/>
+          <a:p>
+            <a:pPr algn="ctr"/>
+            <a:endParaRPr lang="en-US"/>
+          </a:p>
+        </p:txBody>
+      </p:sp>
+      <p:sp>
+        <p:nvSpPr>
+          <p:cNvPr id="10" name="Rectangle 9"/>
+          <p:cNvSpPr/>
+          <p:nvPr/>
+        </p:nvSpPr>
+        <p:spPr>
+          <a:xfrm>
+            <a:off x="2037347" y="3088105"/>
+            <a:ext cx="441158" cy="267368"/>
+          </a:xfrm>
+          <a:prstGeom prst="rect">
+            <a:avLst/>
+          </a:prstGeom>
+          <a:solidFill>
+            <a:srgbClr val="FF6600">
+              <a:alpha val="28000"/>
+            </a:srgbClr>
+          </a:solidFill>
+        </p:spPr>
+        <p:style>
+          <a:lnRef idx="1">
+            <a:schemeClr val="accent1"/>
+          </a:lnRef>
+          <a:fillRef idx="3">
+            <a:schemeClr val="accent1"/>
+          </a:fillRef>
+          <a:effectRef idx="2">
+            <a:schemeClr val="accent1"/>
+          </a:effectRef>
+          <a:fontRef idx="minor">
+            <a:schemeClr val="lt1"/>
+          </a:fontRef>
+        </p:style>
+        <p:txBody>
+          <a:bodyPr rtlCol="0" anchor="ctr"/>
+          <a:lstStyle/>
+          <a:p>
+            <a:pPr algn="ctr"/>
+            <a:endParaRPr lang="en-US"/>
+          </a:p>
+        </p:txBody>
+      </p:sp>
+      <p:sp>
+        <p:nvSpPr>
+          <p:cNvPr id="11" name="Rectangle 10"/>
+          <p:cNvSpPr/>
+          <p:nvPr/>
+        </p:nvSpPr>
+        <p:spPr>
+          <a:xfrm>
+            <a:off x="2037347" y="3467768"/>
+            <a:ext cx="441158" cy="267368"/>
+          </a:xfrm>
+          <a:prstGeom prst="rect">
+            <a:avLst/>
+          </a:prstGeom>
+          <a:solidFill>
+            <a:srgbClr val="FF6600">
+              <a:alpha val="28000"/>
+            </a:srgbClr>
+          </a:solidFill>
+        </p:spPr>
+        <p:style>
+          <a:lnRef idx="1">
+            <a:schemeClr val="accent1"/>
+          </a:lnRef>
+          <a:fillRef idx="3">
+            <a:schemeClr val="accent1"/>
+          </a:fillRef>
+          <a:effectRef idx="2">
+            <a:schemeClr val="accent1"/>
+          </a:effectRef>
+          <a:fontRef idx="minor">
+            <a:schemeClr val="lt1"/>
+          </a:fontRef>
+        </p:style>
+        <p:txBody>
+          <a:bodyPr rtlCol="0" anchor="ctr"/>
+          <a:lstStyle/>
+          <a:p>
+            <a:pPr algn="ctr"/>
+            <a:endParaRPr lang="en-US"/>
+          </a:p>
+        </p:txBody>
+      </p:sp>
+    </p:spTree>
+    <p:extLst>
+      <p:ext uri="{BB962C8B-B14F-4D97-AF65-F5344CB8AC3E}">
+        <p14:creationId xmlns:p14="http://schemas.microsoft.com/office/powerpoint/2010/main" val="2893988343"/>
+      </p:ext>
+    </p:extLst>
+  </p:cSld>
+  <p:clrMapOvr>
+    <a:masterClrMapping/>
+  </p:clrMapOvr>
+  <p:timing>
+    <p:tnLst>
+      <p:par>
+        <p:cTn xmlns:p14="http://schemas.microsoft.com/office/powerpoint/2010/main" id="1" dur="indefinite" restart="never" nodeType="tmRoot"/>
+      </p:par>
+    </p:tnLst>
+  </p:timing>
+</p:sld>
+</file>
+
+<file path=ppt/slides/slide27.xml><?xml version="1.0" encoding="utf-8"?>
+<p:sld xmlns:a="http://schemas.openxmlformats.org/drawingml/2006/main" xmlns:r="http://schemas.openxmlformats.org/officeDocument/2006/relationships" xmlns:p="http://schemas.openxmlformats.org/presentationml/2006/main">
+  <p:cSld>
+    <p:spTree>
+      <p:nvGrpSpPr>
+        <p:cNvPr id="1" name=""/>
+        <p:cNvGrpSpPr/>
+        <p:nvPr/>
+      </p:nvGrpSpPr>
+      <p:grpSpPr>
+        <a:xfrm>
+          <a:off x="0" y="0"/>
+          <a:ext cx="0" cy="0"/>
+          <a:chOff x="0" y="0"/>
+          <a:chExt cx="0" cy="0"/>
+        </a:xfrm>
+      </p:grpSpPr>
+      <p:sp>
+        <p:nvSpPr>
+          <p:cNvPr id="2" name="Title 1"/>
+          <p:cNvSpPr>
+            <a:spLocks noGrp="1"/>
+          </p:cNvSpPr>
+          <p:nvPr>
+            <p:ph type="title"/>
+          </p:nvPr>
+        </p:nvSpPr>
+        <p:spPr/>
+        <p:txBody>
+          <a:bodyPr/>
+          <a:lstStyle/>
+          <a:p>
+            <a:r>
+              <a:rPr lang="en-US" dirty="0" smtClean="0"/>
+              <a:t>Side by side</a:t>
+            </a:r>
+            <a:endParaRPr lang="en-US" dirty="0"/>
+          </a:p>
+        </p:txBody>
+      </p:sp>
+      <p:pic>
+        <p:nvPicPr>
+          <p:cNvPr id="4" name="Content Placeholder 3" descr="sql2-all-trimmed-truncd.pdf"/>
+          <p:cNvPicPr>
+            <a:picLocks noGrp="1" noChangeAspect="1"/>
+          </p:cNvPicPr>
+          <p:nvPr>
+            <p:ph idx="1"/>
+          </p:nvPr>
+        </p:nvPicPr>
+        <p:blipFill rotWithShape="1">
+          <a:blip r:embed="rId2">
+            <a:extLst>
+              <a:ext uri="{28A0092B-C50C-407E-A947-70E740481C1C}">
+                <a14:useLocalDpi xmlns:a14="http://schemas.microsoft.com/office/drawing/2010/main" val="0"/>
+              </a:ext>
+            </a:extLst>
+          </a:blip>
+          <a:srcRect l="-198047" r="-56463"/>
+          <a:stretch/>
+        </p:blipFill>
+        <p:spPr>
+          <a:xfrm>
+            <a:off x="226786" y="1016000"/>
+            <a:ext cx="8636000" cy="5121275"/>
+          </a:xfrm>
+        </p:spPr>
+      </p:pic>
+      <p:pic>
+        <p:nvPicPr>
+          <p:cNvPr id="5" name="Picture 4" descr="sql2-all-therest.pdf"/>
+          <p:cNvPicPr>
+            <a:picLocks noChangeAspect="1"/>
+          </p:cNvPicPr>
+          <p:nvPr/>
+        </p:nvPicPr>
+        <p:blipFill>
+          <a:blip r:embed="rId3">
+            <a:extLst>
+              <a:ext uri="{28A0092B-C50C-407E-A947-70E740481C1C}">
+                <a14:useLocalDpi xmlns:a14="http://schemas.microsoft.com/office/drawing/2010/main" val="0"/>
+              </a:ext>
+            </a:extLst>
+          </a:blip>
+          <a:stretch>
+            <a:fillRect/>
+          </a:stretch>
+        </p:blipFill>
+        <p:spPr>
+          <a:xfrm>
+            <a:off x="5038760" y="5496646"/>
+            <a:ext cx="812291" cy="235790"/>
+          </a:xfrm>
+          <a:prstGeom prst="rect">
+            <a:avLst/>
+          </a:prstGeom>
+        </p:spPr>
+      </p:pic>
+      <p:pic>
+        <p:nvPicPr>
+          <p:cNvPr id="6" name="Picture 5" descr="sql1-all-trimmed.pdf"/>
+          <p:cNvPicPr>
+            <a:picLocks noChangeAspect="1"/>
+          </p:cNvPicPr>
+          <p:nvPr/>
+        </p:nvPicPr>
+        <p:blipFill>
+          <a:blip r:embed="rId4">
+            <a:extLst>
+              <a:ext uri="{28A0092B-C50C-407E-A947-70E740481C1C}">
+                <a14:useLocalDpi xmlns:a14="http://schemas.microsoft.com/office/drawing/2010/main" val="0"/>
+              </a:ext>
+            </a:extLst>
+          </a:blip>
+          <a:stretch>
+            <a:fillRect/>
+          </a:stretch>
+        </p:blipFill>
+        <p:spPr>
+          <a:xfrm>
+            <a:off x="2233385" y="1016000"/>
+            <a:ext cx="2636488" cy="3822023"/>
+          </a:xfrm>
+          <a:prstGeom prst="rect">
+            <a:avLst/>
+          </a:prstGeom>
+        </p:spPr>
+      </p:pic>
+    </p:spTree>
+    <p:extLst>
+      <p:ext uri="{BB962C8B-B14F-4D97-AF65-F5344CB8AC3E}">
+        <p14:creationId xmlns:p14="http://schemas.microsoft.com/office/powerpoint/2010/main" val="2330253520"/>
+      </p:ext>
+    </p:extLst>
+  </p:cSld>
+  <p:clrMapOvr>
+    <a:masterClrMapping/>
+  </p:clrMapOvr>
+  <p:timing>
+    <p:tnLst>
+      <p:par>
+        <p:cTn xmlns:p14="http://schemas.microsoft.com/office/powerpoint/2010/main" id="1" dur="indefinite" restart="never" nodeType="tmRoot"/>
+      </p:par>
+    </p:tnLst>
+  </p:timing>
+</p:sld>
+</file>
+
+<file path=ppt/slides/slide28.xml><?xml version="1.0" encoding="utf-8"?>
+<p:sld xmlns:a="http://schemas.openxmlformats.org/drawingml/2006/main" xmlns:r="http://schemas.openxmlformats.org/officeDocument/2006/relationships" xmlns:p="http://schemas.openxmlformats.org/presentationml/2006/main">
+  <p:cSld>
+    <p:spTree>
+      <p:nvGrpSpPr>
+        <p:cNvPr id="1" name=""/>
+        <p:cNvGrpSpPr/>
+        <p:nvPr/>
+      </p:nvGrpSpPr>
+      <p:grpSpPr>
+        <a:xfrm>
+          <a:off x="0" y="0"/>
+          <a:ext cx="0" cy="0"/>
+          <a:chOff x="0" y="0"/>
+          <a:chExt cx="0" cy="0"/>
+        </a:xfrm>
+      </p:grpSpPr>
+      <p:sp>
+        <p:nvSpPr>
+          <p:cNvPr id="2" name="Title 1"/>
+          <p:cNvSpPr>
+            <a:spLocks noGrp="1"/>
+          </p:cNvSpPr>
+          <p:nvPr>
+            <p:ph type="title"/>
+          </p:nvPr>
+        </p:nvSpPr>
+        <p:spPr/>
+        <p:txBody>
+          <a:bodyPr/>
+          <a:lstStyle/>
+          <a:p>
+            <a:r>
+              <a:rPr lang="en-US" dirty="0" smtClean="0"/>
+              <a:t>Code size</a:t>
+            </a:r>
+            <a:endParaRPr lang="en-US" dirty="0"/>
+          </a:p>
+        </p:txBody>
+      </p:sp>
+      <p:pic>
+        <p:nvPicPr>
+          <p:cNvPr id="4" name="Content Placeholder 3" descr="wc-trimmed.pdf"/>
+          <p:cNvPicPr>
+            <a:picLocks noGrp="1" noChangeAspect="1"/>
+          </p:cNvPicPr>
+          <p:nvPr>
+            <p:ph idx="1"/>
+          </p:nvPr>
+        </p:nvPicPr>
+        <p:blipFill>
+          <a:blip r:embed="rId2">
+            <a:extLst>
+              <a:ext uri="{28A0092B-C50C-407E-A947-70E740481C1C}">
+                <a14:useLocalDpi xmlns:a14="http://schemas.microsoft.com/office/drawing/2010/main" val="0"/>
+              </a:ext>
+            </a:extLst>
+          </a:blip>
+          <a:srcRect t="-53217" b="-53217"/>
+          <a:stretch>
+            <a:fillRect/>
+          </a:stretch>
+        </p:blipFill>
+        <p:spPr/>
+      </p:pic>
+    </p:spTree>
+    <p:extLst>
+      <p:ext uri="{BB962C8B-B14F-4D97-AF65-F5344CB8AC3E}">
+        <p14:creationId xmlns:p14="http://schemas.microsoft.com/office/powerpoint/2010/main" val="1604412062"/>
+      </p:ext>
+    </p:extLst>
+  </p:cSld>
+  <p:clrMapOvr>
+    <a:masterClrMapping/>
+  </p:clrMapOvr>
 </p:sld>
 </file>
 
@@ -10031,7 +12065,7 @@
   <a:extraClrSchemeLst/>
   <a:extLst>
     <a:ext uri="{05A4C25C-085E-4340-85A3-A5531E510DB2}">
-      <thm15:themeFamily xmlns="" xmlns:thm15="http://schemas.microsoft.com/office/thememl/2012/main" name="MGI_4-3_ratio_v1a" id="{9A0171FA-20F4-F840-B1C8-29D686AB0540}" vid="{60506783-C923-7847-B1CA-7C860CC95497}"/>
+      <thm15:themeFamily xmlns:thm15="http://schemas.microsoft.com/office/thememl/2012/main" xmlns="" name="MGI_4-3_ratio_v1a" id="{9A0171FA-20F4-F840-B1C8-29D686AB0540}" vid="{60506783-C923-7847-B1CA-7C860CC95497}"/>
     </a:ext>
   </a:extLst>
 </a:theme>

</xml_diff>